<commit_message>
update code for plotting Fig 4 of self-phase moddulation paper
</commit_message>
<xml_diff>
--- a/progress.pptx
+++ b/progress.pptx
@@ -5,10 +5,10 @@
     <p:sldMasterId id="2147483757" r:id="rId1"/>
   </p:sldMasterIdLst>
   <p:notesMasterIdLst>
-    <p:notesMasterId r:id="rId17"/>
+    <p:notesMasterId r:id="rId19"/>
   </p:notesMasterIdLst>
   <p:handoutMasterIdLst>
-    <p:handoutMasterId r:id="rId18"/>
+    <p:handoutMasterId r:id="rId20"/>
   </p:handoutMasterIdLst>
   <p:sldIdLst>
     <p:sldId id="444" r:id="rId2"/>
@@ -26,11 +26,13 @@
     <p:sldId id="459" r:id="rId14"/>
     <p:sldId id="460" r:id="rId15"/>
     <p:sldId id="461" r:id="rId16"/>
+    <p:sldId id="463" r:id="rId17"/>
+    <p:sldId id="462" r:id="rId18"/>
   </p:sldIdLst>
   <p:sldSz cx="9144000" cy="6858000" type="letter"/>
   <p:notesSz cx="7104063" cy="10234613"/>
   <p:custDataLst>
-    <p:tags r:id="rId19"/>
+    <p:tags r:id="rId21"/>
   </p:custDataLst>
   <p:defaultTextStyle>
     <a:defPPr>
@@ -177,6 +179,8 @@
             <p14:sldId id="459"/>
             <p14:sldId id="460"/>
             <p14:sldId id="461"/>
+            <p14:sldId id="463"/>
+            <p14:sldId id="462"/>
           </p14:sldIdLst>
         </p14:section>
       </p14:sectionLst>
@@ -360,7 +364,7 @@
             </a:pPr>
             <a:fld id="{745D068B-BA4C-407E-9F02-D48656DCD747}" type="datetime1">
               <a:rPr lang="en-US" smtClean="0"/>
-              <a:t>8/8/2024</a:t>
+              <a:t>8/21/2024</a:t>
             </a:fld>
             <a:endParaRPr lang="de-DE"/>
           </a:p>
@@ -741,7 +745,7 @@
             </a:pPr>
             <a:fld id="{CF17843B-419B-4348-87FD-F8F5051D43BD}" type="datetime1">
               <a:rPr lang="en-US" smtClean="0"/>
-              <a:t>8/8/2024</a:t>
+              <a:t>8/21/2024</a:t>
             </a:fld>
             <a:endParaRPr lang="de-DE"/>
           </a:p>
@@ -1855,7 +1859,7 @@
           <a:p>
             <a:fld id="{23E2BD91-2AE8-487A-BD5C-78BC9B3F7C4B}" type="datetime1">
               <a:rPr lang="en-US" smtClean="0"/>
-              <a:t>8/8/2024</a:t>
+              <a:t>8/21/2024</a:t>
             </a:fld>
             <a:endParaRPr lang="en-US"/>
           </a:p>
@@ -2075,7 +2079,7 @@
           <a:p>
             <a:fld id="{07206E0C-B25D-427B-B02C-AAD12CE67799}" type="datetime1">
               <a:rPr lang="en-US" smtClean="0"/>
-              <a:t>8/8/2024</a:t>
+              <a:t>8/21/2024</a:t>
             </a:fld>
             <a:endParaRPr lang="en-US"/>
           </a:p>
@@ -2621,7 +2625,7 @@
           <a:p>
             <a:fld id="{743C97FD-72C7-4C51-9020-5131B0C1B598}" type="datetime1">
               <a:rPr lang="en-US" smtClean="0"/>
-              <a:t>8/8/2024</a:t>
+              <a:t>8/21/2024</a:t>
             </a:fld>
             <a:endParaRPr lang="en-US"/>
           </a:p>
@@ -3740,7 +3744,7 @@
           <a:p>
             <a:fld id="{23E2BD91-2AE8-487A-BD5C-78BC9B3F7C4B}" type="datetime1">
               <a:rPr lang="en-US" smtClean="0"/>
-              <a:t>8/8/2024</a:t>
+              <a:t>8/21/2024</a:t>
             </a:fld>
             <a:endParaRPr lang="en-US"/>
           </a:p>
@@ -3964,7 +3968,7 @@
           <a:p>
             <a:fld id="{23E2BD91-2AE8-487A-BD5C-78BC9B3F7C4B}" type="datetime1">
               <a:rPr lang="en-US" smtClean="0"/>
-              <a:t>8/8/2024</a:t>
+              <a:t>8/21/2024</a:t>
             </a:fld>
             <a:endParaRPr lang="en-US"/>
           </a:p>
@@ -4260,7 +4264,7 @@
           <a:p>
             <a:fld id="{23E2BD91-2AE8-487A-BD5C-78BC9B3F7C4B}" type="datetime1">
               <a:rPr lang="en-US" smtClean="0"/>
-              <a:t>8/8/2024</a:t>
+              <a:t>8/21/2024</a:t>
             </a:fld>
             <a:endParaRPr lang="en-US"/>
           </a:p>
@@ -4438,6 +4442,35 @@
           <a:chExt cx="0" cy="0"/>
         </a:xfrm>
       </p:grpSpPr>
+      <p:pic>
+        <p:nvPicPr>
+          <p:cNvPr id="8" name="Picture 7">
+            <a:extLst>
+              <a:ext uri="{FF2B5EF4-FFF2-40B4-BE49-F238E27FC236}">
+                <a16:creationId xmlns:a16="http://schemas.microsoft.com/office/drawing/2014/main" id="{EF4EC4FB-03B0-0CAC-F04A-19D451AC93B8}"/>
+              </a:ext>
+            </a:extLst>
+          </p:cNvPr>
+          <p:cNvPicPr>
+            <a:picLocks noChangeAspect="1"/>
+          </p:cNvPicPr>
+          <p:nvPr/>
+        </p:nvPicPr>
+        <p:blipFill rotWithShape="1">
+          <a:blip r:embed="rId2"/>
+          <a:srcRect t="20523"/>
+          <a:stretch/>
+        </p:blipFill>
+        <p:spPr>
+          <a:xfrm>
+            <a:off x="0" y="2970298"/>
+            <a:ext cx="4578226" cy="3128783"/>
+          </a:xfrm>
+          <a:prstGeom prst="rect">
+            <a:avLst/>
+          </a:prstGeom>
+        </p:spPr>
+      </p:pic>
       <p:sp>
         <p:nvSpPr>
           <p:cNvPr id="2" name="Content Placeholder 1">
@@ -4460,30 +4493,30 @@
           <a:lstStyle/>
           <a:p>
             <a:r>
-              <a:rPr lang="en-US" altLang="zh-CN" sz="2000" dirty="0"/>
+              <a:rPr lang="en-US" altLang="zh-CN" sz="1800" dirty="0"/>
               <a:t>Had</a:t>
             </a:r>
             <a:r>
-              <a:rPr lang="de-DE" altLang="zh-CN" sz="2000" dirty="0"/>
+              <a:rPr lang="de-DE" altLang="zh-CN" sz="1800" dirty="0"/>
               <a:t> difficulty to plot exact the same graph and realized that I didn‘t fully understand </a:t>
             </a:r>
             <a:r>
-              <a:rPr lang="en-US" sz="2000" dirty="0"/>
+              <a:rPr lang="en-US" sz="1800" dirty="0"/>
               <a:t>how the tunable amplifier could achieve ideal symmetrically bistable spin in the subcritical working region. </a:t>
             </a:r>
           </a:p>
           <a:p>
             <a:pPr lvl="1"/>
             <a:r>
-              <a:rPr lang="en-US" sz="1800" dirty="0"/>
-              <a:t>As shown below, the left one is my plot, and the right one is Fig. 4 from the paper "Integrated coherent </a:t>
-            </a:r>
-            <a:r>
-              <a:rPr lang="en-US" sz="1800" dirty="0" err="1"/>
+              <a:rPr lang="en-US" sz="1600" dirty="0"/>
+              <a:t>As shown below, the left one is my plot, and the right one is Fig. 4 (right) from the paper "Integrated coherent </a:t>
+            </a:r>
+            <a:r>
+              <a:rPr lang="en-US" sz="1600" dirty="0" err="1"/>
               <a:t>Ising</a:t>
             </a:r>
             <a:r>
-              <a:rPr lang="en-US" sz="1800" dirty="0"/>
+              <a:rPr lang="en-US" sz="1600" dirty="0"/>
               <a:t> machines based on self-phase modulation in microring resonators." </a:t>
             </a:r>
           </a:p>
@@ -4540,9 +4573,9 @@
           <a:p>
             <a:fld id="{23E2BD91-2AE8-487A-BD5C-78BC9B3F7C4B}" type="datetime1">
               <a:rPr lang="en-US" smtClean="0"/>
-              <a:t>8/8/2024</a:t>
+              <a:t>8/21/2024</a:t>
             </a:fld>
-            <a:endParaRPr lang="en-US"/>
+            <a:endParaRPr lang="en-US" dirty="0"/>
           </a:p>
         </p:txBody>
       </p:sp>
@@ -4615,14 +4648,14 @@
           <p:nvPr/>
         </p:nvPicPr>
         <p:blipFill>
-          <a:blip r:embed="rId2"/>
+          <a:blip r:embed="rId3"/>
           <a:stretch>
             <a:fillRect/>
           </a:stretch>
         </p:blipFill>
         <p:spPr>
           <a:xfrm>
-            <a:off x="4088216" y="3537131"/>
+            <a:off x="4088216" y="3341186"/>
             <a:ext cx="5055784" cy="2934109"/>
           </a:xfrm>
           <a:prstGeom prst="rect">
@@ -4630,35 +4663,70 @@
           </a:prstGeom>
         </p:spPr>
       </p:pic>
-      <p:pic>
-        <p:nvPicPr>
-          <p:cNvPr id="8" name="Picture 7">
-            <a:extLst>
-              <a:ext uri="{FF2B5EF4-FFF2-40B4-BE49-F238E27FC236}">
-                <a16:creationId xmlns:a16="http://schemas.microsoft.com/office/drawing/2014/main" id="{EF4EC4FB-03B0-0CAC-F04A-19D451AC93B8}"/>
-              </a:ext>
-            </a:extLst>
-          </p:cNvPr>
-          <p:cNvPicPr>
-            <a:picLocks noChangeAspect="1"/>
-          </p:cNvPicPr>
+      <p:sp>
+        <p:nvSpPr>
+          <p:cNvPr id="7" name="TextBox 6">
+            <a:extLst>
+              <a:ext uri="{FF2B5EF4-FFF2-40B4-BE49-F238E27FC236}">
+                <a16:creationId xmlns:a16="http://schemas.microsoft.com/office/drawing/2014/main" id="{5E3D3025-9ABD-0BCB-9310-79FD8E2FE7B2}"/>
+              </a:ext>
+            </a:extLst>
+          </p:cNvPr>
+          <p:cNvSpPr txBox="1"/>
           <p:nvPr/>
-        </p:nvPicPr>
-        <p:blipFill rotWithShape="1">
-          <a:blip r:embed="rId3"/>
-          <a:srcRect t="20523"/>
-          <a:stretch/>
-        </p:blipFill>
+        </p:nvSpPr>
         <p:spPr>
           <a:xfrm>
-            <a:off x="0" y="3166243"/>
-            <a:ext cx="4578226" cy="3128783"/>
+            <a:off x="533400" y="6134173"/>
+            <a:ext cx="7981950" cy="369332"/>
           </a:xfrm>
           <a:prstGeom prst="rect">
             <a:avLst/>
           </a:prstGeom>
+          <a:noFill/>
         </p:spPr>
-      </p:pic>
+        <p:txBody>
+          <a:bodyPr wrap="square" rtlCol="0">
+            <a:spAutoFit/>
+          </a:bodyPr>
+          <a:lstStyle/>
+          <a:p>
+            <a:pPr algn="just"/>
+            <a:r>
+              <a:rPr lang="en-US" sz="900" b="0" dirty="0" err="1">
+                <a:solidFill>
+                  <a:srgbClr val="19375B"/>
+                </a:solidFill>
+              </a:rPr>
+              <a:t>Tezak</a:t>
+            </a:r>
+            <a:r>
+              <a:rPr lang="en-US" sz="900" b="0" dirty="0">
+                <a:solidFill>
+                  <a:srgbClr val="19375B"/>
+                </a:solidFill>
+              </a:rPr>
+              <a:t>, Nikolas, et al. "Integrated coherent </a:t>
+            </a:r>
+            <a:r>
+              <a:rPr lang="en-US" sz="900" b="0" dirty="0" err="1">
+                <a:solidFill>
+                  <a:srgbClr val="19375B"/>
+                </a:solidFill>
+              </a:rPr>
+              <a:t>Ising</a:t>
+            </a:r>
+            <a:r>
+              <a:rPr lang="en-US" sz="900" b="0" dirty="0">
+                <a:solidFill>
+                  <a:srgbClr val="19375B"/>
+                </a:solidFill>
+              </a:rPr>
+              <a:t> machines based on self-phase modulation in microring resonators." IEEE Journal of Selected Topics in Quantum Electronics 26.1 (2019): 1-15.</a:t>
+            </a:r>
+          </a:p>
+        </p:txBody>
+      </p:sp>
     </p:spTree>
     <p:extLst>
       <p:ext uri="{BB962C8B-B14F-4D97-AF65-F5344CB8AC3E}">
@@ -4822,7 +4890,7 @@
           <a:p>
             <a:fld id="{23E2BD91-2AE8-487A-BD5C-78BC9B3F7C4B}" type="datetime1">
               <a:rPr lang="en-US" smtClean="0"/>
-              <a:t>8/8/2024</a:t>
+              <a:t>8/21/2024</a:t>
             </a:fld>
             <a:endParaRPr lang="en-US"/>
           </a:p>
@@ -5279,7 +5347,7 @@
           <a:p>
             <a:fld id="{23E2BD91-2AE8-487A-BD5C-78BC9B3F7C4B}" type="datetime1">
               <a:rPr lang="en-US" smtClean="0"/>
-              <a:t>8/9/2024</a:t>
+              <a:t>8/21/2024</a:t>
             </a:fld>
             <a:endParaRPr lang="en-US"/>
           </a:p>
@@ -5496,6 +5564,575 @@
     <p:extLst>
       <p:ext uri="{BB962C8B-B14F-4D97-AF65-F5344CB8AC3E}">
         <p14:creationId xmlns:p14="http://schemas.microsoft.com/office/powerpoint/2010/main" val="4051263328"/>
+      </p:ext>
+    </p:extLst>
+  </p:cSld>
+  <p:clrMapOvr>
+    <a:masterClrMapping/>
+  </p:clrMapOvr>
+</p:sld>
+</file>
+
+<file path=ppt/slides/slide16.xml><?xml version="1.0" encoding="utf-8"?>
+<p:sld xmlns:a="http://schemas.openxmlformats.org/drawingml/2006/main" xmlns:r="http://schemas.openxmlformats.org/officeDocument/2006/relationships" xmlns:p="http://schemas.openxmlformats.org/presentationml/2006/main">
+  <p:cSld>
+    <p:spTree>
+      <p:nvGrpSpPr>
+        <p:cNvPr id="1" name=""/>
+        <p:cNvGrpSpPr/>
+        <p:nvPr/>
+      </p:nvGrpSpPr>
+      <p:grpSpPr>
+        <a:xfrm>
+          <a:off x="0" y="0"/>
+          <a:ext cx="0" cy="0"/>
+          <a:chOff x="0" y="0"/>
+          <a:chExt cx="0" cy="0"/>
+        </a:xfrm>
+      </p:grpSpPr>
+      <p:sp>
+        <p:nvSpPr>
+          <p:cNvPr id="2" name="Content Placeholder 1">
+            <a:extLst>
+              <a:ext uri="{FF2B5EF4-FFF2-40B4-BE49-F238E27FC236}">
+                <a16:creationId xmlns:a16="http://schemas.microsoft.com/office/drawing/2014/main" id="{05265867-BBFD-14DB-C92C-2CF5DCD89075}"/>
+              </a:ext>
+            </a:extLst>
+          </p:cNvPr>
+          <p:cNvSpPr>
+            <a:spLocks noGrp="1"/>
+          </p:cNvSpPr>
+          <p:nvPr>
+            <p:ph idx="1"/>
+          </p:nvPr>
+        </p:nvSpPr>
+        <p:spPr>
+          <a:xfrm>
+            <a:off x="250825" y="1140950"/>
+            <a:ext cx="8642350" cy="4967287"/>
+          </a:xfrm>
+        </p:spPr>
+        <p:txBody>
+          <a:bodyPr/>
+          <a:lstStyle/>
+          <a:p>
+            <a:r>
+              <a:rPr lang="de-DE" sz="2000" dirty="0"/>
+              <a:t>Wrap up the first phase</a:t>
+            </a:r>
+          </a:p>
+          <a:p>
+            <a:pPr lvl="1" algn="just"/>
+            <a:r>
+              <a:rPr lang="en-US" sz="1800" dirty="0"/>
+              <a:t>Tried to understand linearity near threshold and the corresponding linear gain in “Integrated Coherent </a:t>
+            </a:r>
+            <a:r>
+              <a:rPr lang="en-US" sz="1800" dirty="0" err="1"/>
+              <a:t>Ising</a:t>
+            </a:r>
+            <a:r>
+              <a:rPr lang="en-US" sz="1800" dirty="0"/>
+              <a:t> Machines Based on Self-Phase Modulation in </a:t>
+            </a:r>
+            <a:r>
+              <a:rPr lang="en-US" sz="1800" dirty="0" err="1"/>
+              <a:t>Microring</a:t>
+            </a:r>
+            <a:r>
+              <a:rPr lang="en-US" sz="1800" dirty="0"/>
+              <a:t> Resonators” [1], along with the paper from the same author “A coherent perceptron for all-optical learning” [2].</a:t>
+            </a:r>
+          </a:p>
+          <a:p>
+            <a:pPr lvl="1"/>
+            <a:r>
+              <a:rPr lang="en-US" sz="1800" dirty="0"/>
+              <a:t>Validated the linear </a:t>
+            </a:r>
+            <a:r>
+              <a:rPr lang="en-US" sz="1800" dirty="0" err="1"/>
+              <a:t>transferfunction</a:t>
+            </a:r>
+            <a:r>
+              <a:rPr lang="en-US" sz="1800" dirty="0"/>
+              <a:t> by plotting Fig.4 in [1] (left).</a:t>
+            </a:r>
+            <a:r>
+              <a:rPr lang="de-DE" sz="1800" dirty="0"/>
+              <a:t> Code available on https://github.com/AllInCoffee/Playground/tree/main</a:t>
+            </a:r>
+            <a:endParaRPr lang="en-US" sz="1800" dirty="0"/>
+          </a:p>
+          <a:p>
+            <a:pPr lvl="1"/>
+            <a:endParaRPr lang="en-US" sz="1800" dirty="0"/>
+          </a:p>
+        </p:txBody>
+      </p:sp>
+      <p:sp>
+        <p:nvSpPr>
+          <p:cNvPr id="3" name="Title 2">
+            <a:extLst>
+              <a:ext uri="{FF2B5EF4-FFF2-40B4-BE49-F238E27FC236}">
+                <a16:creationId xmlns:a16="http://schemas.microsoft.com/office/drawing/2014/main" id="{83B9404A-BFDF-5C9D-A1F0-25F02B84C7D7}"/>
+              </a:ext>
+            </a:extLst>
+          </p:cNvPr>
+          <p:cNvSpPr>
+            <a:spLocks noGrp="1"/>
+          </p:cNvSpPr>
+          <p:nvPr>
+            <p:ph type="title"/>
+          </p:nvPr>
+        </p:nvSpPr>
+        <p:spPr/>
+        <p:txBody>
+          <a:bodyPr/>
+          <a:lstStyle/>
+          <a:p>
+            <a:r>
+              <a:rPr lang="de-DE" dirty="0"/>
+              <a:t>Week 11 </a:t>
+            </a:r>
+            <a:endParaRPr lang="en-US" dirty="0"/>
+          </a:p>
+        </p:txBody>
+      </p:sp>
+      <p:sp>
+        <p:nvSpPr>
+          <p:cNvPr id="4" name="Date Placeholder 3">
+            <a:extLst>
+              <a:ext uri="{FF2B5EF4-FFF2-40B4-BE49-F238E27FC236}">
+                <a16:creationId xmlns:a16="http://schemas.microsoft.com/office/drawing/2014/main" id="{2C05659B-8616-0539-8B4E-2D22E9CF511B}"/>
+              </a:ext>
+            </a:extLst>
+          </p:cNvPr>
+          <p:cNvSpPr>
+            <a:spLocks noGrp="1"/>
+          </p:cNvSpPr>
+          <p:nvPr>
+            <p:ph type="dt" sz="half" idx="10"/>
+          </p:nvPr>
+        </p:nvSpPr>
+        <p:spPr/>
+        <p:txBody>
+          <a:bodyPr/>
+          <a:lstStyle/>
+          <a:p>
+            <a:fld id="{23E2BD91-2AE8-487A-BD5C-78BC9B3F7C4B}" type="datetime1">
+              <a:rPr lang="en-US" smtClean="0"/>
+              <a:t>8/21/2024</a:t>
+            </a:fld>
+            <a:endParaRPr lang="en-US"/>
+          </a:p>
+        </p:txBody>
+      </p:sp>
+      <p:sp>
+        <p:nvSpPr>
+          <p:cNvPr id="5" name="Footer Placeholder 4">
+            <a:extLst>
+              <a:ext uri="{FF2B5EF4-FFF2-40B4-BE49-F238E27FC236}">
+                <a16:creationId xmlns:a16="http://schemas.microsoft.com/office/drawing/2014/main" id="{64A78E3E-4732-088A-247D-40F03F0CC799}"/>
+              </a:ext>
+            </a:extLst>
+          </p:cNvPr>
+          <p:cNvSpPr>
+            <a:spLocks noGrp="1"/>
+          </p:cNvSpPr>
+          <p:nvPr>
+            <p:ph type="ftr" sz="quarter" idx="11"/>
+          </p:nvPr>
+        </p:nvSpPr>
+        <p:spPr/>
+        <p:txBody>
+          <a:bodyPr/>
+          <a:lstStyle/>
+          <a:p>
+            <a:endParaRPr lang="en-US"/>
+          </a:p>
+        </p:txBody>
+      </p:sp>
+      <p:sp>
+        <p:nvSpPr>
+          <p:cNvPr id="6" name="Slide Number Placeholder 5">
+            <a:extLst>
+              <a:ext uri="{FF2B5EF4-FFF2-40B4-BE49-F238E27FC236}">
+                <a16:creationId xmlns:a16="http://schemas.microsoft.com/office/drawing/2014/main" id="{E492757A-E409-1CA6-CC7C-A7B7E22F4100}"/>
+              </a:ext>
+            </a:extLst>
+          </p:cNvPr>
+          <p:cNvSpPr>
+            <a:spLocks noGrp="1"/>
+          </p:cNvSpPr>
+          <p:nvPr>
+            <p:ph type="sldNum" sz="quarter" idx="12"/>
+          </p:nvPr>
+        </p:nvSpPr>
+        <p:spPr/>
+        <p:txBody>
+          <a:bodyPr/>
+          <a:lstStyle/>
+          <a:p>
+            <a:fld id="{2697313F-D866-4554-955F-25FA0D5B9080}" type="slidenum">
+              <a:rPr lang="en-US" smtClean="0"/>
+              <a:t>16</a:t>
+            </a:fld>
+            <a:endParaRPr lang="en-US"/>
+          </a:p>
+        </p:txBody>
+      </p:sp>
+      <p:pic>
+        <p:nvPicPr>
+          <p:cNvPr id="8" name="Content Placeholder 7">
+            <a:extLst>
+              <a:ext uri="{FF2B5EF4-FFF2-40B4-BE49-F238E27FC236}">
+                <a16:creationId xmlns:a16="http://schemas.microsoft.com/office/drawing/2014/main" id="{45DA16E4-1431-5C46-E1CE-8A7DDAB17BAD}"/>
+              </a:ext>
+            </a:extLst>
+          </p:cNvPr>
+          <p:cNvPicPr>
+            <a:picLocks noChangeAspect="1"/>
+          </p:cNvPicPr>
+          <p:nvPr/>
+        </p:nvPicPr>
+        <p:blipFill rotWithShape="1">
+          <a:blip r:embed="rId2"/>
+          <a:srcRect b="49032"/>
+          <a:stretch/>
+        </p:blipFill>
+        <p:spPr bwMode="auto">
+          <a:xfrm>
+            <a:off x="4139706" y="3340799"/>
+            <a:ext cx="4937165" cy="1609927"/>
+          </a:xfrm>
+          <a:prstGeom prst="rect">
+            <a:avLst/>
+          </a:prstGeom>
+          <a:noFill/>
+          <a:ln>
+            <a:noFill/>
+          </a:ln>
+          <a:extLst>
+            <a:ext uri="{909E8E84-426E-40DD-AFC4-6F175D3DCCD1}">
+              <a14:hiddenFill xmlns:a14="http://schemas.microsoft.com/office/drawing/2010/main">
+                <a:solidFill>
+                  <a:srgbClr val="FFFFFF"/>
+                </a:solidFill>
+              </a14:hiddenFill>
+            </a:ext>
+            <a:ext uri="{91240B29-F687-4F45-9708-019B960494DF}">
+              <a14:hiddenLine xmlns:a14="http://schemas.microsoft.com/office/drawing/2010/main" w="9525">
+                <a:solidFill>
+                  <a:srgbClr val="000000"/>
+                </a:solidFill>
+                <a:miter lim="800000"/>
+                <a:headEnd/>
+                <a:tailEnd/>
+              </a14:hiddenLine>
+            </a:ext>
+          </a:extLst>
+        </p:spPr>
+      </p:pic>
+      <p:pic>
+        <p:nvPicPr>
+          <p:cNvPr id="11" name="Picture 10">
+            <a:extLst>
+              <a:ext uri="{FF2B5EF4-FFF2-40B4-BE49-F238E27FC236}">
+                <a16:creationId xmlns:a16="http://schemas.microsoft.com/office/drawing/2014/main" id="{7A4093FE-4C23-1045-F1B1-18839B0AA4CB}"/>
+              </a:ext>
+            </a:extLst>
+          </p:cNvPr>
+          <p:cNvPicPr>
+            <a:picLocks noChangeAspect="1"/>
+          </p:cNvPicPr>
+          <p:nvPr/>
+        </p:nvPicPr>
+        <p:blipFill>
+          <a:blip r:embed="rId3"/>
+          <a:stretch>
+            <a:fillRect/>
+          </a:stretch>
+        </p:blipFill>
+        <p:spPr>
+          <a:xfrm>
+            <a:off x="812346" y="3340799"/>
+            <a:ext cx="3649436" cy="2955878"/>
+          </a:xfrm>
+          <a:prstGeom prst="rect">
+            <a:avLst/>
+          </a:prstGeom>
+        </p:spPr>
+      </p:pic>
+      <p:sp>
+        <p:nvSpPr>
+          <p:cNvPr id="12" name="TextBox 11">
+            <a:extLst>
+              <a:ext uri="{FF2B5EF4-FFF2-40B4-BE49-F238E27FC236}">
+                <a16:creationId xmlns:a16="http://schemas.microsoft.com/office/drawing/2014/main" id="{40BCDDB2-8D4C-904E-9331-E4E5922E531B}"/>
+              </a:ext>
+            </a:extLst>
+          </p:cNvPr>
+          <p:cNvSpPr txBox="1"/>
+          <p:nvPr/>
+        </p:nvSpPr>
+        <p:spPr>
+          <a:xfrm>
+            <a:off x="4645421" y="5198839"/>
+            <a:ext cx="3869929" cy="923330"/>
+          </a:xfrm>
+          <a:prstGeom prst="rect">
+            <a:avLst/>
+          </a:prstGeom>
+          <a:noFill/>
+        </p:spPr>
+        <p:txBody>
+          <a:bodyPr wrap="square" rtlCol="0">
+            <a:spAutoFit/>
+          </a:bodyPr>
+          <a:lstStyle/>
+          <a:p>
+            <a:pPr algn="just"/>
+            <a:r>
+              <a:rPr lang="en-US" sz="900" b="0" dirty="0">
+                <a:solidFill>
+                  <a:srgbClr val="19375B"/>
+                </a:solidFill>
+              </a:rPr>
+              <a:t>[1] </a:t>
+            </a:r>
+            <a:r>
+              <a:rPr lang="en-US" sz="900" b="0" dirty="0" err="1">
+                <a:solidFill>
+                  <a:srgbClr val="19375B"/>
+                </a:solidFill>
+              </a:rPr>
+              <a:t>Tezak</a:t>
+            </a:r>
+            <a:r>
+              <a:rPr lang="en-US" sz="900" b="0" dirty="0">
+                <a:solidFill>
+                  <a:srgbClr val="19375B"/>
+                </a:solidFill>
+              </a:rPr>
+              <a:t>, Nikolas, et al. "Integrated coherent </a:t>
+            </a:r>
+            <a:r>
+              <a:rPr lang="en-US" sz="900" b="0" dirty="0" err="1">
+                <a:solidFill>
+                  <a:srgbClr val="19375B"/>
+                </a:solidFill>
+              </a:rPr>
+              <a:t>Ising</a:t>
+            </a:r>
+            <a:r>
+              <a:rPr lang="en-US" sz="900" b="0" dirty="0">
+                <a:solidFill>
+                  <a:srgbClr val="19375B"/>
+                </a:solidFill>
+              </a:rPr>
+              <a:t> machines based on self-phase modulation in microring resonators." IEEE Journal of Selected Topics in Quantum Electronics 26.1 (2019): 1-15.</a:t>
+            </a:r>
+          </a:p>
+          <a:p>
+            <a:r>
+              <a:rPr lang="en-US" sz="900" b="0" dirty="0">
+                <a:solidFill>
+                  <a:srgbClr val="19375B"/>
+                </a:solidFill>
+              </a:rPr>
+              <a:t>[2] </a:t>
+            </a:r>
+            <a:r>
+              <a:rPr lang="en-US" sz="900" b="0" dirty="0" err="1">
+                <a:solidFill>
+                  <a:srgbClr val="19375B"/>
+                </a:solidFill>
+              </a:rPr>
+              <a:t>Tezak</a:t>
+            </a:r>
+            <a:r>
+              <a:rPr lang="en-US" sz="900" b="0" dirty="0">
+                <a:solidFill>
+                  <a:srgbClr val="19375B"/>
+                </a:solidFill>
+              </a:rPr>
+              <a:t>, N., Mabuchi, H. A coherent perceptron for all-optical learning. EPJ Quantum Technol. 2, 10 (2015). https://doi.org/10.1140/epjqt/s40507-015-0023-3</a:t>
+            </a:r>
+          </a:p>
+        </p:txBody>
+      </p:sp>
+    </p:spTree>
+    <p:extLst>
+      <p:ext uri="{BB962C8B-B14F-4D97-AF65-F5344CB8AC3E}">
+        <p14:creationId xmlns:p14="http://schemas.microsoft.com/office/powerpoint/2010/main" val="4285196114"/>
+      </p:ext>
+    </p:extLst>
+  </p:cSld>
+  <p:clrMapOvr>
+    <a:masterClrMapping/>
+  </p:clrMapOvr>
+</p:sld>
+</file>
+
+<file path=ppt/slides/slide17.xml><?xml version="1.0" encoding="utf-8"?>
+<p:sld xmlns:a="http://schemas.openxmlformats.org/drawingml/2006/main" xmlns:r="http://schemas.openxmlformats.org/officeDocument/2006/relationships" xmlns:p="http://schemas.openxmlformats.org/presentationml/2006/main">
+  <p:cSld>
+    <p:spTree>
+      <p:nvGrpSpPr>
+        <p:cNvPr id="1" name=""/>
+        <p:cNvGrpSpPr/>
+        <p:nvPr/>
+      </p:nvGrpSpPr>
+      <p:grpSpPr>
+        <a:xfrm>
+          <a:off x="0" y="0"/>
+          <a:ext cx="0" cy="0"/>
+          <a:chOff x="0" y="0"/>
+          <a:chExt cx="0" cy="0"/>
+        </a:xfrm>
+      </p:grpSpPr>
+      <p:sp>
+        <p:nvSpPr>
+          <p:cNvPr id="3" name="Title 2">
+            <a:extLst>
+              <a:ext uri="{FF2B5EF4-FFF2-40B4-BE49-F238E27FC236}">
+                <a16:creationId xmlns:a16="http://schemas.microsoft.com/office/drawing/2014/main" id="{60774C2A-A865-0715-F71A-47589E906441}"/>
+              </a:ext>
+            </a:extLst>
+          </p:cNvPr>
+          <p:cNvSpPr>
+            <a:spLocks noGrp="1"/>
+          </p:cNvSpPr>
+          <p:nvPr>
+            <p:ph type="title"/>
+          </p:nvPr>
+        </p:nvSpPr>
+        <p:spPr/>
+        <p:txBody>
+          <a:bodyPr/>
+          <a:lstStyle/>
+          <a:p>
+            <a:r>
+              <a:rPr lang="de-DE" dirty="0"/>
+              <a:t>Week 12</a:t>
+            </a:r>
+            <a:endParaRPr lang="en-US" dirty="0"/>
+          </a:p>
+        </p:txBody>
+      </p:sp>
+      <p:sp>
+        <p:nvSpPr>
+          <p:cNvPr id="4" name="Date Placeholder 3">
+            <a:extLst>
+              <a:ext uri="{FF2B5EF4-FFF2-40B4-BE49-F238E27FC236}">
+                <a16:creationId xmlns:a16="http://schemas.microsoft.com/office/drawing/2014/main" id="{B66CF19C-2BBC-533D-CB40-ADFA6B8545F3}"/>
+              </a:ext>
+            </a:extLst>
+          </p:cNvPr>
+          <p:cNvSpPr>
+            <a:spLocks noGrp="1"/>
+          </p:cNvSpPr>
+          <p:nvPr>
+            <p:ph type="dt" sz="half" idx="10"/>
+          </p:nvPr>
+        </p:nvSpPr>
+        <p:spPr/>
+        <p:txBody>
+          <a:bodyPr/>
+          <a:lstStyle/>
+          <a:p>
+            <a:fld id="{23E2BD91-2AE8-487A-BD5C-78BC9B3F7C4B}" type="datetime1">
+              <a:rPr lang="en-US" smtClean="0"/>
+              <a:t>8/21/2024</a:t>
+            </a:fld>
+            <a:endParaRPr lang="en-US"/>
+          </a:p>
+        </p:txBody>
+      </p:sp>
+      <p:sp>
+        <p:nvSpPr>
+          <p:cNvPr id="5" name="Footer Placeholder 4">
+            <a:extLst>
+              <a:ext uri="{FF2B5EF4-FFF2-40B4-BE49-F238E27FC236}">
+                <a16:creationId xmlns:a16="http://schemas.microsoft.com/office/drawing/2014/main" id="{6EC00673-49E6-24D9-DCB0-08148E8DBB68}"/>
+              </a:ext>
+            </a:extLst>
+          </p:cNvPr>
+          <p:cNvSpPr>
+            <a:spLocks noGrp="1"/>
+          </p:cNvSpPr>
+          <p:nvPr>
+            <p:ph type="ftr" sz="quarter" idx="11"/>
+          </p:nvPr>
+        </p:nvSpPr>
+        <p:spPr/>
+        <p:txBody>
+          <a:bodyPr/>
+          <a:lstStyle/>
+          <a:p>
+            <a:endParaRPr lang="en-US"/>
+          </a:p>
+        </p:txBody>
+      </p:sp>
+      <p:sp>
+        <p:nvSpPr>
+          <p:cNvPr id="6" name="Slide Number Placeholder 5">
+            <a:extLst>
+              <a:ext uri="{FF2B5EF4-FFF2-40B4-BE49-F238E27FC236}">
+                <a16:creationId xmlns:a16="http://schemas.microsoft.com/office/drawing/2014/main" id="{034AEE50-2798-99B6-3376-0A980A37EFBB}"/>
+              </a:ext>
+            </a:extLst>
+          </p:cNvPr>
+          <p:cNvSpPr>
+            <a:spLocks noGrp="1"/>
+          </p:cNvSpPr>
+          <p:nvPr>
+            <p:ph type="sldNum" sz="quarter" idx="12"/>
+          </p:nvPr>
+        </p:nvSpPr>
+        <p:spPr/>
+        <p:txBody>
+          <a:bodyPr/>
+          <a:lstStyle/>
+          <a:p>
+            <a:fld id="{2697313F-D866-4554-955F-25FA0D5B9080}" type="slidenum">
+              <a:rPr lang="en-US" smtClean="0"/>
+              <a:t>17</a:t>
+            </a:fld>
+            <a:endParaRPr lang="en-US"/>
+          </a:p>
+        </p:txBody>
+      </p:sp>
+      <p:sp>
+        <p:nvSpPr>
+          <p:cNvPr id="9" name="Content Placeholder 8">
+            <a:extLst>
+              <a:ext uri="{FF2B5EF4-FFF2-40B4-BE49-F238E27FC236}">
+                <a16:creationId xmlns:a16="http://schemas.microsoft.com/office/drawing/2014/main" id="{F283900E-D905-73F8-91CE-D77B2DD34647}"/>
+              </a:ext>
+            </a:extLst>
+          </p:cNvPr>
+          <p:cNvSpPr>
+            <a:spLocks noGrp="1"/>
+          </p:cNvSpPr>
+          <p:nvPr>
+            <p:ph idx="1"/>
+          </p:nvPr>
+        </p:nvSpPr>
+        <p:spPr/>
+        <p:txBody>
+          <a:bodyPr/>
+          <a:lstStyle/>
+          <a:p>
+            <a:endParaRPr lang="en-US"/>
+          </a:p>
+        </p:txBody>
+      </p:sp>
+    </p:spTree>
+    <p:extLst>
+      <p:ext uri="{BB962C8B-B14F-4D97-AF65-F5344CB8AC3E}">
+        <p14:creationId xmlns:p14="http://schemas.microsoft.com/office/powerpoint/2010/main" val="232521621"/>
       </p:ext>
     </p:extLst>
   </p:cSld>
@@ -5608,7 +6245,7 @@
           <a:p>
             <a:fld id="{5C914FEA-A00B-4EE3-9815-260C78B275ED}" type="datetime1">
               <a:rPr lang="en-US" smtClean="0"/>
-              <a:t>8/8/2024</a:t>
+              <a:t>8/21/2024</a:t>
             </a:fld>
             <a:endParaRPr lang="en-US"/>
           </a:p>
@@ -6318,7 +6955,7 @@
           <a:p>
             <a:fld id="{41453237-B359-4442-BB47-702366E3C8FE}" type="datetime1">
               <a:rPr lang="en-US" smtClean="0"/>
-              <a:t>8/8/2024</a:t>
+              <a:t>8/21/2024</a:t>
             </a:fld>
             <a:endParaRPr lang="en-US"/>
           </a:p>
@@ -6578,7 +7215,7 @@
           <a:p>
             <a:fld id="{3FC47385-6E6D-403A-B787-CC7F98242E15}" type="datetime1">
               <a:rPr lang="en-US" smtClean="0"/>
-              <a:t>8/8/2024</a:t>
+              <a:t>8/21/2024</a:t>
             </a:fld>
             <a:endParaRPr lang="en-US"/>
           </a:p>
@@ -7185,7 +7822,7 @@
           <a:p>
             <a:fld id="{23E2BD91-2AE8-487A-BD5C-78BC9B3F7C4B}" type="datetime1">
               <a:rPr lang="en-US" smtClean="0"/>
-              <a:t>8/8/2024</a:t>
+              <a:t>8/21/2024</a:t>
             </a:fld>
             <a:endParaRPr lang="en-US"/>
           </a:p>
@@ -7368,7 +8005,7 @@
           <a:p>
             <a:fld id="{23E2BD91-2AE8-487A-BD5C-78BC9B3F7C4B}" type="datetime1">
               <a:rPr lang="en-US" smtClean="0"/>
-              <a:t>8/8/2024</a:t>
+              <a:t>8/21/2024</a:t>
             </a:fld>
             <a:endParaRPr lang="en-US"/>
           </a:p>
@@ -7487,8 +8124,8 @@
           </a:ln>
         </p:spPr>
       </p:pic>
-      <mc:AlternateContent xmlns:mc="http://schemas.openxmlformats.org/markup-compatibility/2006">
-        <mc:Choice xmlns:a14="http://schemas.microsoft.com/office/drawing/2010/main" Requires="a14">
+      <mc:AlternateContent xmlns:mc="http://schemas.openxmlformats.org/markup-compatibility/2006" xmlns:a14="http://schemas.microsoft.com/office/drawing/2010/main">
+        <mc:Choice Requires="a14">
           <p:sp>
             <p:nvSpPr>
               <p:cNvPr id="13" name="TextBox 12">
@@ -7806,7 +8443,7 @@
             </p:txBody>
           </p:sp>
         </mc:Choice>
-        <mc:Fallback>
+        <mc:Fallback xmlns="">
           <p:sp>
             <p:nvSpPr>
               <p:cNvPr id="13" name="TextBox 12">
@@ -8093,7 +8730,7 @@
           <a:p>
             <a:fld id="{23E2BD91-2AE8-487A-BD5C-78BC9B3F7C4B}" type="datetime1">
               <a:rPr lang="en-US" smtClean="0"/>
-              <a:t>8/8/2024</a:t>
+              <a:t>8/21/2024</a:t>
             </a:fld>
             <a:endParaRPr lang="en-US" dirty="0"/>
           </a:p>
@@ -8314,7 +8951,7 @@
           <a:p>
             <a:fld id="{23E2BD91-2AE8-487A-BD5C-78BC9B3F7C4B}" type="datetime1">
               <a:rPr lang="en-US" smtClean="0"/>
-              <a:t>8/8/2024</a:t>
+              <a:t>8/21/2024</a:t>
             </a:fld>
             <a:endParaRPr lang="en-US"/>
           </a:p>
@@ -8646,7 +9283,7 @@
           <a:p>
             <a:fld id="{23E2BD91-2AE8-487A-BD5C-78BC9B3F7C4B}" type="datetime1">
               <a:rPr lang="en-US" smtClean="0"/>
-              <a:t>8/8/2024</a:t>
+              <a:t>8/21/2024</a:t>
             </a:fld>
             <a:endParaRPr lang="en-US"/>
           </a:p>

</xml_diff>

<commit_message>
Literature review notes (summary) during Week 14-15
</commit_message>
<xml_diff>
--- a/progress.pptx
+++ b/progress.pptx
@@ -5,10 +5,10 @@
     <p:sldMasterId id="2147483757" r:id="rId1"/>
   </p:sldMasterIdLst>
   <p:notesMasterIdLst>
-    <p:notesMasterId r:id="rId19"/>
+    <p:notesMasterId r:id="rId21"/>
   </p:notesMasterIdLst>
   <p:handoutMasterIdLst>
-    <p:handoutMasterId r:id="rId20"/>
+    <p:handoutMasterId r:id="rId22"/>
   </p:handoutMasterIdLst>
   <p:sldIdLst>
     <p:sldId id="444" r:id="rId2"/>
@@ -28,11 +28,13 @@
     <p:sldId id="461" r:id="rId16"/>
     <p:sldId id="463" r:id="rId17"/>
     <p:sldId id="462" r:id="rId18"/>
+    <p:sldId id="464" r:id="rId19"/>
+    <p:sldId id="465" r:id="rId20"/>
   </p:sldIdLst>
   <p:sldSz cx="9144000" cy="6858000" type="letter"/>
   <p:notesSz cx="7104063" cy="10234613"/>
   <p:custDataLst>
-    <p:tags r:id="rId21"/>
+    <p:tags r:id="rId23"/>
   </p:custDataLst>
   <p:defaultTextStyle>
     <a:defPPr>
@@ -181,6 +183,8 @@
             <p14:sldId id="461"/>
             <p14:sldId id="463"/>
             <p14:sldId id="462"/>
+            <p14:sldId id="464"/>
+            <p14:sldId id="465"/>
           </p14:sldIdLst>
         </p14:section>
       </p14:sectionLst>
@@ -364,7 +368,7 @@
             </a:pPr>
             <a:fld id="{745D068B-BA4C-407E-9F02-D48656DCD747}" type="datetime1">
               <a:rPr lang="en-US" smtClean="0"/>
-              <a:t>8/21/2024</a:t>
+              <a:t>9/12/2024</a:t>
             </a:fld>
             <a:endParaRPr lang="de-DE"/>
           </a:p>
@@ -745,7 +749,7 @@
             </a:pPr>
             <a:fld id="{CF17843B-419B-4348-87FD-F8F5051D43BD}" type="datetime1">
               <a:rPr lang="en-US" smtClean="0"/>
-              <a:t>8/21/2024</a:t>
+              <a:t>9/12/2024</a:t>
             </a:fld>
             <a:endParaRPr lang="de-DE"/>
           </a:p>
@@ -1859,7 +1863,7 @@
           <a:p>
             <a:fld id="{23E2BD91-2AE8-487A-BD5C-78BC9B3F7C4B}" type="datetime1">
               <a:rPr lang="en-US" smtClean="0"/>
-              <a:t>8/21/2024</a:t>
+              <a:t>9/12/2024</a:t>
             </a:fld>
             <a:endParaRPr lang="en-US"/>
           </a:p>
@@ -2079,7 +2083,7 @@
           <a:p>
             <a:fld id="{07206E0C-B25D-427B-B02C-AAD12CE67799}" type="datetime1">
               <a:rPr lang="en-US" smtClean="0"/>
-              <a:t>8/21/2024</a:t>
+              <a:t>9/12/2024</a:t>
             </a:fld>
             <a:endParaRPr lang="en-US"/>
           </a:p>
@@ -2625,7 +2629,7 @@
           <a:p>
             <a:fld id="{743C97FD-72C7-4C51-9020-5131B0C1B598}" type="datetime1">
               <a:rPr lang="en-US" smtClean="0"/>
-              <a:t>8/21/2024</a:t>
+              <a:t>9/12/2024</a:t>
             </a:fld>
             <a:endParaRPr lang="en-US"/>
           </a:p>
@@ -3744,7 +3748,7 @@
           <a:p>
             <a:fld id="{23E2BD91-2AE8-487A-BD5C-78BC9B3F7C4B}" type="datetime1">
               <a:rPr lang="en-US" smtClean="0"/>
-              <a:t>8/21/2024</a:t>
+              <a:t>9/12/2024</a:t>
             </a:fld>
             <a:endParaRPr lang="en-US"/>
           </a:p>
@@ -3968,7 +3972,7 @@
           <a:p>
             <a:fld id="{23E2BD91-2AE8-487A-BD5C-78BC9B3F7C4B}" type="datetime1">
               <a:rPr lang="en-US" smtClean="0"/>
-              <a:t>8/21/2024</a:t>
+              <a:t>9/12/2024</a:t>
             </a:fld>
             <a:endParaRPr lang="en-US"/>
           </a:p>
@@ -4264,7 +4268,7 @@
           <a:p>
             <a:fld id="{23E2BD91-2AE8-487A-BD5C-78BC9B3F7C4B}" type="datetime1">
               <a:rPr lang="en-US" smtClean="0"/>
-              <a:t>8/21/2024</a:t>
+              <a:t>9/12/2024</a:t>
             </a:fld>
             <a:endParaRPr lang="en-US"/>
           </a:p>
@@ -4573,7 +4577,7 @@
           <a:p>
             <a:fld id="{23E2BD91-2AE8-487A-BD5C-78BC9B3F7C4B}" type="datetime1">
               <a:rPr lang="en-US" smtClean="0"/>
-              <a:t>8/21/2024</a:t>
+              <a:t>9/12/2024</a:t>
             </a:fld>
             <a:endParaRPr lang="en-US" dirty="0"/>
           </a:p>
@@ -4890,7 +4894,7 @@
           <a:p>
             <a:fld id="{23E2BD91-2AE8-487A-BD5C-78BC9B3F7C4B}" type="datetime1">
               <a:rPr lang="en-US" smtClean="0"/>
-              <a:t>8/21/2024</a:t>
+              <a:t>9/12/2024</a:t>
             </a:fld>
             <a:endParaRPr lang="en-US"/>
           </a:p>
@@ -5347,7 +5351,7 @@
           <a:p>
             <a:fld id="{23E2BD91-2AE8-487A-BD5C-78BC9B3F7C4B}" type="datetime1">
               <a:rPr lang="en-US" smtClean="0"/>
-              <a:t>8/21/2024</a:t>
+              <a:t>9/12/2024</a:t>
             </a:fld>
             <a:endParaRPr lang="en-US"/>
           </a:p>
@@ -5722,7 +5726,7 @@
           <a:p>
             <a:fld id="{23E2BD91-2AE8-487A-BD5C-78BC9B3F7C4B}" type="datetime1">
               <a:rPr lang="en-US" smtClean="0"/>
-              <a:t>8/21/2024</a:t>
+              <a:t>9/12/2024</a:t>
             </a:fld>
             <a:endParaRPr lang="en-US"/>
           </a:p>
@@ -6044,7 +6048,7 @@
           <a:p>
             <a:fld id="{23E2BD91-2AE8-487A-BD5C-78BC9B3F7C4B}" type="datetime1">
               <a:rPr lang="en-US" smtClean="0"/>
-              <a:t>8/21/2024</a:t>
+              <a:t>9/12/2024</a:t>
             </a:fld>
             <a:endParaRPr lang="en-US"/>
           </a:p>
@@ -6125,7 +6129,25 @@
           <a:bodyPr/>
           <a:lstStyle/>
           <a:p>
-            <a:endParaRPr lang="en-US"/>
+            <a:r>
+              <a:rPr lang="en-US" dirty="0"/>
+              <a:t>S</a:t>
+            </a:r>
+            <a:r>
+              <a:rPr lang="en-US" altLang="zh-CN" dirty="0"/>
+              <a:t>ummarize the first phase</a:t>
+            </a:r>
+          </a:p>
+          <a:p>
+            <a:r>
+              <a:rPr lang="en-US" dirty="0"/>
+              <a:t>P</a:t>
+            </a:r>
+            <a:r>
+              <a:rPr lang="en-US" altLang="zh-CN" dirty="0"/>
+              <a:t>resentation</a:t>
+            </a:r>
+            <a:endParaRPr lang="en-US" dirty="0"/>
           </a:p>
         </p:txBody>
       </p:sp>
@@ -6133,6 +6155,548 @@
     <p:extLst>
       <p:ext uri="{BB962C8B-B14F-4D97-AF65-F5344CB8AC3E}">
         <p14:creationId xmlns:p14="http://schemas.microsoft.com/office/powerpoint/2010/main" val="232521621"/>
+      </p:ext>
+    </p:extLst>
+  </p:cSld>
+  <p:clrMapOvr>
+    <a:masterClrMapping/>
+  </p:clrMapOvr>
+</p:sld>
+</file>
+
+<file path=ppt/slides/slide18.xml><?xml version="1.0" encoding="utf-8"?>
+<p:sld xmlns:a="http://schemas.openxmlformats.org/drawingml/2006/main" xmlns:r="http://schemas.openxmlformats.org/officeDocument/2006/relationships" xmlns:p="http://schemas.openxmlformats.org/presentationml/2006/main">
+  <p:cSld>
+    <p:spTree>
+      <p:nvGrpSpPr>
+        <p:cNvPr id="1" name=""/>
+        <p:cNvGrpSpPr/>
+        <p:nvPr/>
+      </p:nvGrpSpPr>
+      <p:grpSpPr>
+        <a:xfrm>
+          <a:off x="0" y="0"/>
+          <a:ext cx="0" cy="0"/>
+          <a:chOff x="0" y="0"/>
+          <a:chExt cx="0" cy="0"/>
+        </a:xfrm>
+      </p:grpSpPr>
+      <p:sp>
+        <p:nvSpPr>
+          <p:cNvPr id="2" name="Content Placeholder 1">
+            <a:extLst>
+              <a:ext uri="{FF2B5EF4-FFF2-40B4-BE49-F238E27FC236}">
+                <a16:creationId xmlns:a16="http://schemas.microsoft.com/office/drawing/2014/main" id="{6B6589AA-00BD-C960-3487-4F7965310E1E}"/>
+              </a:ext>
+            </a:extLst>
+          </p:cNvPr>
+          <p:cNvSpPr>
+            <a:spLocks noGrp="1"/>
+          </p:cNvSpPr>
+          <p:nvPr>
+            <p:ph idx="1"/>
+          </p:nvPr>
+        </p:nvSpPr>
+        <p:spPr/>
+        <p:txBody>
+          <a:bodyPr/>
+          <a:lstStyle/>
+          <a:p>
+            <a:r>
+              <a:rPr lang="en-US" dirty="0"/>
+              <a:t>TSP </a:t>
+            </a:r>
+            <a:r>
+              <a:rPr lang="en-US" altLang="zh-CN" dirty="0"/>
+              <a:t>formulation</a:t>
+            </a:r>
+          </a:p>
+          <a:p>
+            <a:endParaRPr lang="en-US" dirty="0"/>
+          </a:p>
+        </p:txBody>
+      </p:sp>
+      <p:sp>
+        <p:nvSpPr>
+          <p:cNvPr id="3" name="Title 2">
+            <a:extLst>
+              <a:ext uri="{FF2B5EF4-FFF2-40B4-BE49-F238E27FC236}">
+                <a16:creationId xmlns:a16="http://schemas.microsoft.com/office/drawing/2014/main" id="{F9A6AB08-3258-9741-ECF4-1E64783CA93B}"/>
+              </a:ext>
+            </a:extLst>
+          </p:cNvPr>
+          <p:cNvSpPr>
+            <a:spLocks noGrp="1"/>
+          </p:cNvSpPr>
+          <p:nvPr>
+            <p:ph type="title"/>
+          </p:nvPr>
+        </p:nvSpPr>
+        <p:spPr/>
+        <p:txBody>
+          <a:bodyPr/>
+          <a:lstStyle/>
+          <a:p>
+            <a:r>
+              <a:rPr lang="en-US" dirty="0"/>
+              <a:t>W</a:t>
+            </a:r>
+            <a:r>
+              <a:rPr lang="en-US" altLang="zh-CN" dirty="0"/>
+              <a:t>eek 13</a:t>
+            </a:r>
+            <a:endParaRPr lang="en-US" dirty="0"/>
+          </a:p>
+        </p:txBody>
+      </p:sp>
+      <p:sp>
+        <p:nvSpPr>
+          <p:cNvPr id="4" name="Date Placeholder 3">
+            <a:extLst>
+              <a:ext uri="{FF2B5EF4-FFF2-40B4-BE49-F238E27FC236}">
+                <a16:creationId xmlns:a16="http://schemas.microsoft.com/office/drawing/2014/main" id="{C99EF331-5DE3-499A-A8B4-FE73ACDC783D}"/>
+              </a:ext>
+            </a:extLst>
+          </p:cNvPr>
+          <p:cNvSpPr>
+            <a:spLocks noGrp="1"/>
+          </p:cNvSpPr>
+          <p:nvPr>
+            <p:ph type="dt" sz="half" idx="10"/>
+          </p:nvPr>
+        </p:nvSpPr>
+        <p:spPr/>
+        <p:txBody>
+          <a:bodyPr/>
+          <a:lstStyle/>
+          <a:p>
+            <a:fld id="{23E2BD91-2AE8-487A-BD5C-78BC9B3F7C4B}" type="datetime1">
+              <a:rPr lang="en-US" smtClean="0"/>
+              <a:t>9/12/2024</a:t>
+            </a:fld>
+            <a:endParaRPr lang="en-US"/>
+          </a:p>
+        </p:txBody>
+      </p:sp>
+      <p:sp>
+        <p:nvSpPr>
+          <p:cNvPr id="5" name="Footer Placeholder 4">
+            <a:extLst>
+              <a:ext uri="{FF2B5EF4-FFF2-40B4-BE49-F238E27FC236}">
+                <a16:creationId xmlns:a16="http://schemas.microsoft.com/office/drawing/2014/main" id="{370A3A15-5512-9E7C-8A25-9F3A186FF798}"/>
+              </a:ext>
+            </a:extLst>
+          </p:cNvPr>
+          <p:cNvSpPr>
+            <a:spLocks noGrp="1"/>
+          </p:cNvSpPr>
+          <p:nvPr>
+            <p:ph type="ftr" sz="quarter" idx="11"/>
+          </p:nvPr>
+        </p:nvSpPr>
+        <p:spPr/>
+        <p:txBody>
+          <a:bodyPr/>
+          <a:lstStyle/>
+          <a:p>
+            <a:endParaRPr lang="en-US"/>
+          </a:p>
+        </p:txBody>
+      </p:sp>
+      <p:sp>
+        <p:nvSpPr>
+          <p:cNvPr id="6" name="Slide Number Placeholder 5">
+            <a:extLst>
+              <a:ext uri="{FF2B5EF4-FFF2-40B4-BE49-F238E27FC236}">
+                <a16:creationId xmlns:a16="http://schemas.microsoft.com/office/drawing/2014/main" id="{9B68E753-713F-1DF7-9D54-91E35B0099BC}"/>
+              </a:ext>
+            </a:extLst>
+          </p:cNvPr>
+          <p:cNvSpPr>
+            <a:spLocks noGrp="1"/>
+          </p:cNvSpPr>
+          <p:nvPr>
+            <p:ph type="sldNum" sz="quarter" idx="12"/>
+          </p:nvPr>
+        </p:nvSpPr>
+        <p:spPr/>
+        <p:txBody>
+          <a:bodyPr/>
+          <a:lstStyle/>
+          <a:p>
+            <a:fld id="{2697313F-D866-4554-955F-25FA0D5B9080}" type="slidenum">
+              <a:rPr lang="en-US" smtClean="0"/>
+              <a:t>18</a:t>
+            </a:fld>
+            <a:endParaRPr lang="en-US"/>
+          </a:p>
+        </p:txBody>
+      </p:sp>
+      <p:pic>
+        <p:nvPicPr>
+          <p:cNvPr id="8" name="Picture 7">
+            <a:extLst>
+              <a:ext uri="{FF2B5EF4-FFF2-40B4-BE49-F238E27FC236}">
+                <a16:creationId xmlns:a16="http://schemas.microsoft.com/office/drawing/2014/main" id="{16F29B8E-6DA8-8CAD-E8B4-2A2E4EEE8198}"/>
+              </a:ext>
+            </a:extLst>
+          </p:cNvPr>
+          <p:cNvPicPr>
+            <a:picLocks noChangeAspect="1"/>
+          </p:cNvPicPr>
+          <p:nvPr/>
+        </p:nvPicPr>
+        <p:blipFill>
+          <a:blip r:embed="rId2"/>
+          <a:stretch>
+            <a:fillRect/>
+          </a:stretch>
+        </p:blipFill>
+        <p:spPr>
+          <a:xfrm>
+            <a:off x="1952259" y="1777700"/>
+            <a:ext cx="5239481" cy="1038370"/>
+          </a:xfrm>
+          <a:prstGeom prst="rect">
+            <a:avLst/>
+          </a:prstGeom>
+        </p:spPr>
+      </p:pic>
+      <p:pic>
+        <p:nvPicPr>
+          <p:cNvPr id="10" name="Picture 9">
+            <a:extLst>
+              <a:ext uri="{FF2B5EF4-FFF2-40B4-BE49-F238E27FC236}">
+                <a16:creationId xmlns:a16="http://schemas.microsoft.com/office/drawing/2014/main" id="{1E8C69FC-C2FB-FF7E-F277-1B749BD648DA}"/>
+              </a:ext>
+            </a:extLst>
+          </p:cNvPr>
+          <p:cNvPicPr>
+            <a:picLocks noChangeAspect="1"/>
+          </p:cNvPicPr>
+          <p:nvPr/>
+        </p:nvPicPr>
+        <p:blipFill>
+          <a:blip r:embed="rId3"/>
+          <a:stretch>
+            <a:fillRect/>
+          </a:stretch>
+        </p:blipFill>
+        <p:spPr>
+          <a:xfrm>
+            <a:off x="2504785" y="3013898"/>
+            <a:ext cx="4134427" cy="1200318"/>
+          </a:xfrm>
+          <a:prstGeom prst="rect">
+            <a:avLst/>
+          </a:prstGeom>
+        </p:spPr>
+      </p:pic>
+    </p:spTree>
+    <p:extLst>
+      <p:ext uri="{BB962C8B-B14F-4D97-AF65-F5344CB8AC3E}">
+        <p14:creationId xmlns:p14="http://schemas.microsoft.com/office/powerpoint/2010/main" val="1628018147"/>
+      </p:ext>
+    </p:extLst>
+  </p:cSld>
+  <p:clrMapOvr>
+    <a:masterClrMapping/>
+  </p:clrMapOvr>
+</p:sld>
+</file>
+
+<file path=ppt/slides/slide19.xml><?xml version="1.0" encoding="utf-8"?>
+<p:sld xmlns:a="http://schemas.openxmlformats.org/drawingml/2006/main" xmlns:r="http://schemas.openxmlformats.org/officeDocument/2006/relationships" xmlns:p="http://schemas.openxmlformats.org/presentationml/2006/main">
+  <p:cSld>
+    <p:spTree>
+      <p:nvGrpSpPr>
+        <p:cNvPr id="1" name=""/>
+        <p:cNvGrpSpPr/>
+        <p:nvPr/>
+      </p:nvGrpSpPr>
+      <p:grpSpPr>
+        <a:xfrm>
+          <a:off x="0" y="0"/>
+          <a:ext cx="0" cy="0"/>
+          <a:chOff x="0" y="0"/>
+          <a:chExt cx="0" cy="0"/>
+        </a:xfrm>
+      </p:grpSpPr>
+      <p:sp>
+        <p:nvSpPr>
+          <p:cNvPr id="2" name="Content Placeholder 1">
+            <a:extLst>
+              <a:ext uri="{FF2B5EF4-FFF2-40B4-BE49-F238E27FC236}">
+                <a16:creationId xmlns:a16="http://schemas.microsoft.com/office/drawing/2014/main" id="{5CF1275A-4697-D4A2-9DE8-34416B90BD95}"/>
+              </a:ext>
+            </a:extLst>
+          </p:cNvPr>
+          <p:cNvSpPr>
+            <a:spLocks noGrp="1"/>
+          </p:cNvSpPr>
+          <p:nvPr>
+            <p:ph idx="1"/>
+          </p:nvPr>
+        </p:nvSpPr>
+        <p:spPr bwMode="auto"/>
+        <p:txBody>
+          <a:bodyPr/>
+          <a:lstStyle/>
+          <a:p>
+            <a:r>
+              <a:rPr lang="en-US" dirty="0"/>
+              <a:t> L</a:t>
+            </a:r>
+            <a:r>
+              <a:rPr lang="en-US" altLang="zh-CN" dirty="0"/>
+              <a:t>iterature review on state-of-the-art </a:t>
+            </a:r>
+            <a:r>
+              <a:rPr lang="en-US" dirty="0"/>
+              <a:t>Kerr Parametric Oscillator (KPO) </a:t>
+            </a:r>
+            <a:r>
+              <a:rPr lang="en-US" altLang="zh-CN" dirty="0"/>
+              <a:t>b</a:t>
+            </a:r>
+            <a:r>
+              <a:rPr lang="en-US" dirty="0"/>
+              <a:t>ased </a:t>
+            </a:r>
+            <a:r>
+              <a:rPr lang="en-US" dirty="0" err="1"/>
+              <a:t>Ising</a:t>
+            </a:r>
+            <a:r>
+              <a:rPr lang="en-US" dirty="0"/>
+              <a:t> </a:t>
+            </a:r>
+            <a:r>
+              <a:rPr lang="en-US" altLang="zh-CN" dirty="0"/>
+              <a:t>m</a:t>
+            </a:r>
+            <a:r>
+              <a:rPr lang="en-US" dirty="0"/>
+              <a:t>achines</a:t>
+            </a:r>
+          </a:p>
+          <a:p>
+            <a:pPr lvl="1"/>
+            <a:r>
+              <a:rPr lang="en-US" sz="2400" dirty="0"/>
+              <a:t>Objectives </a:t>
+            </a:r>
+          </a:p>
+          <a:p>
+            <a:pPr lvl="2"/>
+            <a:r>
+              <a:rPr lang="en-US" sz="2000" dirty="0"/>
+              <a:t>To find a more accurate model for mapping into </a:t>
+            </a:r>
+            <a:r>
+              <a:rPr lang="en-US" sz="2000" dirty="0" err="1"/>
+              <a:t>Ising</a:t>
+            </a:r>
+            <a:r>
+              <a:rPr lang="en-US" sz="2000" dirty="0"/>
+              <a:t> problems</a:t>
+            </a:r>
+          </a:p>
+          <a:p>
+            <a:pPr lvl="3"/>
+            <a:r>
+              <a:rPr lang="en-US" sz="2000" dirty="0"/>
+              <a:t>Add noise or thermal </a:t>
+            </a:r>
+            <a:r>
+              <a:rPr lang="en-US" sz="2000" dirty="0" err="1"/>
+              <a:t>flucturation</a:t>
+            </a:r>
+            <a:endParaRPr lang="en-US" sz="2000" dirty="0"/>
+          </a:p>
+          <a:p>
+            <a:pPr lvl="3"/>
+            <a:r>
+              <a:rPr lang="en-US" sz="2000" dirty="0"/>
+              <a:t>Increase order of nonlinearity in cost function </a:t>
+            </a:r>
+          </a:p>
+          <a:p>
+            <a:pPr lvl="3"/>
+            <a:r>
+              <a:rPr lang="en-US" sz="2000" dirty="0"/>
+              <a:t>Add external magnetic field </a:t>
+            </a:r>
+          </a:p>
+          <a:p>
+            <a:pPr lvl="2"/>
+            <a:r>
+              <a:rPr lang="en-US" sz="2000" dirty="0"/>
+              <a:t>To compute faster</a:t>
+            </a:r>
+          </a:p>
+          <a:p>
+            <a:pPr lvl="3"/>
+            <a:r>
+              <a:rPr lang="en-US" sz="2000" dirty="0"/>
+              <a:t>Optimize the model for less computing complexity</a:t>
+            </a:r>
+          </a:p>
+          <a:p>
+            <a:pPr lvl="3"/>
+            <a:r>
+              <a:rPr lang="en-US" sz="2000" dirty="0"/>
+              <a:t>Reduce bits required for </a:t>
+            </a:r>
+            <a:r>
+              <a:rPr lang="en-US" sz="2000"/>
+              <a:t>coupling strength</a:t>
+            </a:r>
+            <a:endParaRPr lang="en-US" sz="2000" dirty="0"/>
+          </a:p>
+          <a:p>
+            <a:pPr lvl="2"/>
+            <a:r>
+              <a:rPr lang="en-US" sz="2000" dirty="0"/>
+              <a:t>To be more compact / to scale </a:t>
+            </a:r>
+          </a:p>
+          <a:p>
+            <a:pPr lvl="3"/>
+            <a:r>
+              <a:rPr lang="en-US" sz="2000" dirty="0"/>
+              <a:t>Reduce power consumption </a:t>
+            </a:r>
+          </a:p>
+          <a:p>
+            <a:pPr lvl="3"/>
+            <a:r>
+              <a:rPr lang="en-US" sz="2000" dirty="0"/>
+              <a:t>Reduce footprint </a:t>
+            </a:r>
+          </a:p>
+          <a:p>
+            <a:pPr lvl="2"/>
+            <a:endParaRPr lang="en-US" sz="1400" dirty="0"/>
+          </a:p>
+        </p:txBody>
+      </p:sp>
+      <p:sp>
+        <p:nvSpPr>
+          <p:cNvPr id="3" name="Title 2">
+            <a:extLst>
+              <a:ext uri="{FF2B5EF4-FFF2-40B4-BE49-F238E27FC236}">
+                <a16:creationId xmlns:a16="http://schemas.microsoft.com/office/drawing/2014/main" id="{7E943A22-1171-E601-56DE-95F53C147110}"/>
+              </a:ext>
+            </a:extLst>
+          </p:cNvPr>
+          <p:cNvSpPr>
+            <a:spLocks noGrp="1"/>
+          </p:cNvSpPr>
+          <p:nvPr>
+            <p:ph type="title"/>
+          </p:nvPr>
+        </p:nvSpPr>
+        <p:spPr/>
+        <p:txBody>
+          <a:bodyPr/>
+          <a:lstStyle/>
+          <a:p>
+            <a:r>
+              <a:rPr lang="de-DE" dirty="0"/>
+              <a:t>Week 14-15 Literature Review</a:t>
+            </a:r>
+            <a:endParaRPr lang="en-US" dirty="0"/>
+          </a:p>
+        </p:txBody>
+      </p:sp>
+      <p:sp>
+        <p:nvSpPr>
+          <p:cNvPr id="4" name="Date Placeholder 3">
+            <a:extLst>
+              <a:ext uri="{FF2B5EF4-FFF2-40B4-BE49-F238E27FC236}">
+                <a16:creationId xmlns:a16="http://schemas.microsoft.com/office/drawing/2014/main" id="{FFF519E3-30F8-F0B4-F50C-FB2ECBABF20F}"/>
+              </a:ext>
+            </a:extLst>
+          </p:cNvPr>
+          <p:cNvSpPr>
+            <a:spLocks noGrp="1"/>
+          </p:cNvSpPr>
+          <p:nvPr>
+            <p:ph type="dt" sz="half" idx="10"/>
+          </p:nvPr>
+        </p:nvSpPr>
+        <p:spPr/>
+        <p:txBody>
+          <a:bodyPr/>
+          <a:lstStyle/>
+          <a:p>
+            <a:fld id="{23E2BD91-2AE8-487A-BD5C-78BC9B3F7C4B}" type="datetime1">
+              <a:rPr lang="en-US" smtClean="0"/>
+              <a:t>9/12/2024</a:t>
+            </a:fld>
+            <a:endParaRPr lang="en-US"/>
+          </a:p>
+        </p:txBody>
+      </p:sp>
+      <p:sp>
+        <p:nvSpPr>
+          <p:cNvPr id="5" name="Footer Placeholder 4">
+            <a:extLst>
+              <a:ext uri="{FF2B5EF4-FFF2-40B4-BE49-F238E27FC236}">
+                <a16:creationId xmlns:a16="http://schemas.microsoft.com/office/drawing/2014/main" id="{950D0886-DB1A-121E-E554-5C7AECF16005}"/>
+              </a:ext>
+            </a:extLst>
+          </p:cNvPr>
+          <p:cNvSpPr>
+            <a:spLocks noGrp="1"/>
+          </p:cNvSpPr>
+          <p:nvPr>
+            <p:ph type="ftr" sz="quarter" idx="11"/>
+          </p:nvPr>
+        </p:nvSpPr>
+        <p:spPr/>
+        <p:txBody>
+          <a:bodyPr/>
+          <a:lstStyle/>
+          <a:p>
+            <a:endParaRPr lang="en-US"/>
+          </a:p>
+        </p:txBody>
+      </p:sp>
+      <p:sp>
+        <p:nvSpPr>
+          <p:cNvPr id="6" name="Slide Number Placeholder 5">
+            <a:extLst>
+              <a:ext uri="{FF2B5EF4-FFF2-40B4-BE49-F238E27FC236}">
+                <a16:creationId xmlns:a16="http://schemas.microsoft.com/office/drawing/2014/main" id="{E7519102-4CE5-EC50-78D8-7F501363092C}"/>
+              </a:ext>
+            </a:extLst>
+          </p:cNvPr>
+          <p:cNvSpPr>
+            <a:spLocks noGrp="1"/>
+          </p:cNvSpPr>
+          <p:nvPr>
+            <p:ph type="sldNum" sz="quarter" idx="12"/>
+          </p:nvPr>
+        </p:nvSpPr>
+        <p:spPr/>
+        <p:txBody>
+          <a:bodyPr/>
+          <a:lstStyle/>
+          <a:p>
+            <a:fld id="{2697313F-D866-4554-955F-25FA0D5B9080}" type="slidenum">
+              <a:rPr lang="en-US" smtClean="0"/>
+              <a:t>19</a:t>
+            </a:fld>
+            <a:endParaRPr lang="en-US"/>
+          </a:p>
+        </p:txBody>
+      </p:sp>
+    </p:spTree>
+    <p:extLst>
+      <p:ext uri="{BB962C8B-B14F-4D97-AF65-F5344CB8AC3E}">
+        <p14:creationId xmlns:p14="http://schemas.microsoft.com/office/powerpoint/2010/main" val="1956436616"/>
       </p:ext>
     </p:extLst>
   </p:cSld>
@@ -6245,7 +6809,7 @@
           <a:p>
             <a:fld id="{5C914FEA-A00B-4EE3-9815-260C78B275ED}" type="datetime1">
               <a:rPr lang="en-US" smtClean="0"/>
-              <a:t>8/21/2024</a:t>
+              <a:t>9/12/2024</a:t>
             </a:fld>
             <a:endParaRPr lang="en-US"/>
           </a:p>
@@ -6955,7 +7519,7 @@
           <a:p>
             <a:fld id="{41453237-B359-4442-BB47-702366E3C8FE}" type="datetime1">
               <a:rPr lang="en-US" smtClean="0"/>
-              <a:t>8/21/2024</a:t>
+              <a:t>9/12/2024</a:t>
             </a:fld>
             <a:endParaRPr lang="en-US"/>
           </a:p>
@@ -7215,7 +7779,7 @@
           <a:p>
             <a:fld id="{3FC47385-6E6D-403A-B787-CC7F98242E15}" type="datetime1">
               <a:rPr lang="en-US" smtClean="0"/>
-              <a:t>8/21/2024</a:t>
+              <a:t>9/12/2024</a:t>
             </a:fld>
             <a:endParaRPr lang="en-US"/>
           </a:p>
@@ -7822,7 +8386,7 @@
           <a:p>
             <a:fld id="{23E2BD91-2AE8-487A-BD5C-78BC9B3F7C4B}" type="datetime1">
               <a:rPr lang="en-US" smtClean="0"/>
-              <a:t>8/21/2024</a:t>
+              <a:t>9/12/2024</a:t>
             </a:fld>
             <a:endParaRPr lang="en-US"/>
           </a:p>
@@ -8005,7 +8569,7 @@
           <a:p>
             <a:fld id="{23E2BD91-2AE8-487A-BD5C-78BC9B3F7C4B}" type="datetime1">
               <a:rPr lang="en-US" smtClean="0"/>
-              <a:t>8/21/2024</a:t>
+              <a:t>9/12/2024</a:t>
             </a:fld>
             <a:endParaRPr lang="en-US"/>
           </a:p>
@@ -8730,7 +9294,7 @@
           <a:p>
             <a:fld id="{23E2BD91-2AE8-487A-BD5C-78BC9B3F7C4B}" type="datetime1">
               <a:rPr lang="en-US" smtClean="0"/>
-              <a:t>8/21/2024</a:t>
+              <a:t>9/12/2024</a:t>
             </a:fld>
             <a:endParaRPr lang="en-US" dirty="0"/>
           </a:p>
@@ -8951,7 +9515,7 @@
           <a:p>
             <a:fld id="{23E2BD91-2AE8-487A-BD5C-78BC9B3F7C4B}" type="datetime1">
               <a:rPr lang="en-US" smtClean="0"/>
-              <a:t>8/21/2024</a:t>
+              <a:t>9/12/2024</a:t>
             </a:fld>
             <a:endParaRPr lang="en-US"/>
           </a:p>
@@ -9283,7 +9847,7 @@
           <a:p>
             <a:fld id="{23E2BD91-2AE8-487A-BD5C-78BC9B3F7C4B}" type="datetime1">
               <a:rPr lang="en-US" smtClean="0"/>
-              <a:t>8/21/2024</a:t>
+              <a:t>9/12/2024</a:t>
             </a:fld>
             <a:endParaRPr lang="en-US"/>
           </a:p>

</xml_diff>

<commit_message>
Updates for Week 14-15: progress slides + literature notes
</commit_message>
<xml_diff>
--- a/progress.pptx
+++ b/progress.pptx
@@ -5,10 +5,10 @@
     <p:sldMasterId id="2147483757" r:id="rId1"/>
   </p:sldMasterIdLst>
   <p:notesMasterIdLst>
-    <p:notesMasterId r:id="rId21"/>
+    <p:notesMasterId r:id="rId25"/>
   </p:notesMasterIdLst>
   <p:handoutMasterIdLst>
-    <p:handoutMasterId r:id="rId22"/>
+    <p:handoutMasterId r:id="rId26"/>
   </p:handoutMasterIdLst>
   <p:sldIdLst>
     <p:sldId id="444" r:id="rId2"/>
@@ -30,11 +30,15 @@
     <p:sldId id="462" r:id="rId18"/>
     <p:sldId id="464" r:id="rId19"/>
     <p:sldId id="465" r:id="rId20"/>
+    <p:sldId id="466" r:id="rId21"/>
+    <p:sldId id="467" r:id="rId22"/>
+    <p:sldId id="468" r:id="rId23"/>
+    <p:sldId id="469" r:id="rId24"/>
   </p:sldIdLst>
   <p:sldSz cx="9144000" cy="6858000" type="letter"/>
   <p:notesSz cx="7104063" cy="10234613"/>
   <p:custDataLst>
-    <p:tags r:id="rId23"/>
+    <p:tags r:id="rId27"/>
   </p:custDataLst>
   <p:defaultTextStyle>
     <a:defPPr>
@@ -185,6 +189,10 @@
             <p14:sldId id="462"/>
             <p14:sldId id="464"/>
             <p14:sldId id="465"/>
+            <p14:sldId id="466"/>
+            <p14:sldId id="467"/>
+            <p14:sldId id="468"/>
+            <p14:sldId id="469"/>
           </p14:sldIdLst>
         </p14:section>
       </p14:sectionLst>
@@ -368,7 +376,7 @@
             </a:pPr>
             <a:fld id="{745D068B-BA4C-407E-9F02-D48656DCD747}" type="datetime1">
               <a:rPr lang="en-US" smtClean="0"/>
-              <a:t>9/12/2024</a:t>
+              <a:t>9/13/2024</a:t>
             </a:fld>
             <a:endParaRPr lang="de-DE"/>
           </a:p>
@@ -749,7 +757,7 @@
             </a:pPr>
             <a:fld id="{CF17843B-419B-4348-87FD-F8F5051D43BD}" type="datetime1">
               <a:rPr lang="en-US" smtClean="0"/>
-              <a:t>9/12/2024</a:t>
+              <a:t>9/13/2024</a:t>
             </a:fld>
             <a:endParaRPr lang="de-DE"/>
           </a:p>
@@ -1863,7 +1871,7 @@
           <a:p>
             <a:fld id="{23E2BD91-2AE8-487A-BD5C-78BC9B3F7C4B}" type="datetime1">
               <a:rPr lang="en-US" smtClean="0"/>
-              <a:t>9/12/2024</a:t>
+              <a:t>9/13/2024</a:t>
             </a:fld>
             <a:endParaRPr lang="en-US"/>
           </a:p>
@@ -2083,7 +2091,7 @@
           <a:p>
             <a:fld id="{07206E0C-B25D-427B-B02C-AAD12CE67799}" type="datetime1">
               <a:rPr lang="en-US" smtClean="0"/>
-              <a:t>9/12/2024</a:t>
+              <a:t>9/13/2024</a:t>
             </a:fld>
             <a:endParaRPr lang="en-US"/>
           </a:p>
@@ -2629,7 +2637,7 @@
           <a:p>
             <a:fld id="{743C97FD-72C7-4C51-9020-5131B0C1B598}" type="datetime1">
               <a:rPr lang="en-US" smtClean="0"/>
-              <a:t>9/12/2024</a:t>
+              <a:t>9/13/2024</a:t>
             </a:fld>
             <a:endParaRPr lang="en-US"/>
           </a:p>
@@ -3748,7 +3756,7 @@
           <a:p>
             <a:fld id="{23E2BD91-2AE8-487A-BD5C-78BC9B3F7C4B}" type="datetime1">
               <a:rPr lang="en-US" smtClean="0"/>
-              <a:t>9/12/2024</a:t>
+              <a:t>9/13/2024</a:t>
             </a:fld>
             <a:endParaRPr lang="en-US"/>
           </a:p>
@@ -3972,7 +3980,7 @@
           <a:p>
             <a:fld id="{23E2BD91-2AE8-487A-BD5C-78BC9B3F7C4B}" type="datetime1">
               <a:rPr lang="en-US" smtClean="0"/>
-              <a:t>9/12/2024</a:t>
+              <a:t>9/13/2024</a:t>
             </a:fld>
             <a:endParaRPr lang="en-US"/>
           </a:p>
@@ -4268,7 +4276,7 @@
           <a:p>
             <a:fld id="{23E2BD91-2AE8-487A-BD5C-78BC9B3F7C4B}" type="datetime1">
               <a:rPr lang="en-US" smtClean="0"/>
-              <a:t>9/12/2024</a:t>
+              <a:t>9/13/2024</a:t>
             </a:fld>
             <a:endParaRPr lang="en-US"/>
           </a:p>
@@ -4577,7 +4585,7 @@
           <a:p>
             <a:fld id="{23E2BD91-2AE8-487A-BD5C-78BC9B3F7C4B}" type="datetime1">
               <a:rPr lang="en-US" smtClean="0"/>
-              <a:t>9/12/2024</a:t>
+              <a:t>9/13/2024</a:t>
             </a:fld>
             <a:endParaRPr lang="en-US" dirty="0"/>
           </a:p>
@@ -4894,7 +4902,7 @@
           <a:p>
             <a:fld id="{23E2BD91-2AE8-487A-BD5C-78BC9B3F7C4B}" type="datetime1">
               <a:rPr lang="en-US" smtClean="0"/>
-              <a:t>9/12/2024</a:t>
+              <a:t>9/13/2024</a:t>
             </a:fld>
             <a:endParaRPr lang="en-US"/>
           </a:p>
@@ -5351,7 +5359,7 @@
           <a:p>
             <a:fld id="{23E2BD91-2AE8-487A-BD5C-78BC9B3F7C4B}" type="datetime1">
               <a:rPr lang="en-US" smtClean="0"/>
-              <a:t>9/12/2024</a:t>
+              <a:t>9/13/2024</a:t>
             </a:fld>
             <a:endParaRPr lang="en-US"/>
           </a:p>
@@ -5726,7 +5734,7 @@
           <a:p>
             <a:fld id="{23E2BD91-2AE8-487A-BD5C-78BC9B3F7C4B}" type="datetime1">
               <a:rPr lang="en-US" smtClean="0"/>
-              <a:t>9/12/2024</a:t>
+              <a:t>9/13/2024</a:t>
             </a:fld>
             <a:endParaRPr lang="en-US"/>
           </a:p>
@@ -6048,7 +6056,7 @@
           <a:p>
             <a:fld id="{23E2BD91-2AE8-487A-BD5C-78BC9B3F7C4B}" type="datetime1">
               <a:rPr lang="en-US" smtClean="0"/>
-              <a:t>9/12/2024</a:t>
+              <a:t>9/13/2024</a:t>
             </a:fld>
             <a:endParaRPr lang="en-US"/>
           </a:p>
@@ -6272,7 +6280,7 @@
           <a:p>
             <a:fld id="{23E2BD91-2AE8-487A-BD5C-78BC9B3F7C4B}" type="datetime1">
               <a:rPr lang="en-US" smtClean="0"/>
-              <a:t>9/12/2024</a:t>
+              <a:t>9/13/2024</a:t>
             </a:fld>
             <a:endParaRPr lang="en-US"/>
           </a:p>
@@ -6512,7 +6520,10 @@
               <a:rPr lang="en-US" sz="2000" dirty="0" err="1"/>
               <a:t>flucturation</a:t>
             </a:r>
-            <a:endParaRPr lang="en-US" sz="2000" dirty="0"/>
+            <a:r>
+              <a:rPr lang="en-US" sz="2000" dirty="0"/>
+              <a:t> (error correction)</a:t>
+            </a:r>
           </a:p>
           <a:p>
             <a:pPr lvl="3"/>
@@ -6546,13 +6557,8 @@
             <a:pPr lvl="3"/>
             <a:r>
               <a:rPr lang="en-US" sz="2000" dirty="0"/>
-              <a:t>Reduce bits required for </a:t>
-            </a:r>
-            <a:r>
-              <a:rPr lang="en-US" sz="2000"/>
-              <a:t>coupling strength</a:t>
-            </a:r>
-            <a:endParaRPr lang="en-US" sz="2000" dirty="0"/>
+              <a:t>Reduce bits required for coupling strength</a:t>
+            </a:r>
           </a:p>
           <a:p>
             <a:pPr lvl="2"/>
@@ -6633,7 +6639,7 @@
           <a:p>
             <a:fld id="{23E2BD91-2AE8-487A-BD5C-78BC9B3F7C4B}" type="datetime1">
               <a:rPr lang="en-US" smtClean="0"/>
-              <a:t>9/12/2024</a:t>
+              <a:t>9/13/2024</a:t>
             </a:fld>
             <a:endParaRPr lang="en-US"/>
           </a:p>
@@ -6809,7 +6815,7 @@
           <a:p>
             <a:fld id="{5C914FEA-A00B-4EE3-9815-260C78B275ED}" type="datetime1">
               <a:rPr lang="en-US" smtClean="0"/>
-              <a:t>9/12/2024</a:t>
+              <a:t>9/13/2024</a:t>
             </a:fld>
             <a:endParaRPr lang="en-US"/>
           </a:p>
@@ -6884,6 +6890,2465 @@
     <p:extLst>
       <p:ext uri="{BB962C8B-B14F-4D97-AF65-F5344CB8AC3E}">
         <p14:creationId xmlns:p14="http://schemas.microsoft.com/office/powerpoint/2010/main" val="697673126"/>
+      </p:ext>
+    </p:extLst>
+  </p:cSld>
+  <p:clrMapOvr>
+    <a:masterClrMapping/>
+  </p:clrMapOvr>
+</p:sld>
+</file>
+
+<file path=ppt/slides/slide20.xml><?xml version="1.0" encoding="utf-8"?>
+<p:sld xmlns:a="http://schemas.openxmlformats.org/drawingml/2006/main" xmlns:r="http://schemas.openxmlformats.org/officeDocument/2006/relationships" xmlns:p="http://schemas.openxmlformats.org/presentationml/2006/main">
+  <p:cSld>
+    <p:spTree>
+      <p:nvGrpSpPr>
+        <p:cNvPr id="1" name=""/>
+        <p:cNvGrpSpPr/>
+        <p:nvPr/>
+      </p:nvGrpSpPr>
+      <p:grpSpPr>
+        <a:xfrm>
+          <a:off x="0" y="0"/>
+          <a:ext cx="0" cy="0"/>
+          <a:chOff x="0" y="0"/>
+          <a:chExt cx="0" cy="0"/>
+        </a:xfrm>
+      </p:grpSpPr>
+      <mc:AlternateContent xmlns:mc="http://schemas.openxmlformats.org/markup-compatibility/2006">
+        <mc:Choice xmlns:a14="http://schemas.microsoft.com/office/drawing/2010/main" Requires="a14">
+          <p:sp>
+            <p:nvSpPr>
+              <p:cNvPr id="2" name="Content Placeholder 1">
+                <a:extLst>
+                  <a:ext uri="{FF2B5EF4-FFF2-40B4-BE49-F238E27FC236}">
+                    <a16:creationId xmlns:a16="http://schemas.microsoft.com/office/drawing/2014/main" id="{6EB5EAB9-8DEF-2D12-37F2-22C55C700DE3}"/>
+                  </a:ext>
+                </a:extLst>
+              </p:cNvPr>
+              <p:cNvSpPr>
+                <a:spLocks noGrp="1"/>
+              </p:cNvSpPr>
+              <p:nvPr>
+                <p:ph idx="1"/>
+              </p:nvPr>
+            </p:nvSpPr>
+            <p:spPr>
+              <a:xfrm>
+                <a:off x="250825" y="1389063"/>
+                <a:ext cx="8642350" cy="4967287"/>
+              </a:xfrm>
+            </p:spPr>
+            <p:txBody>
+              <a:bodyPr/>
+              <a:lstStyle/>
+              <a:p>
+                <a:pPr marL="0" marR="0" lvl="0" indent="0">
+                  <a:lnSpc>
+                    <a:spcPct val="115000"/>
+                  </a:lnSpc>
+                  <a:spcBef>
+                    <a:spcPts val="0"/>
+                  </a:spcBef>
+                  <a:spcAft>
+                    <a:spcPts val="0"/>
+                  </a:spcAft>
+                  <a:buNone/>
+                </a:pPr>
+                <a:r>
+                  <a:rPr lang="en-US" sz="1800" b="1" kern="100" dirty="0">
+                    <a:effectLst/>
+                    <a:latin typeface="Aptos" panose="020B0004020202020204" pitchFamily="34" charset="0"/>
+                    <a:ea typeface="DengXian" panose="02010600030101010101" pitchFamily="2" charset="-122"/>
+                    <a:cs typeface="Times New Roman" panose="02020603050405020304" pitchFamily="18" charset="0"/>
+                  </a:rPr>
+                  <a:t>Advantage: </a:t>
+                </a:r>
+                <a:r>
+                  <a:rPr lang="en-US" sz="1800" kern="100" dirty="0">
+                    <a:effectLst/>
+                    <a:latin typeface="Aptos" panose="020B0004020202020204" pitchFamily="34" charset="0"/>
+                    <a:ea typeface="DengXian" panose="02010600030101010101" pitchFamily="2" charset="-122"/>
+                    <a:cs typeface="Times New Roman" panose="02020603050405020304" pitchFamily="18" charset="0"/>
+                  </a:rPr>
+                  <a:t>Scaling</a:t>
+                </a:r>
+                <a:r>
+                  <a:rPr lang="en-US" sz="1800" b="1" kern="100" dirty="0">
+                    <a:effectLst/>
+                    <a:latin typeface="Aptos" panose="020B0004020202020204" pitchFamily="34" charset="0"/>
+                    <a:ea typeface="DengXian" panose="02010600030101010101" pitchFamily="2" charset="-122"/>
+                    <a:cs typeface="Times New Roman" panose="02020603050405020304" pitchFamily="18" charset="0"/>
+                  </a:rPr>
+                  <a:t> </a:t>
+                </a:r>
+              </a:p>
+              <a:p>
+                <a:pPr marL="0" marR="0" lvl="0" indent="0">
+                  <a:lnSpc>
+                    <a:spcPct val="115000"/>
+                  </a:lnSpc>
+                  <a:spcBef>
+                    <a:spcPts val="0"/>
+                  </a:spcBef>
+                  <a:spcAft>
+                    <a:spcPts val="0"/>
+                  </a:spcAft>
+                  <a:buNone/>
+                </a:pPr>
+                <a:r>
+                  <a:rPr lang="en-US" sz="1800" b="1" kern="100" dirty="0">
+                    <a:latin typeface="Aptos" panose="020B0004020202020204" pitchFamily="34" charset="0"/>
+                    <a:ea typeface="DengXian" panose="02010600030101010101" pitchFamily="2" charset="-122"/>
+                    <a:cs typeface="Times New Roman" panose="02020603050405020304" pitchFamily="18" charset="0"/>
+                  </a:rPr>
+                  <a:t>Disadvantage: </a:t>
+                </a:r>
+                <a:r>
+                  <a:rPr lang="en-US" sz="1800" kern="100" dirty="0">
+                    <a:latin typeface="Aptos" panose="020B0004020202020204" pitchFamily="34" charset="0"/>
+                    <a:ea typeface="DengXian" panose="02010600030101010101" pitchFamily="2" charset="-122"/>
+                    <a:cs typeface="Times New Roman" panose="02020603050405020304" pitchFamily="18" charset="0"/>
+                  </a:rPr>
+                  <a:t>bulky</a:t>
+                </a:r>
+                <a:r>
+                  <a:rPr lang="en-US" sz="1800" b="1" kern="100" dirty="0">
+                    <a:latin typeface="Aptos" panose="020B0004020202020204" pitchFamily="34" charset="0"/>
+                    <a:ea typeface="DengXian" panose="02010600030101010101" pitchFamily="2" charset="-122"/>
+                    <a:cs typeface="Times New Roman" panose="02020603050405020304" pitchFamily="18" charset="0"/>
+                  </a:rPr>
+                  <a:t>, </a:t>
+                </a:r>
+                <a:r>
+                  <a:rPr lang="en-US" sz="1800" kern="100" dirty="0">
+                    <a:effectLst/>
+                    <a:latin typeface="Aptos" panose="020B0004020202020204" pitchFamily="34" charset="0"/>
+                    <a:ea typeface="DengXian" panose="02010600030101010101" pitchFamily="2" charset="-122"/>
+                    <a:cs typeface="Times New Roman" panose="02020603050405020304" pitchFamily="18" charset="0"/>
+                  </a:rPr>
+                  <a:t>amplitude homogeneity </a:t>
+                </a:r>
+                <a:r>
+                  <a:rPr lang="en-US" sz="1800" kern="100" dirty="0">
+                    <a:effectLst/>
+                    <a:latin typeface="Aptos" panose="020B0004020202020204" pitchFamily="34" charset="0"/>
+                    <a:ea typeface="DengXian" panose="02010600030101010101" pitchFamily="2" charset="-122"/>
+                    <a:cs typeface="Times New Roman" panose="02020603050405020304" pitchFamily="18" charset="0"/>
+                    <a:sym typeface="Wingdings" panose="05000000000000000000" pitchFamily="2" charset="2"/>
+                  </a:rPr>
+                  <a:t> error correction through optimization of model with external magnetic field and addition of noise</a:t>
+                </a:r>
+                <a:endParaRPr lang="en-US" sz="1800" b="1" kern="100" dirty="0">
+                  <a:effectLst/>
+                  <a:latin typeface="Aptos" panose="020B0004020202020204" pitchFamily="34" charset="0"/>
+                  <a:ea typeface="DengXian" panose="02010600030101010101" pitchFamily="2" charset="-122"/>
+                  <a:cs typeface="Times New Roman" panose="02020603050405020304" pitchFamily="18" charset="0"/>
+                </a:endParaRPr>
+              </a:p>
+              <a:p>
+                <a:pPr marL="0" marR="0" lvl="0" indent="0">
+                  <a:lnSpc>
+                    <a:spcPct val="115000"/>
+                  </a:lnSpc>
+                  <a:spcBef>
+                    <a:spcPts val="0"/>
+                  </a:spcBef>
+                  <a:spcAft>
+                    <a:spcPts val="0"/>
+                  </a:spcAft>
+                  <a:buNone/>
+                </a:pPr>
+                <a:r>
+                  <a:rPr lang="en-US" sz="1800" b="1" kern="100" dirty="0">
+                    <a:effectLst/>
+                    <a:latin typeface="Aptos" panose="020B0004020202020204" pitchFamily="34" charset="0"/>
+                    <a:ea typeface="DengXian" panose="02010600030101010101" pitchFamily="2" charset="-122"/>
+                    <a:cs typeface="Times New Roman" panose="02020603050405020304" pitchFamily="18" charset="0"/>
+                  </a:rPr>
+                  <a:t>NTT G</a:t>
+                </a:r>
+                <a:r>
+                  <a:rPr lang="en-US" altLang="zh-CN" sz="1800" b="1" kern="100" dirty="0">
+                    <a:effectLst/>
+                    <a:latin typeface="Aptos" panose="020B0004020202020204" pitchFamily="34" charset="0"/>
+                    <a:ea typeface="DengXian" panose="02010600030101010101" pitchFamily="2" charset="-122"/>
+                    <a:cs typeface="Times New Roman" panose="02020603050405020304" pitchFamily="18" charset="0"/>
+                  </a:rPr>
+                  <a:t>roup</a:t>
+                </a:r>
+                <a:endParaRPr lang="en-US" sz="1800" b="1" kern="100" dirty="0">
+                  <a:effectLst/>
+                  <a:latin typeface="Aptos" panose="020B0004020202020204" pitchFamily="34" charset="0"/>
+                  <a:ea typeface="DengXian" panose="02010600030101010101" pitchFamily="2" charset="-122"/>
+                  <a:cs typeface="Times New Roman" panose="02020603050405020304" pitchFamily="18" charset="0"/>
+                </a:endParaRPr>
+              </a:p>
+              <a:p>
+                <a:pPr marR="0" lvl="0">
+                  <a:lnSpc>
+                    <a:spcPct val="115000"/>
+                  </a:lnSpc>
+                  <a:spcBef>
+                    <a:spcPts val="0"/>
+                  </a:spcBef>
+                  <a:spcAft>
+                    <a:spcPts val="0"/>
+                  </a:spcAft>
+                </a:pPr>
+                <a:r>
+                  <a:rPr lang="en-US" sz="1800" u="sng" kern="100" dirty="0">
+                    <a:solidFill>
+                      <a:srgbClr val="467886"/>
+                    </a:solidFill>
+                    <a:effectLst/>
+                    <a:latin typeface="Aptos" panose="020B0004020202020204" pitchFamily="34" charset="0"/>
+                    <a:ea typeface="DengXian" panose="02010600030101010101" pitchFamily="2" charset="-122"/>
+                    <a:cs typeface="Times New Roman" panose="02020603050405020304" pitchFamily="18" charset="0"/>
+                    <a:hlinkClick r:id="rId2"/>
+                  </a:rPr>
+                  <a:t>Simulating </a:t>
+                </a:r>
+                <a:r>
+                  <a:rPr lang="en-US" sz="1800" u="sng" kern="100" dirty="0" err="1">
+                    <a:solidFill>
+                      <a:srgbClr val="467886"/>
+                    </a:solidFill>
+                    <a:effectLst/>
+                    <a:latin typeface="Aptos" panose="020B0004020202020204" pitchFamily="34" charset="0"/>
+                    <a:ea typeface="DengXian" panose="02010600030101010101" pitchFamily="2" charset="-122"/>
+                    <a:cs typeface="Times New Roman" panose="02020603050405020304" pitchFamily="18" charset="0"/>
+                    <a:hlinkClick r:id="rId2"/>
+                  </a:rPr>
+                  <a:t>Ising</a:t>
+                </a:r>
+                <a:r>
+                  <a:rPr lang="en-US" sz="1800" u="sng" kern="100" dirty="0">
+                    <a:solidFill>
+                      <a:srgbClr val="467886"/>
+                    </a:solidFill>
+                    <a:effectLst/>
+                    <a:latin typeface="Aptos" panose="020B0004020202020204" pitchFamily="34" charset="0"/>
+                    <a:ea typeface="DengXian" panose="02010600030101010101" pitchFamily="2" charset="-122"/>
+                    <a:cs typeface="Times New Roman" panose="02020603050405020304" pitchFamily="18" charset="0"/>
+                    <a:hlinkClick r:id="rId2"/>
+                  </a:rPr>
+                  <a:t> spins in external magnetic fields with a network of degenerate optical parametric oscillators</a:t>
+                </a:r>
+                <a:r>
+                  <a:rPr lang="en-US" sz="1800" kern="100" dirty="0">
+                    <a:effectLst/>
+                    <a:latin typeface="Aptos" panose="020B0004020202020204" pitchFamily="34" charset="0"/>
+                    <a:ea typeface="DengXian" panose="02010600030101010101" pitchFamily="2" charset="-122"/>
+                    <a:cs typeface="Times New Roman" panose="02020603050405020304" pitchFamily="18" charset="0"/>
+                  </a:rPr>
+                  <a:t> (2020) : model with external field </a:t>
+                </a:r>
+              </a:p>
+              <a:p>
+                <a:pPr>
+                  <a:lnSpc>
+                    <a:spcPct val="115000"/>
+                  </a:lnSpc>
+                  <a:spcBef>
+                    <a:spcPts val="0"/>
+                  </a:spcBef>
+                  <a:spcAft>
+                    <a:spcPts val="800"/>
+                  </a:spcAft>
+                </a:pPr>
+                <a:r>
+                  <a:rPr lang="en-US" sz="1800" u="sng" kern="100" dirty="0">
+                    <a:solidFill>
+                      <a:srgbClr val="467886"/>
+                    </a:solidFill>
+                    <a:effectLst/>
+                    <a:latin typeface="Aptos" panose="020B0004020202020204" pitchFamily="34" charset="0"/>
+                    <a:ea typeface="DengXian" panose="02010600030101010101" pitchFamily="2" charset="-122"/>
+                    <a:cs typeface="Times New Roman" panose="02020603050405020304" pitchFamily="18" charset="0"/>
+                    <a:hlinkClick r:id="rId3"/>
+                  </a:rPr>
+                  <a:t>100,000-spin coherent </a:t>
+                </a:r>
+                <a:r>
+                  <a:rPr lang="en-US" sz="1800" u="sng" kern="100" dirty="0" err="1">
+                    <a:solidFill>
+                      <a:srgbClr val="467886"/>
+                    </a:solidFill>
+                    <a:effectLst/>
+                    <a:latin typeface="Aptos" panose="020B0004020202020204" pitchFamily="34" charset="0"/>
+                    <a:ea typeface="DengXian" panose="02010600030101010101" pitchFamily="2" charset="-122"/>
+                    <a:cs typeface="Times New Roman" panose="02020603050405020304" pitchFamily="18" charset="0"/>
+                    <a:hlinkClick r:id="rId3"/>
+                  </a:rPr>
+                  <a:t>Ising</a:t>
+                </a:r>
+                <a:r>
+                  <a:rPr lang="en-US" sz="1800" u="sng" kern="100" dirty="0">
+                    <a:solidFill>
+                      <a:srgbClr val="467886"/>
+                    </a:solidFill>
+                    <a:effectLst/>
+                    <a:latin typeface="Aptos" panose="020B0004020202020204" pitchFamily="34" charset="0"/>
+                    <a:ea typeface="DengXian" panose="02010600030101010101" pitchFamily="2" charset="-122"/>
+                    <a:cs typeface="Times New Roman" panose="02020603050405020304" pitchFamily="18" charset="0"/>
+                    <a:hlinkClick r:id="rId3"/>
+                  </a:rPr>
+                  <a:t> machine</a:t>
+                </a:r>
+                <a:r>
+                  <a:rPr lang="en-US" sz="1800" kern="100" dirty="0">
+                    <a:effectLst/>
+                    <a:latin typeface="Aptos" panose="020B0004020202020204" pitchFamily="34" charset="0"/>
+                    <a:ea typeface="DengXian" panose="02010600030101010101" pitchFamily="2" charset="-122"/>
+                    <a:cs typeface="Times New Roman" panose="02020603050405020304" pitchFamily="18" charset="0"/>
+                  </a:rPr>
+                  <a:t> (2021): scaling with time multiplexing </a:t>
+                </a:r>
+              </a:p>
+              <a:p>
+                <a:pPr marL="0" indent="0">
+                  <a:lnSpc>
+                    <a:spcPct val="115000"/>
+                  </a:lnSpc>
+                  <a:spcBef>
+                    <a:spcPts val="0"/>
+                  </a:spcBef>
+                  <a:spcAft>
+                    <a:spcPts val="800"/>
+                  </a:spcAft>
+                  <a:buNone/>
+                </a:pPr>
+                <a:r>
+                  <a:rPr lang="en-US" sz="1800" b="1" kern="100" dirty="0">
+                    <a:latin typeface="Aptos" panose="020B0004020202020204" pitchFamily="34" charset="0"/>
+                    <a:ea typeface="DengXian" panose="02010600030101010101" pitchFamily="2" charset="-122"/>
+                    <a:cs typeface="Times New Roman" panose="02020603050405020304" pitchFamily="18" charset="0"/>
+                  </a:rPr>
+                  <a:t>Yamamoto G</a:t>
+                </a:r>
+                <a:r>
+                  <a:rPr lang="en-US" altLang="zh-CN" sz="1800" b="1" kern="100" dirty="0">
+                    <a:latin typeface="Aptos" panose="020B0004020202020204" pitchFamily="34" charset="0"/>
+                    <a:ea typeface="DengXian" panose="02010600030101010101" pitchFamily="2" charset="-122"/>
+                    <a:cs typeface="Times New Roman" panose="02020603050405020304" pitchFamily="18" charset="0"/>
+                  </a:rPr>
+                  <a:t>roup</a:t>
+                </a:r>
+                <a:endParaRPr lang="en-US" sz="1800" b="1" kern="100" dirty="0">
+                  <a:latin typeface="Aptos" panose="020B0004020202020204" pitchFamily="34" charset="0"/>
+                  <a:ea typeface="DengXian" panose="02010600030101010101" pitchFamily="2" charset="-122"/>
+                  <a:cs typeface="Times New Roman" panose="02020603050405020304" pitchFamily="18" charset="0"/>
+                </a:endParaRPr>
+              </a:p>
+              <a:p>
+                <a:pPr>
+                  <a:lnSpc>
+                    <a:spcPct val="115000"/>
+                  </a:lnSpc>
+                  <a:spcBef>
+                    <a:spcPts val="0"/>
+                  </a:spcBef>
+                  <a:spcAft>
+                    <a:spcPts val="800"/>
+                  </a:spcAft>
+                </a:pPr>
+                <a:r>
+                  <a:rPr lang="en-US" sz="1800" u="sng" kern="100" dirty="0">
+                    <a:solidFill>
+                      <a:srgbClr val="467886"/>
+                    </a:solidFill>
+                    <a:effectLst/>
+                    <a:latin typeface="Aptos" panose="020B0004020202020204" pitchFamily="34" charset="0"/>
+                    <a:ea typeface="DengXian" panose="02010600030101010101" pitchFamily="2" charset="-122"/>
+                    <a:cs typeface="Times New Roman" panose="02020603050405020304" pitchFamily="18" charset="0"/>
+                    <a:hlinkClick r:id="rId4"/>
+                  </a:rPr>
+                  <a:t>Effect of Coupling Discretization on Coherent-</a:t>
+                </a:r>
+                <a:r>
+                  <a:rPr lang="en-US" sz="1800" u="sng" kern="100" dirty="0" err="1">
+                    <a:solidFill>
+                      <a:srgbClr val="467886"/>
+                    </a:solidFill>
+                    <a:effectLst/>
+                    <a:latin typeface="Aptos" panose="020B0004020202020204" pitchFamily="34" charset="0"/>
+                    <a:ea typeface="DengXian" panose="02010600030101010101" pitchFamily="2" charset="-122"/>
+                    <a:cs typeface="Times New Roman" panose="02020603050405020304" pitchFamily="18" charset="0"/>
+                    <a:hlinkClick r:id="rId4"/>
+                  </a:rPr>
+                  <a:t>Ising</a:t>
+                </a:r>
+                <a:r>
+                  <a:rPr lang="en-US" sz="1800" u="sng" kern="100" dirty="0">
+                    <a:solidFill>
+                      <a:srgbClr val="467886"/>
+                    </a:solidFill>
+                    <a:effectLst/>
+                    <a:latin typeface="Aptos" panose="020B0004020202020204" pitchFamily="34" charset="0"/>
+                    <a:ea typeface="DengXian" panose="02010600030101010101" pitchFamily="2" charset="-122"/>
+                    <a:cs typeface="Times New Roman" panose="02020603050405020304" pitchFamily="18" charset="0"/>
+                    <a:hlinkClick r:id="rId4"/>
+                  </a:rPr>
+                  <a:t>-Machine-Implemented Hopfield Model</a:t>
+                </a:r>
+                <a:r>
+                  <a:rPr lang="en-US" sz="1800" kern="100" dirty="0">
+                    <a:effectLst/>
+                    <a:latin typeface="Aptos" panose="020B0004020202020204" pitchFamily="34" charset="0"/>
+                    <a:ea typeface="DengXian" panose="02010600030101010101" pitchFamily="2" charset="-122"/>
+                    <a:cs typeface="Times New Roman" panose="02020603050405020304" pitchFamily="18" charset="0"/>
+                  </a:rPr>
+                  <a:t>(2023):</a:t>
+                </a:r>
+                <a:r>
+                  <a:rPr lang="zh-CN" altLang="en-US" sz="1800" kern="100" dirty="0">
+                    <a:effectLst/>
+                    <a:latin typeface="Aptos" panose="020B0004020202020204" pitchFamily="34" charset="0"/>
+                    <a:ea typeface="DengXian" panose="02010600030101010101" pitchFamily="2" charset="-122"/>
+                    <a:cs typeface="Times New Roman" panose="02020603050405020304" pitchFamily="18" charset="0"/>
+                  </a:rPr>
+                  <a:t> </a:t>
+                </a:r>
+                <a:r>
+                  <a:rPr lang="en-US" sz="1800" kern="100" dirty="0">
+                    <a:effectLst/>
+                    <a:latin typeface="Aptos" panose="020B0004020202020204" pitchFamily="34" charset="0"/>
+                    <a:ea typeface="DengXian" panose="02010600030101010101" pitchFamily="2" charset="-122"/>
+                    <a:cs typeface="Times New Roman" panose="02020603050405020304" pitchFamily="18" charset="0"/>
+                  </a:rPr>
+                  <a:t>reduce the number of bits of coupling strength</a:t>
+                </a:r>
+              </a:p>
+              <a:p>
+                <a:pPr marL="0" marR="0" lvl="0" indent="0">
+                  <a:lnSpc>
+                    <a:spcPct val="115000"/>
+                  </a:lnSpc>
+                  <a:spcBef>
+                    <a:spcPts val="0"/>
+                  </a:spcBef>
+                  <a:spcAft>
+                    <a:spcPts val="800"/>
+                  </a:spcAft>
+                  <a:buNone/>
+                </a:pPr>
+                <a:r>
+                  <a:rPr lang="en-US" sz="1800" b="1" kern="100" dirty="0">
+                    <a:latin typeface="Aptos" panose="020B0004020202020204" pitchFamily="34" charset="0"/>
+                    <a:ea typeface="DengXian" panose="02010600030101010101" pitchFamily="2" charset="-122"/>
+                    <a:cs typeface="Times New Roman" panose="02020603050405020304" pitchFamily="18" charset="0"/>
+                  </a:rPr>
+                  <a:t>Yamamoto, NTT and </a:t>
+                </a:r>
+                <a:r>
+                  <a:rPr lang="en-US" sz="1800" b="1" kern="100" dirty="0" err="1">
+                    <a:latin typeface="Aptos" panose="020B0004020202020204" pitchFamily="34" charset="0"/>
+                    <a:ea typeface="DengXian" panose="02010600030101010101" pitchFamily="2" charset="-122"/>
+                    <a:cs typeface="Times New Roman" panose="02020603050405020304" pitchFamily="18" charset="0"/>
+                  </a:rPr>
+                  <a:t>Standford</a:t>
+                </a:r>
+                <a:r>
+                  <a:rPr lang="en-US" sz="1800" b="1" kern="100" dirty="0">
+                    <a:latin typeface="Aptos" panose="020B0004020202020204" pitchFamily="34" charset="0"/>
+                    <a:ea typeface="DengXian" panose="02010600030101010101" pitchFamily="2" charset="-122"/>
+                    <a:cs typeface="Times New Roman" panose="02020603050405020304" pitchFamily="18" charset="0"/>
+                  </a:rPr>
+                  <a:t> </a:t>
+                </a:r>
+              </a:p>
+              <a:p>
+                <a:pPr>
+                  <a:lnSpc>
+                    <a:spcPct val="115000"/>
+                  </a:lnSpc>
+                  <a:spcBef>
+                    <a:spcPts val="0"/>
+                  </a:spcBef>
+                  <a:spcAft>
+                    <a:spcPts val="0"/>
+                  </a:spcAft>
+                </a:pPr>
+                <a:r>
+                  <a:rPr lang="en-US" sz="1800" u="sng" kern="100" dirty="0">
+                    <a:solidFill>
+                      <a:srgbClr val="467886"/>
+                    </a:solidFill>
+                    <a:effectLst/>
+                    <a:latin typeface="Aptos" panose="020B0004020202020204" pitchFamily="34" charset="0"/>
+                    <a:ea typeface="DengXian" panose="02010600030101010101" pitchFamily="2" charset="-122"/>
+                    <a:cs typeface="Times New Roman" panose="02020603050405020304" pitchFamily="18" charset="0"/>
+                    <a:hlinkClick r:id="rId5"/>
+                  </a:rPr>
+                  <a:t>Skew-Gaussian model of small-photon-number coherent </a:t>
+                </a:r>
+                <a:r>
+                  <a:rPr lang="en-US" sz="1800" u="sng" kern="100" dirty="0" err="1">
+                    <a:solidFill>
+                      <a:srgbClr val="467886"/>
+                    </a:solidFill>
+                    <a:effectLst/>
+                    <a:latin typeface="Aptos" panose="020B0004020202020204" pitchFamily="34" charset="0"/>
+                    <a:ea typeface="DengXian" panose="02010600030101010101" pitchFamily="2" charset="-122"/>
+                    <a:cs typeface="Times New Roman" panose="02020603050405020304" pitchFamily="18" charset="0"/>
+                    <a:hlinkClick r:id="rId5"/>
+                  </a:rPr>
+                  <a:t>Ising</a:t>
+                </a:r>
+                <a:r>
+                  <a:rPr lang="en-US" sz="1800" u="sng" kern="100" dirty="0">
+                    <a:solidFill>
+                      <a:srgbClr val="467886"/>
+                    </a:solidFill>
+                    <a:effectLst/>
+                    <a:latin typeface="Aptos" panose="020B0004020202020204" pitchFamily="34" charset="0"/>
+                    <a:ea typeface="DengXian" panose="02010600030101010101" pitchFamily="2" charset="-122"/>
+                    <a:cs typeface="Times New Roman" panose="02020603050405020304" pitchFamily="18" charset="0"/>
+                    <a:hlinkClick r:id="rId5"/>
+                  </a:rPr>
+                  <a:t> machines</a:t>
+                </a:r>
+                <a:r>
+                  <a:rPr lang="en-US" sz="1800" kern="100" dirty="0">
+                    <a:effectLst/>
+                    <a:latin typeface="Aptos" panose="020B0004020202020204" pitchFamily="34" charset="0"/>
+                    <a:ea typeface="DengXian" panose="02010600030101010101" pitchFamily="2" charset="-122"/>
+                    <a:cs typeface="Times New Roman" panose="02020603050405020304" pitchFamily="18" charset="0"/>
+                  </a:rPr>
+                  <a:t> (2024): control of amplitude homogeneity, </a:t>
+                </a:r>
+                <a14:m>
+                  <m:oMath xmlns:m="http://schemas.openxmlformats.org/officeDocument/2006/math">
+                    <m:sSup>
+                      <m:sSupPr>
+                        <m:ctrlPr>
+                          <a:rPr lang="en-US" sz="1800" smtClean="0">
+                            <a:solidFill>
+                              <a:srgbClr val="836967"/>
+                            </a:solidFill>
+                            <a:effectLst/>
+                            <a:latin typeface="Cambria Math" panose="02040503050406030204" pitchFamily="18" charset="0"/>
+                          </a:rPr>
+                        </m:ctrlPr>
+                      </m:sSupPr>
+                      <m:e>
+                        <m:r>
+                          <a:rPr lang="en-US" sz="1800" i="1" smtClean="0">
+                            <a:effectLst/>
+                            <a:latin typeface="Cambria Math" panose="02040503050406030204" pitchFamily="18" charset="0"/>
+                          </a:rPr>
+                          <m:t>𝜒</m:t>
+                        </m:r>
+                      </m:e>
+                      <m:sup>
+                        <m:d>
+                          <m:dPr>
+                            <m:ctrlPr>
+                              <a:rPr lang="en-US" sz="1800" i="1" smtClean="0">
+                                <a:solidFill>
+                                  <a:srgbClr val="836967"/>
+                                </a:solidFill>
+                                <a:effectLst/>
+                                <a:latin typeface="Cambria Math" panose="02040503050406030204" pitchFamily="18" charset="0"/>
+                              </a:rPr>
+                            </m:ctrlPr>
+                          </m:dPr>
+                          <m:e>
+                            <m:r>
+                              <a:rPr lang="en-US" sz="1800" i="0" smtClean="0">
+                                <a:effectLst/>
+                                <a:latin typeface="Cambria Math" panose="02040503050406030204" pitchFamily="18" charset="0"/>
+                              </a:rPr>
+                              <m:t>2</m:t>
+                            </m:r>
+                          </m:e>
+                        </m:d>
+                      </m:sup>
+                    </m:sSup>
+                  </m:oMath>
+                </a14:m>
+                <a:r>
+                  <a:rPr lang="en-US" sz="1800" dirty="0">
+                    <a:effectLst/>
+                    <a:latin typeface="Aptos" panose="020B0004020202020204" pitchFamily="34" charset="0"/>
+                    <a:ea typeface="DengXian" panose="02010600030101010101" pitchFamily="2" charset="-122"/>
+                    <a:cs typeface="Times New Roman" panose="02020603050405020304" pitchFamily="18" charset="0"/>
+                  </a:rPr>
+                  <a:t>DOPOs + two third-order fluctuation products </a:t>
+                </a:r>
+                <a:endParaRPr lang="en-US" sz="1800" kern="100" dirty="0">
+                  <a:effectLst/>
+                  <a:latin typeface="Aptos" panose="020B0004020202020204" pitchFamily="34" charset="0"/>
+                  <a:ea typeface="DengXian" panose="02010600030101010101" pitchFamily="2" charset="-122"/>
+                  <a:cs typeface="Times New Roman" panose="02020603050405020304" pitchFamily="18" charset="0"/>
+                </a:endParaRPr>
+              </a:p>
+              <a:p>
+                <a:pPr>
+                  <a:lnSpc>
+                    <a:spcPct val="115000"/>
+                  </a:lnSpc>
+                  <a:spcBef>
+                    <a:spcPts val="0"/>
+                  </a:spcBef>
+                  <a:spcAft>
+                    <a:spcPts val="800"/>
+                  </a:spcAft>
+                </a:pPr>
+                <a:endParaRPr lang="en-US" sz="1800" b="1" kern="100" dirty="0">
+                  <a:latin typeface="Aptos" panose="020B0004020202020204" pitchFamily="34" charset="0"/>
+                  <a:ea typeface="DengXian" panose="02010600030101010101" pitchFamily="2" charset="-122"/>
+                  <a:cs typeface="Times New Roman" panose="02020603050405020304" pitchFamily="18" charset="0"/>
+                </a:endParaRPr>
+              </a:p>
+              <a:p>
+                <a:pPr>
+                  <a:lnSpc>
+                    <a:spcPct val="115000"/>
+                  </a:lnSpc>
+                  <a:spcBef>
+                    <a:spcPts val="0"/>
+                  </a:spcBef>
+                  <a:spcAft>
+                    <a:spcPts val="800"/>
+                  </a:spcAft>
+                </a:pPr>
+                <a:endParaRPr lang="en-US" sz="1800" b="1" kern="100" dirty="0">
+                  <a:latin typeface="Aptos" panose="020B0004020202020204" pitchFamily="34" charset="0"/>
+                  <a:ea typeface="DengXian" panose="02010600030101010101" pitchFamily="2" charset="-122"/>
+                  <a:cs typeface="Times New Roman" panose="02020603050405020304" pitchFamily="18" charset="0"/>
+                </a:endParaRPr>
+              </a:p>
+              <a:p>
+                <a:pPr marL="0" marR="0" lvl="0" indent="0">
+                  <a:lnSpc>
+                    <a:spcPct val="115000"/>
+                  </a:lnSpc>
+                  <a:spcBef>
+                    <a:spcPts val="0"/>
+                  </a:spcBef>
+                  <a:spcAft>
+                    <a:spcPts val="800"/>
+                  </a:spcAft>
+                  <a:buNone/>
+                </a:pPr>
+                <a:endParaRPr lang="en-US" sz="1800" kern="100" dirty="0">
+                  <a:effectLst/>
+                  <a:latin typeface="Aptos" panose="020B0004020202020204" pitchFamily="34" charset="0"/>
+                  <a:ea typeface="DengXian" panose="02010600030101010101" pitchFamily="2" charset="-122"/>
+                  <a:cs typeface="Times New Roman" panose="02020603050405020304" pitchFamily="18" charset="0"/>
+                </a:endParaRPr>
+              </a:p>
+              <a:p>
+                <a:pPr marL="0" indent="0">
+                  <a:lnSpc>
+                    <a:spcPct val="115000"/>
+                  </a:lnSpc>
+                  <a:spcBef>
+                    <a:spcPts val="0"/>
+                  </a:spcBef>
+                  <a:spcAft>
+                    <a:spcPts val="800"/>
+                  </a:spcAft>
+                  <a:buNone/>
+                </a:pPr>
+                <a:endParaRPr lang="en-US" sz="1800" b="1" kern="100" dirty="0">
+                  <a:latin typeface="Aptos" panose="020B0004020202020204" pitchFamily="34" charset="0"/>
+                  <a:ea typeface="DengXian" panose="02010600030101010101" pitchFamily="2" charset="-122"/>
+                  <a:cs typeface="Times New Roman" panose="02020603050405020304" pitchFamily="18" charset="0"/>
+                </a:endParaRPr>
+              </a:p>
+              <a:p>
+                <a:pPr marL="0" marR="0" lvl="0" indent="0">
+                  <a:lnSpc>
+                    <a:spcPct val="115000"/>
+                  </a:lnSpc>
+                  <a:spcBef>
+                    <a:spcPts val="0"/>
+                  </a:spcBef>
+                  <a:spcAft>
+                    <a:spcPts val="800"/>
+                  </a:spcAft>
+                  <a:buNone/>
+                </a:pPr>
+                <a:endParaRPr lang="en-US" sz="1800" kern="100" dirty="0">
+                  <a:effectLst/>
+                  <a:latin typeface="Aptos" panose="020B0004020202020204" pitchFamily="34" charset="0"/>
+                  <a:ea typeface="DengXian" panose="02010600030101010101" pitchFamily="2" charset="-122"/>
+                  <a:cs typeface="Times New Roman" panose="02020603050405020304" pitchFamily="18" charset="0"/>
+                </a:endParaRPr>
+              </a:p>
+            </p:txBody>
+          </p:sp>
+        </mc:Choice>
+        <mc:Fallback>
+          <p:sp>
+            <p:nvSpPr>
+              <p:cNvPr id="2" name="Content Placeholder 1">
+                <a:extLst>
+                  <a:ext uri="{FF2B5EF4-FFF2-40B4-BE49-F238E27FC236}">
+                    <a16:creationId xmlns:a16="http://schemas.microsoft.com/office/drawing/2014/main" id="{6EB5EAB9-8DEF-2D12-37F2-22C55C700DE3}"/>
+                  </a:ext>
+                </a:extLst>
+              </p:cNvPr>
+              <p:cNvSpPr>
+                <a:spLocks noGrp="1" noRot="1" noChangeAspect="1" noMove="1" noResize="1" noEditPoints="1" noAdjustHandles="1" noChangeArrowheads="1" noChangeShapeType="1" noTextEdit="1"/>
+              </p:cNvSpPr>
+              <p:nvPr>
+                <p:ph idx="1"/>
+              </p:nvPr>
+            </p:nvSpPr>
+            <p:spPr>
+              <a:xfrm>
+                <a:off x="250825" y="1389063"/>
+                <a:ext cx="8642350" cy="4967287"/>
+              </a:xfrm>
+              <a:blipFill>
+                <a:blip r:embed="rId6"/>
+                <a:stretch>
+                  <a:fillRect l="-1622" t="-123" r="-917" b="-1104"/>
+                </a:stretch>
+              </a:blipFill>
+            </p:spPr>
+            <p:txBody>
+              <a:bodyPr/>
+              <a:lstStyle/>
+              <a:p>
+                <a:r>
+                  <a:rPr lang="en-US">
+                    <a:noFill/>
+                  </a:rPr>
+                  <a:t> </a:t>
+                </a:r>
+              </a:p>
+            </p:txBody>
+          </p:sp>
+        </mc:Fallback>
+      </mc:AlternateContent>
+      <p:sp>
+        <p:nvSpPr>
+          <p:cNvPr id="3" name="Title 2">
+            <a:extLst>
+              <a:ext uri="{FF2B5EF4-FFF2-40B4-BE49-F238E27FC236}">
+                <a16:creationId xmlns:a16="http://schemas.microsoft.com/office/drawing/2014/main" id="{786ADAA7-7199-17BC-746B-AA5AB1955862}"/>
+              </a:ext>
+            </a:extLst>
+          </p:cNvPr>
+          <p:cNvSpPr>
+            <a:spLocks noGrp="1"/>
+          </p:cNvSpPr>
+          <p:nvPr>
+            <p:ph type="title"/>
+          </p:nvPr>
+        </p:nvSpPr>
+        <p:spPr/>
+        <p:txBody>
+          <a:bodyPr/>
+          <a:lstStyle/>
+          <a:p>
+            <a:r>
+              <a:rPr lang="en-US" dirty="0"/>
+              <a:t>DOPO Based CIM </a:t>
+            </a:r>
+          </a:p>
+        </p:txBody>
+      </p:sp>
+      <p:sp>
+        <p:nvSpPr>
+          <p:cNvPr id="4" name="Date Placeholder 3">
+            <a:extLst>
+              <a:ext uri="{FF2B5EF4-FFF2-40B4-BE49-F238E27FC236}">
+                <a16:creationId xmlns:a16="http://schemas.microsoft.com/office/drawing/2014/main" id="{9643FF1E-33C8-875F-BD5A-6F2FFE4D9974}"/>
+              </a:ext>
+            </a:extLst>
+          </p:cNvPr>
+          <p:cNvSpPr>
+            <a:spLocks noGrp="1"/>
+          </p:cNvSpPr>
+          <p:nvPr>
+            <p:ph type="dt" sz="half" idx="10"/>
+          </p:nvPr>
+        </p:nvSpPr>
+        <p:spPr/>
+        <p:txBody>
+          <a:bodyPr/>
+          <a:lstStyle/>
+          <a:p>
+            <a:fld id="{23E2BD91-2AE8-487A-BD5C-78BC9B3F7C4B}" type="datetime1">
+              <a:rPr lang="en-US" smtClean="0"/>
+              <a:t>9/13/2024</a:t>
+            </a:fld>
+            <a:endParaRPr lang="en-US"/>
+          </a:p>
+        </p:txBody>
+      </p:sp>
+      <p:sp>
+        <p:nvSpPr>
+          <p:cNvPr id="5" name="Footer Placeholder 4">
+            <a:extLst>
+              <a:ext uri="{FF2B5EF4-FFF2-40B4-BE49-F238E27FC236}">
+                <a16:creationId xmlns:a16="http://schemas.microsoft.com/office/drawing/2014/main" id="{88CCB2F7-2756-3C53-CA13-CF331292AB44}"/>
+              </a:ext>
+            </a:extLst>
+          </p:cNvPr>
+          <p:cNvSpPr>
+            <a:spLocks noGrp="1"/>
+          </p:cNvSpPr>
+          <p:nvPr>
+            <p:ph type="ftr" sz="quarter" idx="11"/>
+          </p:nvPr>
+        </p:nvSpPr>
+        <p:spPr/>
+        <p:txBody>
+          <a:bodyPr/>
+          <a:lstStyle/>
+          <a:p>
+            <a:endParaRPr lang="en-US"/>
+          </a:p>
+        </p:txBody>
+      </p:sp>
+      <p:sp>
+        <p:nvSpPr>
+          <p:cNvPr id="6" name="Slide Number Placeholder 5">
+            <a:extLst>
+              <a:ext uri="{FF2B5EF4-FFF2-40B4-BE49-F238E27FC236}">
+                <a16:creationId xmlns:a16="http://schemas.microsoft.com/office/drawing/2014/main" id="{09EF37FC-3955-42CF-8B1B-C2275A39A717}"/>
+              </a:ext>
+            </a:extLst>
+          </p:cNvPr>
+          <p:cNvSpPr>
+            <a:spLocks noGrp="1"/>
+          </p:cNvSpPr>
+          <p:nvPr>
+            <p:ph type="sldNum" sz="quarter" idx="12"/>
+          </p:nvPr>
+        </p:nvSpPr>
+        <p:spPr/>
+        <p:txBody>
+          <a:bodyPr/>
+          <a:lstStyle/>
+          <a:p>
+            <a:fld id="{2697313F-D866-4554-955F-25FA0D5B9080}" type="slidenum">
+              <a:rPr lang="en-US" smtClean="0"/>
+              <a:t>20</a:t>
+            </a:fld>
+            <a:endParaRPr lang="en-US"/>
+          </a:p>
+        </p:txBody>
+      </p:sp>
+    </p:spTree>
+    <p:extLst>
+      <p:ext uri="{BB962C8B-B14F-4D97-AF65-F5344CB8AC3E}">
+        <p14:creationId xmlns:p14="http://schemas.microsoft.com/office/powerpoint/2010/main" val="3820306448"/>
+      </p:ext>
+    </p:extLst>
+  </p:cSld>
+  <p:clrMapOvr>
+    <a:masterClrMapping/>
+  </p:clrMapOvr>
+</p:sld>
+</file>
+
+<file path=ppt/slides/slide21.xml><?xml version="1.0" encoding="utf-8"?>
+<p:sld xmlns:a="http://schemas.openxmlformats.org/drawingml/2006/main" xmlns:r="http://schemas.openxmlformats.org/officeDocument/2006/relationships" xmlns:p="http://schemas.openxmlformats.org/presentationml/2006/main">
+  <p:cSld>
+    <p:spTree>
+      <p:nvGrpSpPr>
+        <p:cNvPr id="1" name=""/>
+        <p:cNvGrpSpPr/>
+        <p:nvPr/>
+      </p:nvGrpSpPr>
+      <p:grpSpPr>
+        <a:xfrm>
+          <a:off x="0" y="0"/>
+          <a:ext cx="0" cy="0"/>
+          <a:chOff x="0" y="0"/>
+          <a:chExt cx="0" cy="0"/>
+        </a:xfrm>
+      </p:grpSpPr>
+      <mc:AlternateContent xmlns:mc="http://schemas.openxmlformats.org/markup-compatibility/2006">
+        <mc:Choice xmlns:a14="http://schemas.microsoft.com/office/drawing/2010/main" Requires="a14">
+          <p:sp>
+            <p:nvSpPr>
+              <p:cNvPr id="2" name="Content Placeholder 1">
+                <a:extLst>
+                  <a:ext uri="{FF2B5EF4-FFF2-40B4-BE49-F238E27FC236}">
+                    <a16:creationId xmlns:a16="http://schemas.microsoft.com/office/drawing/2014/main" id="{0F181636-F5E1-6E0D-4866-B8CB566E34DB}"/>
+                  </a:ext>
+                </a:extLst>
+              </p:cNvPr>
+              <p:cNvSpPr>
+                <a:spLocks noGrp="1"/>
+              </p:cNvSpPr>
+              <p:nvPr>
+                <p:ph idx="1"/>
+              </p:nvPr>
+            </p:nvSpPr>
+            <p:spPr/>
+            <p:txBody>
+              <a:bodyPr/>
+              <a:lstStyle/>
+              <a:p>
+                <a:pPr marL="0" marR="0" lvl="0" indent="0">
+                  <a:lnSpc>
+                    <a:spcPct val="115000"/>
+                  </a:lnSpc>
+                  <a:spcBef>
+                    <a:spcPts val="0"/>
+                  </a:spcBef>
+                  <a:spcAft>
+                    <a:spcPts val="800"/>
+                  </a:spcAft>
+                  <a:buNone/>
+                </a:pPr>
+                <a:r>
+                  <a:rPr lang="en-US" sz="1800" b="1" kern="100" dirty="0">
+                    <a:latin typeface="Aptos" panose="020B0004020202020204" pitchFamily="34" charset="0"/>
+                    <a:ea typeface="DengXian" panose="02010600030101010101" pitchFamily="2" charset="-122"/>
+                    <a:cs typeface="Times New Roman" panose="02020603050405020304" pitchFamily="18" charset="0"/>
+                  </a:rPr>
+                  <a:t>Yamamoto, NTT and </a:t>
+                </a:r>
+                <a:r>
+                  <a:rPr lang="en-US" sz="1800" b="1" kern="100" dirty="0" err="1">
+                    <a:latin typeface="Aptos" panose="020B0004020202020204" pitchFamily="34" charset="0"/>
+                    <a:ea typeface="DengXian" panose="02010600030101010101" pitchFamily="2" charset="-122"/>
+                    <a:cs typeface="Times New Roman" panose="02020603050405020304" pitchFamily="18" charset="0"/>
+                  </a:rPr>
+                  <a:t>Standford</a:t>
+                </a:r>
+                <a:r>
+                  <a:rPr lang="en-US" sz="1800" b="1" kern="100" dirty="0">
+                    <a:latin typeface="Aptos" panose="020B0004020202020204" pitchFamily="34" charset="0"/>
+                    <a:ea typeface="DengXian" panose="02010600030101010101" pitchFamily="2" charset="-122"/>
+                    <a:cs typeface="Times New Roman" panose="02020603050405020304" pitchFamily="18" charset="0"/>
+                  </a:rPr>
+                  <a:t> </a:t>
+                </a:r>
+              </a:p>
+              <a:p>
+                <a:pPr>
+                  <a:lnSpc>
+                    <a:spcPct val="115000"/>
+                  </a:lnSpc>
+                  <a:spcBef>
+                    <a:spcPts val="0"/>
+                  </a:spcBef>
+                  <a:spcAft>
+                    <a:spcPts val="800"/>
+                  </a:spcAft>
+                </a:pPr>
+                <a:r>
+                  <a:rPr lang="en-US" sz="1800" u="sng" kern="100" dirty="0">
+                    <a:solidFill>
+                      <a:srgbClr val="467886"/>
+                    </a:solidFill>
+                    <a:effectLst/>
+                    <a:latin typeface="Aptos" panose="020B0004020202020204" pitchFamily="34" charset="0"/>
+                    <a:ea typeface="DengXian" panose="02010600030101010101" pitchFamily="2" charset="-122"/>
+                    <a:cs typeface="Times New Roman" panose="02020603050405020304" pitchFamily="18" charset="0"/>
+                    <a:hlinkClick r:id="rId2"/>
+                  </a:rPr>
+                  <a:t>Mean-field coherent </a:t>
+                </a:r>
+                <a:r>
+                  <a:rPr lang="en-US" sz="1800" u="sng" kern="100" dirty="0" err="1">
+                    <a:solidFill>
+                      <a:srgbClr val="467886"/>
+                    </a:solidFill>
+                    <a:effectLst/>
+                    <a:latin typeface="Aptos" panose="020B0004020202020204" pitchFamily="34" charset="0"/>
+                    <a:ea typeface="DengXian" panose="02010600030101010101" pitchFamily="2" charset="-122"/>
+                    <a:cs typeface="Times New Roman" panose="02020603050405020304" pitchFamily="18" charset="0"/>
+                    <a:hlinkClick r:id="rId2"/>
+                  </a:rPr>
+                  <a:t>Ising</a:t>
+                </a:r>
+                <a:r>
+                  <a:rPr lang="en-US" sz="1800" u="sng" kern="100" dirty="0">
+                    <a:solidFill>
+                      <a:srgbClr val="467886"/>
+                    </a:solidFill>
+                    <a:effectLst/>
+                    <a:latin typeface="Aptos" panose="020B0004020202020204" pitchFamily="34" charset="0"/>
+                    <a:ea typeface="DengXian" panose="02010600030101010101" pitchFamily="2" charset="-122"/>
+                    <a:cs typeface="Times New Roman" panose="02020603050405020304" pitchFamily="18" charset="0"/>
+                    <a:hlinkClick r:id="rId2"/>
+                  </a:rPr>
+                  <a:t> machines with artificial Zeeman terms</a:t>
+                </a:r>
+                <a:r>
+                  <a:rPr lang="en-US" sz="1800" kern="100" dirty="0">
+                    <a:effectLst/>
+                    <a:latin typeface="Aptos" panose="020B0004020202020204" pitchFamily="34" charset="0"/>
+                    <a:ea typeface="DengXian" panose="02010600030101010101" pitchFamily="2" charset="-122"/>
+                    <a:cs typeface="Times New Roman" panose="02020603050405020304" pitchFamily="18" charset="0"/>
+                  </a:rPr>
+                  <a:t> (2023): </a:t>
+                </a:r>
+                <a:r>
+                  <a:rPr lang="en-US" sz="1800" dirty="0">
+                    <a:effectLst/>
+                    <a:latin typeface="Aptos" panose="020B0004020202020204" pitchFamily="34" charset="0"/>
+                    <a:ea typeface="DengXian" panose="02010600030101010101" pitchFamily="2" charset="-122"/>
+                    <a:cs typeface="Times New Roman" panose="02020603050405020304" pitchFamily="18" charset="0"/>
+                  </a:rPr>
+                  <a:t>implementation of Zeeman terms (external magnetic field) within Mean-Field CIM (MF-CIM) models, improving performance of </a:t>
+                </a:r>
+                <a:r>
+                  <a:rPr lang="en-US" sz="1800" kern="100" dirty="0">
+                    <a:effectLst/>
+                    <a:latin typeface="Aptos" panose="020B0004020202020204" pitchFamily="34" charset="0"/>
+                    <a:ea typeface="DengXian" panose="02010600030101010101" pitchFamily="2" charset="-122"/>
+                    <a:cs typeface="Times New Roman" panose="02020603050405020304" pitchFamily="18" charset="0"/>
+                  </a:rPr>
+                  <a:t>CIM with chaotic amplitude control in 2022 (Control of amplitude homogeneity in coherent </a:t>
+                </a:r>
+                <a:r>
+                  <a:rPr lang="en-US" sz="1800" kern="100" dirty="0" err="1">
+                    <a:effectLst/>
+                    <a:latin typeface="Aptos" panose="020B0004020202020204" pitchFamily="34" charset="0"/>
+                    <a:ea typeface="DengXian" panose="02010600030101010101" pitchFamily="2" charset="-122"/>
+                    <a:cs typeface="Times New Roman" panose="02020603050405020304" pitchFamily="18" charset="0"/>
+                  </a:rPr>
+                  <a:t>ising</a:t>
+                </a:r>
+                <a:r>
+                  <a:rPr lang="en-US" sz="1800" kern="100" dirty="0">
+                    <a:effectLst/>
+                    <a:latin typeface="Aptos" panose="020B0004020202020204" pitchFamily="34" charset="0"/>
+                    <a:ea typeface="DengXian" panose="02010600030101010101" pitchFamily="2" charset="-122"/>
+                    <a:cs typeface="Times New Roman" panose="02020603050405020304" pitchFamily="18" charset="0"/>
+                  </a:rPr>
+                  <a:t> machines with artificial </a:t>
+                </a:r>
+                <a:r>
+                  <a:rPr lang="en-US" sz="1800" kern="100" dirty="0" err="1">
+                    <a:effectLst/>
+                    <a:latin typeface="Aptos" panose="020B0004020202020204" pitchFamily="34" charset="0"/>
+                    <a:ea typeface="DengXian" panose="02010600030101010101" pitchFamily="2" charset="-122"/>
+                    <a:cs typeface="Times New Roman" panose="02020603050405020304" pitchFamily="18" charset="0"/>
+                  </a:rPr>
+                  <a:t>zeeman</a:t>
+                </a:r>
+                <a:r>
+                  <a:rPr lang="en-US" sz="1800" kern="100" dirty="0">
+                    <a:effectLst/>
+                    <a:latin typeface="Aptos" panose="020B0004020202020204" pitchFamily="34" charset="0"/>
+                    <a:ea typeface="DengXian" panose="02010600030101010101" pitchFamily="2" charset="-122"/>
+                    <a:cs typeface="Times New Roman" panose="02020603050405020304" pitchFamily="18" charset="0"/>
+                  </a:rPr>
+                  <a:t> terms (2022)). </a:t>
+                </a:r>
+                <a:endParaRPr lang="en-US" sz="1800" u="sng" kern="100" dirty="0">
+                  <a:solidFill>
+                    <a:srgbClr val="467886"/>
+                  </a:solidFill>
+                  <a:effectLst/>
+                  <a:latin typeface="Aptos" panose="020B0004020202020204" pitchFamily="34" charset="0"/>
+                  <a:ea typeface="DengXian" panose="02010600030101010101" pitchFamily="2" charset="-122"/>
+                  <a:cs typeface="Times New Roman" panose="02020603050405020304" pitchFamily="18" charset="0"/>
+                  <a:hlinkClick r:id="rId3"/>
+                </a:endParaRPr>
+              </a:p>
+              <a:p>
+                <a:pPr>
+                  <a:lnSpc>
+                    <a:spcPct val="115000"/>
+                  </a:lnSpc>
+                  <a:spcBef>
+                    <a:spcPts val="0"/>
+                  </a:spcBef>
+                  <a:spcAft>
+                    <a:spcPts val="0"/>
+                  </a:spcAft>
+                </a:pPr>
+                <a:r>
+                  <a:rPr lang="en-US" sz="1800" u="sng" kern="100" dirty="0">
+                    <a:solidFill>
+                      <a:srgbClr val="467886"/>
+                    </a:solidFill>
+                    <a:effectLst/>
+                    <a:latin typeface="Aptos" panose="020B0004020202020204" pitchFamily="34" charset="0"/>
+                    <a:ea typeface="DengXian" panose="02010600030101010101" pitchFamily="2" charset="-122"/>
+                    <a:cs typeface="Times New Roman" panose="02020603050405020304" pitchFamily="18" charset="0"/>
+                    <a:hlinkClick r:id="rId3"/>
+                  </a:rPr>
+                  <a:t>Skew-Gaussian model of small-photon-number coherent </a:t>
+                </a:r>
+                <a:r>
+                  <a:rPr lang="en-US" sz="1800" u="sng" kern="100" dirty="0" err="1">
+                    <a:solidFill>
+                      <a:srgbClr val="467886"/>
+                    </a:solidFill>
+                    <a:effectLst/>
+                    <a:latin typeface="Aptos" panose="020B0004020202020204" pitchFamily="34" charset="0"/>
+                    <a:ea typeface="DengXian" panose="02010600030101010101" pitchFamily="2" charset="-122"/>
+                    <a:cs typeface="Times New Roman" panose="02020603050405020304" pitchFamily="18" charset="0"/>
+                    <a:hlinkClick r:id="rId3"/>
+                  </a:rPr>
+                  <a:t>Ising</a:t>
+                </a:r>
+                <a:r>
+                  <a:rPr lang="en-US" sz="1800" u="sng" kern="100" dirty="0">
+                    <a:solidFill>
+                      <a:srgbClr val="467886"/>
+                    </a:solidFill>
+                    <a:effectLst/>
+                    <a:latin typeface="Aptos" panose="020B0004020202020204" pitchFamily="34" charset="0"/>
+                    <a:ea typeface="DengXian" panose="02010600030101010101" pitchFamily="2" charset="-122"/>
+                    <a:cs typeface="Times New Roman" panose="02020603050405020304" pitchFamily="18" charset="0"/>
+                    <a:hlinkClick r:id="rId3"/>
+                  </a:rPr>
+                  <a:t> machines</a:t>
+                </a:r>
+                <a:r>
+                  <a:rPr lang="en-US" sz="1800" kern="100" dirty="0">
+                    <a:effectLst/>
+                    <a:latin typeface="Aptos" panose="020B0004020202020204" pitchFamily="34" charset="0"/>
+                    <a:ea typeface="DengXian" panose="02010600030101010101" pitchFamily="2" charset="-122"/>
+                    <a:cs typeface="Times New Roman" panose="02020603050405020304" pitchFamily="18" charset="0"/>
+                  </a:rPr>
+                  <a:t> (2024): control of amplitude homogeneity, </a:t>
+                </a:r>
+                <a14:m>
+                  <m:oMath xmlns:m="http://schemas.openxmlformats.org/officeDocument/2006/math">
+                    <m:sSup>
+                      <m:sSupPr>
+                        <m:ctrlPr>
+                          <a:rPr lang="en-US" sz="1800" i="1" smtClean="0">
+                            <a:solidFill>
+                              <a:srgbClr val="836967"/>
+                            </a:solidFill>
+                            <a:effectLst/>
+                            <a:latin typeface="Cambria Math" panose="02040503050406030204" pitchFamily="18" charset="0"/>
+                          </a:rPr>
+                        </m:ctrlPr>
+                      </m:sSupPr>
+                      <m:e>
+                        <m:r>
+                          <a:rPr lang="en-US" sz="1800" i="1" smtClean="0">
+                            <a:effectLst/>
+                            <a:latin typeface="Cambria Math" panose="02040503050406030204" pitchFamily="18" charset="0"/>
+                          </a:rPr>
+                          <m:t>𝜒</m:t>
+                        </m:r>
+                      </m:e>
+                      <m:sup>
+                        <m:d>
+                          <m:dPr>
+                            <m:ctrlPr>
+                              <a:rPr lang="en-US" sz="1800" i="1" smtClean="0">
+                                <a:solidFill>
+                                  <a:srgbClr val="836967"/>
+                                </a:solidFill>
+                                <a:effectLst/>
+                                <a:latin typeface="Cambria Math" panose="02040503050406030204" pitchFamily="18" charset="0"/>
+                              </a:rPr>
+                            </m:ctrlPr>
+                          </m:dPr>
+                          <m:e>
+                            <m:r>
+                              <a:rPr lang="en-US" sz="1800" i="0" smtClean="0">
+                                <a:effectLst/>
+                                <a:latin typeface="Cambria Math" panose="02040503050406030204" pitchFamily="18" charset="0"/>
+                              </a:rPr>
+                              <m:t>2</m:t>
+                            </m:r>
+                          </m:e>
+                        </m:d>
+                      </m:sup>
+                    </m:sSup>
+                  </m:oMath>
+                </a14:m>
+                <a:r>
+                  <a:rPr lang="en-US" sz="1800" dirty="0">
+                    <a:effectLst/>
+                    <a:latin typeface="Aptos" panose="020B0004020202020204" pitchFamily="34" charset="0"/>
+                    <a:ea typeface="DengXian" panose="02010600030101010101" pitchFamily="2" charset="-122"/>
+                    <a:cs typeface="Times New Roman" panose="02020603050405020304" pitchFamily="18" charset="0"/>
+                  </a:rPr>
+                  <a:t>DOPOs + two third-order fluctuation products </a:t>
+                </a:r>
+                <a:endParaRPr lang="en-US" sz="1800" kern="100" dirty="0">
+                  <a:effectLst/>
+                  <a:latin typeface="Aptos" panose="020B0004020202020204" pitchFamily="34" charset="0"/>
+                  <a:ea typeface="DengXian" panose="02010600030101010101" pitchFamily="2" charset="-122"/>
+                  <a:cs typeface="Times New Roman" panose="02020603050405020304" pitchFamily="18" charset="0"/>
+                </a:endParaRPr>
+              </a:p>
+              <a:p>
+                <a:pPr>
+                  <a:lnSpc>
+                    <a:spcPct val="115000"/>
+                  </a:lnSpc>
+                  <a:spcBef>
+                    <a:spcPts val="0"/>
+                  </a:spcBef>
+                  <a:spcAft>
+                    <a:spcPts val="0"/>
+                  </a:spcAft>
+                </a:pPr>
+                <a:r>
+                  <a:rPr lang="en-US" sz="1800" u="sng" kern="100" dirty="0">
+                    <a:solidFill>
+                      <a:srgbClr val="467886"/>
+                    </a:solidFill>
+                    <a:effectLst/>
+                    <a:latin typeface="Aptos" panose="020B0004020202020204" pitchFamily="34" charset="0"/>
+                    <a:ea typeface="DengXian" panose="02010600030101010101" pitchFamily="2" charset="-122"/>
+                    <a:cs typeface="Times New Roman" panose="02020603050405020304" pitchFamily="18" charset="0"/>
+                    <a:hlinkClick r:id="rId4"/>
+                  </a:rPr>
+                  <a:t>Dynamic Anisotropic Smoothing for Noisy Derivative-Free Optimization</a:t>
+                </a:r>
+                <a:r>
+                  <a:rPr lang="en-US" sz="1800" kern="100" dirty="0">
+                    <a:effectLst/>
+                    <a:latin typeface="Aptos" panose="020B0004020202020204" pitchFamily="34" charset="0"/>
+                    <a:ea typeface="DengXian" panose="02010600030101010101" pitchFamily="2" charset="-122"/>
+                    <a:cs typeface="Times New Roman" panose="02020603050405020304" pitchFamily="18" charset="0"/>
+                  </a:rPr>
+                  <a:t> (2024) : improve tunning of parameters in CIM with chaotic amplitude control ((</a:t>
+                </a:r>
+                <a:r>
+                  <a:rPr lang="en-US" sz="1800" kern="100" dirty="0" err="1">
+                    <a:effectLst/>
+                    <a:latin typeface="Aptos" panose="020B0004020202020204" pitchFamily="34" charset="0"/>
+                    <a:ea typeface="DengXian" panose="02010600030101010101" pitchFamily="2" charset="-122"/>
+                    <a:cs typeface="Times New Roman" panose="02020603050405020304" pitchFamily="18" charset="0"/>
+                  </a:rPr>
+                  <a:t>Leleu</a:t>
+                </a:r>
+                <a:r>
+                  <a:rPr lang="en-US" sz="1800" kern="100" dirty="0">
+                    <a:effectLst/>
+                    <a:latin typeface="Aptos" panose="020B0004020202020204" pitchFamily="34" charset="0"/>
+                    <a:ea typeface="DengXian" panose="02010600030101010101" pitchFamily="2" charset="-122"/>
+                    <a:cs typeface="Times New Roman" panose="02020603050405020304" pitchFamily="18" charset="0"/>
+                  </a:rPr>
+                  <a:t> et al., 2019) using </a:t>
+                </a:r>
+                <a:r>
+                  <a:rPr lang="en-US" sz="1800" dirty="0">
+                    <a:effectLst/>
+                    <a:latin typeface="Aptos" panose="020B0004020202020204" pitchFamily="34" charset="0"/>
+                    <a:ea typeface="DengXian" panose="02010600030101010101" pitchFamily="2" charset="-122"/>
+                    <a:cs typeface="Times New Roman" panose="02020603050405020304" pitchFamily="18" charset="0"/>
+                  </a:rPr>
+                  <a:t>DAS (dynamic anisotropic smoothing) algorithm, which is used for derivative-free optimization.</a:t>
+                </a:r>
+              </a:p>
+              <a:p>
+                <a:pPr>
+                  <a:lnSpc>
+                    <a:spcPct val="115000"/>
+                  </a:lnSpc>
+                  <a:spcBef>
+                    <a:spcPts val="0"/>
+                  </a:spcBef>
+                  <a:spcAft>
+                    <a:spcPts val="0"/>
+                  </a:spcAft>
+                </a:pPr>
+                <a:endParaRPr lang="en-US" dirty="0"/>
+              </a:p>
+            </p:txBody>
+          </p:sp>
+        </mc:Choice>
+        <mc:Fallback>
+          <p:sp>
+            <p:nvSpPr>
+              <p:cNvPr id="2" name="Content Placeholder 1">
+                <a:extLst>
+                  <a:ext uri="{FF2B5EF4-FFF2-40B4-BE49-F238E27FC236}">
+                    <a16:creationId xmlns:a16="http://schemas.microsoft.com/office/drawing/2014/main" id="{0F181636-F5E1-6E0D-4866-B8CB566E34DB}"/>
+                  </a:ext>
+                </a:extLst>
+              </p:cNvPr>
+              <p:cNvSpPr>
+                <a:spLocks noGrp="1" noRot="1" noChangeAspect="1" noMove="1" noResize="1" noEditPoints="1" noAdjustHandles="1" noChangeArrowheads="1" noChangeShapeType="1" noTextEdit="1"/>
+              </p:cNvSpPr>
+              <p:nvPr>
+                <p:ph idx="1"/>
+              </p:nvPr>
+            </p:nvSpPr>
+            <p:spPr>
+              <a:blipFill>
+                <a:blip r:embed="rId5"/>
+                <a:stretch>
+                  <a:fillRect l="-1622"/>
+                </a:stretch>
+              </a:blipFill>
+            </p:spPr>
+            <p:txBody>
+              <a:bodyPr/>
+              <a:lstStyle/>
+              <a:p>
+                <a:r>
+                  <a:rPr lang="en-US">
+                    <a:noFill/>
+                  </a:rPr>
+                  <a:t> </a:t>
+                </a:r>
+              </a:p>
+            </p:txBody>
+          </p:sp>
+        </mc:Fallback>
+      </mc:AlternateContent>
+      <p:sp>
+        <p:nvSpPr>
+          <p:cNvPr id="3" name="Title 2">
+            <a:extLst>
+              <a:ext uri="{FF2B5EF4-FFF2-40B4-BE49-F238E27FC236}">
+                <a16:creationId xmlns:a16="http://schemas.microsoft.com/office/drawing/2014/main" id="{594CC708-A0D4-1FAE-ACFE-5B332DAF9ED2}"/>
+              </a:ext>
+            </a:extLst>
+          </p:cNvPr>
+          <p:cNvSpPr>
+            <a:spLocks noGrp="1"/>
+          </p:cNvSpPr>
+          <p:nvPr>
+            <p:ph type="title"/>
+          </p:nvPr>
+        </p:nvSpPr>
+        <p:spPr/>
+        <p:txBody>
+          <a:bodyPr/>
+          <a:lstStyle/>
+          <a:p>
+            <a:endParaRPr lang="en-US"/>
+          </a:p>
+        </p:txBody>
+      </p:sp>
+      <p:sp>
+        <p:nvSpPr>
+          <p:cNvPr id="4" name="Date Placeholder 3">
+            <a:extLst>
+              <a:ext uri="{FF2B5EF4-FFF2-40B4-BE49-F238E27FC236}">
+                <a16:creationId xmlns:a16="http://schemas.microsoft.com/office/drawing/2014/main" id="{2C84BCCE-917E-ED8B-F4C2-2B3CD8C849AE}"/>
+              </a:ext>
+            </a:extLst>
+          </p:cNvPr>
+          <p:cNvSpPr>
+            <a:spLocks noGrp="1"/>
+          </p:cNvSpPr>
+          <p:nvPr>
+            <p:ph type="dt" sz="half" idx="10"/>
+          </p:nvPr>
+        </p:nvSpPr>
+        <p:spPr/>
+        <p:txBody>
+          <a:bodyPr/>
+          <a:lstStyle/>
+          <a:p>
+            <a:fld id="{23E2BD91-2AE8-487A-BD5C-78BC9B3F7C4B}" type="datetime1">
+              <a:rPr lang="en-US" smtClean="0"/>
+              <a:t>9/13/2024</a:t>
+            </a:fld>
+            <a:endParaRPr lang="en-US"/>
+          </a:p>
+        </p:txBody>
+      </p:sp>
+      <p:sp>
+        <p:nvSpPr>
+          <p:cNvPr id="5" name="Footer Placeholder 4">
+            <a:extLst>
+              <a:ext uri="{FF2B5EF4-FFF2-40B4-BE49-F238E27FC236}">
+                <a16:creationId xmlns:a16="http://schemas.microsoft.com/office/drawing/2014/main" id="{2368BFC8-3669-D4EA-206C-227BDD946A7C}"/>
+              </a:ext>
+            </a:extLst>
+          </p:cNvPr>
+          <p:cNvSpPr>
+            <a:spLocks noGrp="1"/>
+          </p:cNvSpPr>
+          <p:nvPr>
+            <p:ph type="ftr" sz="quarter" idx="11"/>
+          </p:nvPr>
+        </p:nvSpPr>
+        <p:spPr/>
+        <p:txBody>
+          <a:bodyPr/>
+          <a:lstStyle/>
+          <a:p>
+            <a:endParaRPr lang="en-US"/>
+          </a:p>
+        </p:txBody>
+      </p:sp>
+      <p:sp>
+        <p:nvSpPr>
+          <p:cNvPr id="6" name="Slide Number Placeholder 5">
+            <a:extLst>
+              <a:ext uri="{FF2B5EF4-FFF2-40B4-BE49-F238E27FC236}">
+                <a16:creationId xmlns:a16="http://schemas.microsoft.com/office/drawing/2014/main" id="{27955807-5AEC-BB07-372D-C9623DE5478F}"/>
+              </a:ext>
+            </a:extLst>
+          </p:cNvPr>
+          <p:cNvSpPr>
+            <a:spLocks noGrp="1"/>
+          </p:cNvSpPr>
+          <p:nvPr>
+            <p:ph type="sldNum" sz="quarter" idx="12"/>
+          </p:nvPr>
+        </p:nvSpPr>
+        <p:spPr/>
+        <p:txBody>
+          <a:bodyPr/>
+          <a:lstStyle/>
+          <a:p>
+            <a:fld id="{2697313F-D866-4554-955F-25FA0D5B9080}" type="slidenum">
+              <a:rPr lang="en-US" smtClean="0"/>
+              <a:t>21</a:t>
+            </a:fld>
+            <a:endParaRPr lang="en-US"/>
+          </a:p>
+        </p:txBody>
+      </p:sp>
+    </p:spTree>
+    <p:extLst>
+      <p:ext uri="{BB962C8B-B14F-4D97-AF65-F5344CB8AC3E}">
+        <p14:creationId xmlns:p14="http://schemas.microsoft.com/office/powerpoint/2010/main" val="630721582"/>
+      </p:ext>
+    </p:extLst>
+  </p:cSld>
+  <p:clrMapOvr>
+    <a:masterClrMapping/>
+  </p:clrMapOvr>
+</p:sld>
+</file>
+
+<file path=ppt/slides/slide22.xml><?xml version="1.0" encoding="utf-8"?>
+<p:sld xmlns:a="http://schemas.openxmlformats.org/drawingml/2006/main" xmlns:r="http://schemas.openxmlformats.org/officeDocument/2006/relationships" xmlns:p="http://schemas.openxmlformats.org/presentationml/2006/main">
+  <p:cSld>
+    <p:spTree>
+      <p:nvGrpSpPr>
+        <p:cNvPr id="1" name=""/>
+        <p:cNvGrpSpPr/>
+        <p:nvPr/>
+      </p:nvGrpSpPr>
+      <p:grpSpPr>
+        <a:xfrm>
+          <a:off x="0" y="0"/>
+          <a:ext cx="0" cy="0"/>
+          <a:chOff x="0" y="0"/>
+          <a:chExt cx="0" cy="0"/>
+        </a:xfrm>
+      </p:grpSpPr>
+      <p:sp>
+        <p:nvSpPr>
+          <p:cNvPr id="2" name="Content Placeholder 1">
+            <a:extLst>
+              <a:ext uri="{FF2B5EF4-FFF2-40B4-BE49-F238E27FC236}">
+                <a16:creationId xmlns:a16="http://schemas.microsoft.com/office/drawing/2014/main" id="{FCFC5609-B775-C784-74A9-F5F6043539B3}"/>
+              </a:ext>
+            </a:extLst>
+          </p:cNvPr>
+          <p:cNvSpPr>
+            <a:spLocks noGrp="1"/>
+          </p:cNvSpPr>
+          <p:nvPr>
+            <p:ph idx="1"/>
+          </p:nvPr>
+        </p:nvSpPr>
+        <p:spPr/>
+        <p:txBody>
+          <a:bodyPr/>
+          <a:lstStyle/>
+          <a:p>
+            <a:pPr marL="0" indent="0">
+              <a:buNone/>
+            </a:pPr>
+            <a:r>
+              <a:rPr lang="en-US" sz="1800" b="1" kern="100" dirty="0">
+                <a:solidFill>
+                  <a:srgbClr val="070064"/>
+                </a:solidFill>
+                <a:latin typeface="Aptos" panose="020B0004020202020204" pitchFamily="34" charset="0"/>
+                <a:ea typeface="DengXian" panose="02010600030101010101" pitchFamily="2" charset="-122"/>
+                <a:cs typeface="Times New Roman" panose="02020603050405020304" pitchFamily="18" charset="0"/>
+              </a:rPr>
+              <a:t>Advantages: </a:t>
+            </a:r>
+            <a:r>
+              <a:rPr lang="en-US" sz="1800" kern="100" dirty="0">
+                <a:solidFill>
+                  <a:srgbClr val="070064"/>
+                </a:solidFill>
+                <a:latin typeface="Aptos" panose="020B0004020202020204" pitchFamily="34" charset="0"/>
+                <a:ea typeface="DengXian" panose="02010600030101010101" pitchFamily="2" charset="-122"/>
+                <a:cs typeface="Times New Roman" panose="02020603050405020304" pitchFamily="18" charset="0"/>
+              </a:rPr>
+              <a:t>fast, low cost, mitigating amplitude inhomogeneity, compact</a:t>
+            </a:r>
+          </a:p>
+          <a:p>
+            <a:pPr marL="0" indent="0">
+              <a:buNone/>
+            </a:pPr>
+            <a:r>
+              <a:rPr lang="en-US" sz="1800" b="1" kern="100" dirty="0">
+                <a:solidFill>
+                  <a:srgbClr val="070064"/>
+                </a:solidFill>
+                <a:latin typeface="Aptos" panose="020B0004020202020204" pitchFamily="34" charset="0"/>
+                <a:ea typeface="DengXian" panose="02010600030101010101" pitchFamily="2" charset="-122"/>
+                <a:cs typeface="Times New Roman" panose="02020603050405020304" pitchFamily="18" charset="0"/>
+              </a:rPr>
+              <a:t>Disadvantages: </a:t>
+            </a:r>
+            <a:r>
+              <a:rPr lang="en-US" sz="1800" kern="100" dirty="0">
+                <a:solidFill>
+                  <a:srgbClr val="070064"/>
+                </a:solidFill>
+                <a:latin typeface="Aptos" panose="020B0004020202020204" pitchFamily="34" charset="0"/>
+                <a:ea typeface="DengXian" panose="02010600030101010101" pitchFamily="2" charset="-122"/>
+                <a:cs typeface="Times New Roman" panose="02020603050405020304" pitchFamily="18" charset="0"/>
+              </a:rPr>
+              <a:t>periodic transfer function due to the Mach-Zehnder interferometer is an approximation of CIM polynomial model </a:t>
+            </a:r>
+          </a:p>
+          <a:p>
+            <a:pPr marL="0" indent="0">
+              <a:buNone/>
+            </a:pPr>
+            <a:r>
+              <a:rPr lang="en-US" sz="1800" b="1" kern="100" dirty="0">
+                <a:solidFill>
+                  <a:srgbClr val="070064"/>
+                </a:solidFill>
+                <a:latin typeface="Aptos" panose="020B0004020202020204" pitchFamily="34" charset="0"/>
+                <a:ea typeface="DengXian" panose="02010600030101010101" pitchFamily="2" charset="-122"/>
+                <a:cs typeface="Times New Roman" panose="02020603050405020304" pitchFamily="18" charset="0"/>
+              </a:rPr>
+              <a:t>Applied Physics Research Group, Vrije Universiteit Brussel (VUB)</a:t>
+            </a:r>
+            <a:endParaRPr lang="en-US" sz="1800" u="sng" kern="100" dirty="0">
+              <a:solidFill>
+                <a:srgbClr val="467886"/>
+              </a:solidFill>
+              <a:effectLst/>
+              <a:latin typeface="Aptos" panose="020B0004020202020204" pitchFamily="34" charset="0"/>
+              <a:ea typeface="DengXian" panose="02010600030101010101" pitchFamily="2" charset="-122"/>
+              <a:cs typeface="Times New Roman" panose="02020603050405020304" pitchFamily="18" charset="0"/>
+              <a:hlinkClick r:id="rId2"/>
+            </a:endParaRPr>
+          </a:p>
+          <a:p>
+            <a:r>
+              <a:rPr lang="en-US" sz="1600" u="sng" kern="100" dirty="0">
+                <a:solidFill>
+                  <a:srgbClr val="467886"/>
+                </a:solidFill>
+                <a:effectLst/>
+                <a:latin typeface="Aptos" panose="020B0004020202020204" pitchFamily="34" charset="0"/>
+                <a:ea typeface="DengXian" panose="02010600030101010101" pitchFamily="2" charset="-122"/>
+                <a:cs typeface="Times New Roman" panose="02020603050405020304" pitchFamily="18" charset="0"/>
+                <a:hlinkClick r:id="rId2"/>
+              </a:rPr>
+              <a:t>A poor man’s coherent </a:t>
+            </a:r>
+            <a:r>
+              <a:rPr lang="en-US" sz="1600" u="sng" kern="100" dirty="0" err="1">
+                <a:solidFill>
+                  <a:srgbClr val="467886"/>
+                </a:solidFill>
+                <a:effectLst/>
+                <a:latin typeface="Aptos" panose="020B0004020202020204" pitchFamily="34" charset="0"/>
+                <a:ea typeface="DengXian" panose="02010600030101010101" pitchFamily="2" charset="-122"/>
+                <a:cs typeface="Times New Roman" panose="02020603050405020304" pitchFamily="18" charset="0"/>
+                <a:hlinkClick r:id="rId2"/>
+              </a:rPr>
+              <a:t>Ising</a:t>
+            </a:r>
+            <a:r>
+              <a:rPr lang="en-US" sz="1600" u="sng" kern="100" dirty="0">
+                <a:solidFill>
+                  <a:srgbClr val="467886"/>
+                </a:solidFill>
+                <a:effectLst/>
+                <a:latin typeface="Aptos" panose="020B0004020202020204" pitchFamily="34" charset="0"/>
+                <a:ea typeface="DengXian" panose="02010600030101010101" pitchFamily="2" charset="-122"/>
+                <a:cs typeface="Times New Roman" panose="02020603050405020304" pitchFamily="18" charset="0"/>
+                <a:hlinkClick r:id="rId2"/>
+              </a:rPr>
+              <a:t> machine based on opto-electronic feedback systems for solving optimization problems</a:t>
+            </a:r>
+            <a:r>
+              <a:rPr lang="en-US" sz="1600" kern="100" dirty="0">
+                <a:effectLst/>
+                <a:latin typeface="Aptos" panose="020B0004020202020204" pitchFamily="34" charset="0"/>
+                <a:ea typeface="DengXian" panose="02010600030101010101" pitchFamily="2" charset="-122"/>
+                <a:cs typeface="Times New Roman" panose="02020603050405020304" pitchFamily="18" charset="0"/>
+              </a:rPr>
+              <a:t> (2019)</a:t>
+            </a:r>
+          </a:p>
+          <a:p>
+            <a:pPr marL="0" marR="0" indent="0">
+              <a:lnSpc>
+                <a:spcPct val="115000"/>
+              </a:lnSpc>
+              <a:buNone/>
+            </a:pPr>
+            <a:r>
+              <a:rPr lang="en-US" sz="1800" b="1" kern="100" dirty="0">
+                <a:solidFill>
+                  <a:srgbClr val="070064"/>
+                </a:solidFill>
+                <a:latin typeface="Aptos" panose="020B0004020202020204" pitchFamily="34" charset="0"/>
+                <a:ea typeface="DengXian" panose="02010600030101010101" pitchFamily="2" charset="-122"/>
+                <a:cs typeface="Times New Roman" panose="02020603050405020304" pitchFamily="18" charset="0"/>
+              </a:rPr>
+              <a:t>Hewlett Packard Labs (HP Labs), Belgium </a:t>
+            </a:r>
+          </a:p>
+          <a:p>
+            <a:pPr>
+              <a:lnSpc>
+                <a:spcPct val="115000"/>
+              </a:lnSpc>
+              <a:spcBef>
+                <a:spcPts val="0"/>
+              </a:spcBef>
+              <a:spcAft>
+                <a:spcPts val="0"/>
+              </a:spcAft>
+            </a:pPr>
+            <a:r>
+              <a:rPr lang="en-US" sz="1600" u="sng" kern="100" dirty="0">
+                <a:solidFill>
+                  <a:srgbClr val="467886"/>
+                </a:solidFill>
+                <a:effectLst/>
+                <a:latin typeface="Aptos" panose="020B0004020202020204" pitchFamily="34" charset="0"/>
+                <a:ea typeface="DengXian" panose="02010600030101010101" pitchFamily="2" charset="-122"/>
+                <a:cs typeface="Times New Roman" panose="02020603050405020304" pitchFamily="18" charset="0"/>
+                <a:hlinkClick r:id="rId3"/>
+              </a:rPr>
+              <a:t>Tunable coherent </a:t>
+            </a:r>
+            <a:r>
+              <a:rPr lang="en-US" sz="1600" u="sng" kern="100" dirty="0" err="1">
+                <a:solidFill>
+                  <a:srgbClr val="467886"/>
+                </a:solidFill>
+                <a:effectLst/>
+                <a:latin typeface="Aptos" panose="020B0004020202020204" pitchFamily="34" charset="0"/>
+                <a:ea typeface="DengXian" panose="02010600030101010101" pitchFamily="2" charset="-122"/>
+                <a:cs typeface="Times New Roman" panose="02020603050405020304" pitchFamily="18" charset="0"/>
+                <a:hlinkClick r:id="rId3"/>
+              </a:rPr>
+              <a:t>Ising</a:t>
+            </a:r>
+            <a:r>
+              <a:rPr lang="en-US" sz="1600" u="sng" kern="100" dirty="0">
+                <a:solidFill>
+                  <a:srgbClr val="467886"/>
+                </a:solidFill>
+                <a:effectLst/>
+                <a:latin typeface="Aptos" panose="020B0004020202020204" pitchFamily="34" charset="0"/>
+                <a:ea typeface="DengXian" panose="02010600030101010101" pitchFamily="2" charset="-122"/>
+                <a:cs typeface="Times New Roman" panose="02020603050405020304" pitchFamily="18" charset="0"/>
+                <a:hlinkClick r:id="rId3"/>
+              </a:rPr>
+              <a:t> machines with fifth-order nonlinearity</a:t>
+            </a:r>
+            <a:r>
+              <a:rPr lang="en-US" sz="1600" kern="100" dirty="0">
+                <a:effectLst/>
+                <a:latin typeface="Aptos" panose="020B0004020202020204" pitchFamily="34" charset="0"/>
+                <a:ea typeface="DengXian" panose="02010600030101010101" pitchFamily="2" charset="-122"/>
+                <a:cs typeface="Times New Roman" panose="02020603050405020304" pitchFamily="18" charset="0"/>
+              </a:rPr>
+              <a:t> (2024): a fifth-order nonlinearity to have more hyperparameters and a large noise regime to facilitate exploration</a:t>
+            </a:r>
+          </a:p>
+          <a:p>
+            <a:pPr>
+              <a:lnSpc>
+                <a:spcPct val="115000"/>
+              </a:lnSpc>
+              <a:spcBef>
+                <a:spcPts val="0"/>
+              </a:spcBef>
+              <a:spcAft>
+                <a:spcPts val="0"/>
+              </a:spcAft>
+            </a:pPr>
+            <a:r>
+              <a:rPr lang="en-US" sz="1600" u="sng" kern="100" dirty="0">
+                <a:solidFill>
+                  <a:srgbClr val="467886"/>
+                </a:solidFill>
+                <a:effectLst/>
+                <a:latin typeface="Aptos" panose="020B0004020202020204" pitchFamily="34" charset="0"/>
+                <a:ea typeface="DengXian" panose="02010600030101010101" pitchFamily="2" charset="-122"/>
+                <a:cs typeface="Times New Roman" panose="02020603050405020304" pitchFamily="18" charset="0"/>
+              </a:rPr>
+              <a:t>Integrated Coherent </a:t>
+            </a:r>
+            <a:r>
+              <a:rPr lang="en-US" sz="1600" u="sng" kern="100" dirty="0" err="1">
+                <a:solidFill>
+                  <a:srgbClr val="467886"/>
+                </a:solidFill>
+                <a:effectLst/>
+                <a:latin typeface="Aptos" panose="020B0004020202020204" pitchFamily="34" charset="0"/>
+                <a:ea typeface="DengXian" panose="02010600030101010101" pitchFamily="2" charset="-122"/>
+                <a:cs typeface="Times New Roman" panose="02020603050405020304" pitchFamily="18" charset="0"/>
+              </a:rPr>
+              <a:t>Ising</a:t>
+            </a:r>
+            <a:r>
+              <a:rPr lang="en-US" sz="1600" u="sng" kern="100" dirty="0">
+                <a:solidFill>
+                  <a:srgbClr val="467886"/>
+                </a:solidFill>
+                <a:effectLst/>
+                <a:latin typeface="Aptos" panose="020B0004020202020204" pitchFamily="34" charset="0"/>
+                <a:ea typeface="DengXian" panose="02010600030101010101" pitchFamily="2" charset="-122"/>
+                <a:cs typeface="Times New Roman" panose="02020603050405020304" pitchFamily="18" charset="0"/>
+              </a:rPr>
+              <a:t> Machines Based on Self-Phase Modulation in </a:t>
+            </a:r>
+            <a:r>
+              <a:rPr lang="en-US" sz="1600" u="sng" kern="100" dirty="0" err="1">
+                <a:solidFill>
+                  <a:srgbClr val="467886"/>
+                </a:solidFill>
+                <a:effectLst/>
+                <a:latin typeface="Aptos" panose="020B0004020202020204" pitchFamily="34" charset="0"/>
+                <a:ea typeface="DengXian" panose="02010600030101010101" pitchFamily="2" charset="-122"/>
+                <a:cs typeface="Times New Roman" panose="02020603050405020304" pitchFamily="18" charset="0"/>
+              </a:rPr>
+              <a:t>Microring</a:t>
+            </a:r>
+            <a:r>
+              <a:rPr lang="en-US" sz="1600" u="sng" kern="100" dirty="0">
+                <a:solidFill>
+                  <a:srgbClr val="467886"/>
+                </a:solidFill>
+                <a:effectLst/>
+                <a:latin typeface="Aptos" panose="020B0004020202020204" pitchFamily="34" charset="0"/>
+                <a:ea typeface="DengXian" panose="02010600030101010101" pitchFamily="2" charset="-122"/>
+                <a:cs typeface="Times New Roman" panose="02020603050405020304" pitchFamily="18" charset="0"/>
+              </a:rPr>
+              <a:t> Resonators (2019)</a:t>
+            </a:r>
+            <a:endParaRPr lang="en-US" sz="1600" kern="100" dirty="0">
+              <a:effectLst/>
+              <a:latin typeface="Aptos" panose="020B0004020202020204" pitchFamily="34" charset="0"/>
+              <a:ea typeface="DengXian" panose="02010600030101010101" pitchFamily="2" charset="-122"/>
+              <a:cs typeface="Times New Roman" panose="02020603050405020304" pitchFamily="18" charset="0"/>
+            </a:endParaRPr>
+          </a:p>
+          <a:p>
+            <a:pPr marL="0" indent="0">
+              <a:lnSpc>
+                <a:spcPct val="115000"/>
+              </a:lnSpc>
+              <a:spcBef>
+                <a:spcPts val="0"/>
+              </a:spcBef>
+              <a:spcAft>
+                <a:spcPts val="0"/>
+              </a:spcAft>
+              <a:buNone/>
+            </a:pPr>
+            <a:r>
+              <a:rPr lang="en-US" sz="1800" b="1" kern="100" dirty="0">
+                <a:latin typeface="Aptos" panose="020B0004020202020204" pitchFamily="34" charset="0"/>
+                <a:ea typeface="DengXian" panose="02010600030101010101" pitchFamily="2" charset="-122"/>
+                <a:cs typeface="Times New Roman" panose="02020603050405020304" pitchFamily="18" charset="0"/>
+              </a:rPr>
+              <a:t>VUB + HP Labs</a:t>
+            </a:r>
+          </a:p>
+          <a:p>
+            <a:pPr marL="0" marR="0">
+              <a:lnSpc>
+                <a:spcPct val="115000"/>
+              </a:lnSpc>
+              <a:spcBef>
+                <a:spcPts val="0"/>
+              </a:spcBef>
+              <a:spcAft>
+                <a:spcPts val="800"/>
+              </a:spcAft>
+            </a:pPr>
+            <a:r>
+              <a:rPr lang="en-US" sz="1600" u="sng" kern="100" dirty="0">
+                <a:solidFill>
+                  <a:srgbClr val="467886"/>
+                </a:solidFill>
+                <a:effectLst/>
+                <a:latin typeface="Aptos" panose="020B0004020202020204" pitchFamily="34" charset="0"/>
+                <a:ea typeface="DengXian" panose="02010600030101010101" pitchFamily="2" charset="-122"/>
+                <a:cs typeface="Times New Roman" panose="02020603050405020304" pitchFamily="18" charset="0"/>
+                <a:hlinkClick r:id="rId4"/>
+              </a:rPr>
+              <a:t>Order-of-magnitude differences in computational performance of analog </a:t>
+            </a:r>
+            <a:r>
+              <a:rPr lang="en-US" sz="1600" u="sng" kern="100" dirty="0" err="1">
+                <a:solidFill>
+                  <a:srgbClr val="467886"/>
+                </a:solidFill>
+                <a:effectLst/>
+                <a:latin typeface="Aptos" panose="020B0004020202020204" pitchFamily="34" charset="0"/>
+                <a:ea typeface="DengXian" panose="02010600030101010101" pitchFamily="2" charset="-122"/>
+                <a:cs typeface="Times New Roman" panose="02020603050405020304" pitchFamily="18" charset="0"/>
+                <a:hlinkClick r:id="rId4"/>
+              </a:rPr>
+              <a:t>Ising</a:t>
+            </a:r>
+            <a:r>
+              <a:rPr lang="en-US" sz="1600" u="sng" kern="100" dirty="0">
+                <a:solidFill>
+                  <a:srgbClr val="467886"/>
+                </a:solidFill>
+                <a:effectLst/>
+                <a:latin typeface="Aptos" panose="020B0004020202020204" pitchFamily="34" charset="0"/>
+                <a:ea typeface="DengXian" panose="02010600030101010101" pitchFamily="2" charset="-122"/>
+                <a:cs typeface="Times New Roman" panose="02020603050405020304" pitchFamily="18" charset="0"/>
+                <a:hlinkClick r:id="rId4"/>
+              </a:rPr>
+              <a:t> machines induced by the choice of nonlinearity</a:t>
+            </a:r>
+            <a:r>
+              <a:rPr lang="en-US" sz="1600" kern="100" dirty="0">
+                <a:effectLst/>
+                <a:latin typeface="Aptos" panose="020B0004020202020204" pitchFamily="34" charset="0"/>
+                <a:ea typeface="DengXian" panose="02010600030101010101" pitchFamily="2" charset="-122"/>
+                <a:cs typeface="Times New Roman" panose="02020603050405020304" pitchFamily="18" charset="0"/>
+              </a:rPr>
+              <a:t> (2021): higher order helps solve optimization problems</a:t>
+            </a:r>
+          </a:p>
+          <a:p>
+            <a:pPr marL="0" marR="0">
+              <a:lnSpc>
+                <a:spcPct val="115000"/>
+              </a:lnSpc>
+              <a:spcBef>
+                <a:spcPts val="0"/>
+              </a:spcBef>
+              <a:spcAft>
+                <a:spcPts val="800"/>
+              </a:spcAft>
+            </a:pPr>
+            <a:r>
+              <a:rPr lang="en-US" sz="1600" u="sng" kern="100" dirty="0">
+                <a:solidFill>
+                  <a:srgbClr val="467886"/>
+                </a:solidFill>
+                <a:effectLst/>
+                <a:latin typeface="Aptos" panose="020B0004020202020204" pitchFamily="34" charset="0"/>
+                <a:ea typeface="DengXian" panose="02010600030101010101" pitchFamily="2" charset="-122"/>
+                <a:cs typeface="Times New Roman" panose="02020603050405020304" pitchFamily="18" charset="0"/>
+                <a:hlinkClick r:id="rId5"/>
+              </a:rPr>
+              <a:t>Compact and inexpensive photonic </a:t>
+            </a:r>
+            <a:r>
+              <a:rPr lang="en-US" sz="1600" u="sng" kern="100" dirty="0" err="1">
+                <a:solidFill>
+                  <a:srgbClr val="467886"/>
+                </a:solidFill>
+                <a:effectLst/>
+                <a:latin typeface="Aptos" panose="020B0004020202020204" pitchFamily="34" charset="0"/>
+                <a:ea typeface="DengXian" panose="02010600030101010101" pitchFamily="2" charset="-122"/>
+                <a:cs typeface="Times New Roman" panose="02020603050405020304" pitchFamily="18" charset="0"/>
+                <a:hlinkClick r:id="rId5"/>
+              </a:rPr>
+              <a:t>Ising</a:t>
+            </a:r>
+            <a:r>
+              <a:rPr lang="en-US" sz="1600" u="sng" kern="100" dirty="0">
+                <a:solidFill>
+                  <a:srgbClr val="467886"/>
+                </a:solidFill>
+                <a:effectLst/>
+                <a:latin typeface="Aptos" panose="020B0004020202020204" pitchFamily="34" charset="0"/>
+                <a:ea typeface="DengXian" panose="02010600030101010101" pitchFamily="2" charset="-122"/>
+                <a:cs typeface="Times New Roman" panose="02020603050405020304" pitchFamily="18" charset="0"/>
+                <a:hlinkClick r:id="rId5"/>
+              </a:rPr>
+              <a:t> machines based on optoelectronic oscillators</a:t>
+            </a:r>
+            <a:r>
+              <a:rPr lang="en-US" sz="1600" kern="100" dirty="0">
+                <a:effectLst/>
+                <a:latin typeface="Aptos" panose="020B0004020202020204" pitchFamily="34" charset="0"/>
+                <a:ea typeface="DengXian" panose="02010600030101010101" pitchFamily="2" charset="-122"/>
+                <a:cs typeface="Times New Roman" panose="02020603050405020304" pitchFamily="18" charset="0"/>
+              </a:rPr>
+              <a:t> (2021): comparison of OEO-based and DOPO-based </a:t>
+            </a:r>
+            <a:r>
+              <a:rPr lang="en-US" sz="1600" kern="100" dirty="0" err="1">
+                <a:effectLst/>
+                <a:latin typeface="Aptos" panose="020B0004020202020204" pitchFamily="34" charset="0"/>
+                <a:ea typeface="DengXian" panose="02010600030101010101" pitchFamily="2" charset="-122"/>
+                <a:cs typeface="Times New Roman" panose="02020603050405020304" pitchFamily="18" charset="0"/>
+              </a:rPr>
+              <a:t>Ising</a:t>
+            </a:r>
+            <a:r>
+              <a:rPr lang="en-US" sz="1600" kern="100" dirty="0">
+                <a:effectLst/>
+                <a:latin typeface="Aptos" panose="020B0004020202020204" pitchFamily="34" charset="0"/>
+                <a:ea typeface="DengXian" panose="02010600030101010101" pitchFamily="2" charset="-122"/>
+                <a:cs typeface="Times New Roman" panose="02020603050405020304" pitchFamily="18" charset="0"/>
+              </a:rPr>
+              <a:t> machines</a:t>
+            </a:r>
+          </a:p>
+          <a:p>
+            <a:pPr>
+              <a:lnSpc>
+                <a:spcPct val="115000"/>
+              </a:lnSpc>
+              <a:spcBef>
+                <a:spcPts val="0"/>
+              </a:spcBef>
+              <a:spcAft>
+                <a:spcPts val="0"/>
+              </a:spcAft>
+            </a:pPr>
+            <a:endParaRPr lang="en-US" sz="1800" kern="100" dirty="0">
+              <a:effectLst/>
+              <a:latin typeface="Aptos" panose="020B0004020202020204" pitchFamily="34" charset="0"/>
+              <a:ea typeface="DengXian" panose="02010600030101010101" pitchFamily="2" charset="-122"/>
+              <a:cs typeface="Times New Roman" panose="02020603050405020304" pitchFamily="18" charset="0"/>
+            </a:endParaRPr>
+          </a:p>
+          <a:p>
+            <a:pPr marL="0" indent="0">
+              <a:lnSpc>
+                <a:spcPct val="115000"/>
+              </a:lnSpc>
+              <a:spcBef>
+                <a:spcPts val="0"/>
+              </a:spcBef>
+              <a:spcAft>
+                <a:spcPts val="0"/>
+              </a:spcAft>
+              <a:buNone/>
+            </a:pPr>
+            <a:endParaRPr lang="en-US" sz="1600" kern="100" dirty="0">
+              <a:effectLst/>
+              <a:latin typeface="Aptos" panose="020B0004020202020204" pitchFamily="34" charset="0"/>
+              <a:ea typeface="DengXian" panose="02010600030101010101" pitchFamily="2" charset="-122"/>
+              <a:cs typeface="Times New Roman" panose="02020603050405020304" pitchFamily="18" charset="0"/>
+            </a:endParaRPr>
+          </a:p>
+          <a:p>
+            <a:pPr marL="0" indent="0">
+              <a:buNone/>
+            </a:pPr>
+            <a:endParaRPr lang="en-US" dirty="0"/>
+          </a:p>
+        </p:txBody>
+      </p:sp>
+      <p:sp>
+        <p:nvSpPr>
+          <p:cNvPr id="3" name="Title 2">
+            <a:extLst>
+              <a:ext uri="{FF2B5EF4-FFF2-40B4-BE49-F238E27FC236}">
+                <a16:creationId xmlns:a16="http://schemas.microsoft.com/office/drawing/2014/main" id="{D79C09C7-4D33-1BE2-F355-CC9B07D2BABA}"/>
+              </a:ext>
+            </a:extLst>
+          </p:cNvPr>
+          <p:cNvSpPr>
+            <a:spLocks noGrp="1"/>
+          </p:cNvSpPr>
+          <p:nvPr>
+            <p:ph type="title"/>
+          </p:nvPr>
+        </p:nvSpPr>
+        <p:spPr>
+          <a:xfrm>
+            <a:off x="250824" y="149225"/>
+            <a:ext cx="7484253" cy="647700"/>
+          </a:xfrm>
+        </p:spPr>
+        <p:txBody>
+          <a:bodyPr/>
+          <a:lstStyle/>
+          <a:p>
+            <a:r>
+              <a:rPr lang="en-US" sz="2400" dirty="0"/>
+              <a:t>Opto-electronic Oscillator (OEO) Based </a:t>
+            </a:r>
+            <a:r>
+              <a:rPr lang="en-US" sz="2400" dirty="0" err="1"/>
+              <a:t>Ising</a:t>
+            </a:r>
+            <a:r>
+              <a:rPr lang="en-US" sz="2400" dirty="0"/>
+              <a:t> Machine</a:t>
+            </a:r>
+          </a:p>
+        </p:txBody>
+      </p:sp>
+      <p:sp>
+        <p:nvSpPr>
+          <p:cNvPr id="4" name="Date Placeholder 3">
+            <a:extLst>
+              <a:ext uri="{FF2B5EF4-FFF2-40B4-BE49-F238E27FC236}">
+                <a16:creationId xmlns:a16="http://schemas.microsoft.com/office/drawing/2014/main" id="{5DE75D0A-8EC1-EB20-B087-0531A0D2A4A5}"/>
+              </a:ext>
+            </a:extLst>
+          </p:cNvPr>
+          <p:cNvSpPr>
+            <a:spLocks noGrp="1"/>
+          </p:cNvSpPr>
+          <p:nvPr>
+            <p:ph type="dt" sz="half" idx="10"/>
+          </p:nvPr>
+        </p:nvSpPr>
+        <p:spPr/>
+        <p:txBody>
+          <a:bodyPr/>
+          <a:lstStyle/>
+          <a:p>
+            <a:fld id="{23E2BD91-2AE8-487A-BD5C-78BC9B3F7C4B}" type="datetime1">
+              <a:rPr lang="en-US" smtClean="0"/>
+              <a:t>9/13/2024</a:t>
+            </a:fld>
+            <a:endParaRPr lang="en-US"/>
+          </a:p>
+        </p:txBody>
+      </p:sp>
+      <p:sp>
+        <p:nvSpPr>
+          <p:cNvPr id="5" name="Footer Placeholder 4">
+            <a:extLst>
+              <a:ext uri="{FF2B5EF4-FFF2-40B4-BE49-F238E27FC236}">
+                <a16:creationId xmlns:a16="http://schemas.microsoft.com/office/drawing/2014/main" id="{2F5ED5FA-ACAA-154C-7839-87E277382BD5}"/>
+              </a:ext>
+            </a:extLst>
+          </p:cNvPr>
+          <p:cNvSpPr>
+            <a:spLocks noGrp="1"/>
+          </p:cNvSpPr>
+          <p:nvPr>
+            <p:ph type="ftr" sz="quarter" idx="11"/>
+          </p:nvPr>
+        </p:nvSpPr>
+        <p:spPr/>
+        <p:txBody>
+          <a:bodyPr/>
+          <a:lstStyle/>
+          <a:p>
+            <a:endParaRPr lang="en-US"/>
+          </a:p>
+        </p:txBody>
+      </p:sp>
+      <p:sp>
+        <p:nvSpPr>
+          <p:cNvPr id="6" name="Slide Number Placeholder 5">
+            <a:extLst>
+              <a:ext uri="{FF2B5EF4-FFF2-40B4-BE49-F238E27FC236}">
+                <a16:creationId xmlns:a16="http://schemas.microsoft.com/office/drawing/2014/main" id="{E2324053-B106-452D-E424-4E050A7E6103}"/>
+              </a:ext>
+            </a:extLst>
+          </p:cNvPr>
+          <p:cNvSpPr>
+            <a:spLocks noGrp="1"/>
+          </p:cNvSpPr>
+          <p:nvPr>
+            <p:ph type="sldNum" sz="quarter" idx="12"/>
+          </p:nvPr>
+        </p:nvSpPr>
+        <p:spPr/>
+        <p:txBody>
+          <a:bodyPr/>
+          <a:lstStyle/>
+          <a:p>
+            <a:fld id="{2697313F-D866-4554-955F-25FA0D5B9080}" type="slidenum">
+              <a:rPr lang="en-US" smtClean="0"/>
+              <a:t>22</a:t>
+            </a:fld>
+            <a:endParaRPr lang="en-US"/>
+          </a:p>
+        </p:txBody>
+      </p:sp>
+    </p:spTree>
+    <p:extLst>
+      <p:ext uri="{BB962C8B-B14F-4D97-AF65-F5344CB8AC3E}">
+        <p14:creationId xmlns:p14="http://schemas.microsoft.com/office/powerpoint/2010/main" val="2379744386"/>
+      </p:ext>
+    </p:extLst>
+  </p:cSld>
+  <p:clrMapOvr>
+    <a:masterClrMapping/>
+  </p:clrMapOvr>
+</p:sld>
+</file>
+
+<file path=ppt/slides/slide23.xml><?xml version="1.0" encoding="utf-8"?>
+<p:sld xmlns:a="http://schemas.openxmlformats.org/drawingml/2006/main" xmlns:r="http://schemas.openxmlformats.org/officeDocument/2006/relationships" xmlns:p="http://schemas.openxmlformats.org/presentationml/2006/main">
+  <p:cSld>
+    <p:spTree>
+      <p:nvGrpSpPr>
+        <p:cNvPr id="1" name=""/>
+        <p:cNvGrpSpPr/>
+        <p:nvPr/>
+      </p:nvGrpSpPr>
+      <p:grpSpPr>
+        <a:xfrm>
+          <a:off x="0" y="0"/>
+          <a:ext cx="0" cy="0"/>
+          <a:chOff x="0" y="0"/>
+          <a:chExt cx="0" cy="0"/>
+        </a:xfrm>
+      </p:grpSpPr>
+      <p:sp>
+        <p:nvSpPr>
+          <p:cNvPr id="2" name="Content Placeholder 1">
+            <a:extLst>
+              <a:ext uri="{FF2B5EF4-FFF2-40B4-BE49-F238E27FC236}">
+                <a16:creationId xmlns:a16="http://schemas.microsoft.com/office/drawing/2014/main" id="{27B85E8E-4B30-7F2E-ED4B-964A878F2E1C}"/>
+              </a:ext>
+            </a:extLst>
+          </p:cNvPr>
+          <p:cNvSpPr>
+            <a:spLocks noGrp="1"/>
+          </p:cNvSpPr>
+          <p:nvPr>
+            <p:ph idx="1"/>
+          </p:nvPr>
+        </p:nvSpPr>
+        <p:spPr/>
+        <p:txBody>
+          <a:bodyPr/>
+          <a:lstStyle/>
+          <a:p>
+            <a:pPr marL="0" marR="0" indent="0">
+              <a:lnSpc>
+                <a:spcPct val="115000"/>
+              </a:lnSpc>
+              <a:spcBef>
+                <a:spcPts val="0"/>
+              </a:spcBef>
+              <a:spcAft>
+                <a:spcPts val="800"/>
+              </a:spcAft>
+              <a:buNone/>
+            </a:pPr>
+            <a:r>
+              <a:rPr lang="en-US" sz="1800" b="1" kern="100" dirty="0">
+                <a:solidFill>
+                  <a:srgbClr val="070064"/>
+                </a:solidFill>
+                <a:effectLst/>
+                <a:latin typeface="Aptos" panose="020B0004020202020204" pitchFamily="34" charset="0"/>
+                <a:ea typeface="DengXian" panose="02010600030101010101" pitchFamily="2" charset="-122"/>
+                <a:cs typeface="Times New Roman" panose="02020603050405020304" pitchFamily="18" charset="0"/>
+              </a:rPr>
+              <a:t>Columbia University + Cornell University</a:t>
+            </a:r>
+            <a:endParaRPr lang="en-US" sz="1800" kern="100" dirty="0">
+              <a:solidFill>
+                <a:srgbClr val="070064"/>
+              </a:solidFill>
+              <a:effectLst/>
+              <a:latin typeface="Aptos" panose="020B0004020202020204" pitchFamily="34" charset="0"/>
+              <a:ea typeface="DengXian" panose="02010600030101010101" pitchFamily="2" charset="-122"/>
+              <a:cs typeface="Times New Roman" panose="02020603050405020304" pitchFamily="18" charset="0"/>
+            </a:endParaRPr>
+          </a:p>
+          <a:p>
+            <a:pPr>
+              <a:lnSpc>
+                <a:spcPct val="115000"/>
+              </a:lnSpc>
+              <a:spcBef>
+                <a:spcPts val="0"/>
+              </a:spcBef>
+              <a:spcAft>
+                <a:spcPts val="800"/>
+              </a:spcAft>
+            </a:pPr>
+            <a:r>
+              <a:rPr lang="en-US" sz="1800" u="sng" kern="100" dirty="0">
+                <a:solidFill>
+                  <a:srgbClr val="467886"/>
+                </a:solidFill>
+                <a:effectLst/>
+                <a:latin typeface="Aptos" panose="020B0004020202020204" pitchFamily="34" charset="0"/>
+                <a:ea typeface="DengXian" panose="02010600030101010101" pitchFamily="2" charset="-122"/>
+                <a:cs typeface="Times New Roman" panose="02020603050405020304" pitchFamily="18" charset="0"/>
+                <a:hlinkClick r:id="rId2"/>
+              </a:rPr>
+              <a:t>Demonstration of chip-based coupled degenerate optical parametric oscillators for realizing a nanophotonic spin-glass</a:t>
+            </a:r>
+            <a:r>
+              <a:rPr lang="en-US" sz="1800" kern="100" dirty="0">
+                <a:effectLst/>
+                <a:latin typeface="Aptos" panose="020B0004020202020204" pitchFamily="34" charset="0"/>
+                <a:ea typeface="DengXian" panose="02010600030101010101" pitchFamily="2" charset="-122"/>
+                <a:cs typeface="Times New Roman" panose="02020603050405020304" pitchFamily="18" charset="0"/>
+              </a:rPr>
+              <a:t> (2020)</a:t>
+            </a:r>
+          </a:p>
+          <a:p>
+            <a:pPr marL="0" marR="0" indent="0">
+              <a:lnSpc>
+                <a:spcPct val="115000"/>
+              </a:lnSpc>
+              <a:spcBef>
+                <a:spcPts val="0"/>
+              </a:spcBef>
+              <a:spcAft>
+                <a:spcPts val="800"/>
+              </a:spcAft>
+              <a:buNone/>
+            </a:pPr>
+            <a:r>
+              <a:rPr lang="en-US" sz="1800" b="1" kern="100" dirty="0">
+                <a:solidFill>
+                  <a:srgbClr val="070064"/>
+                </a:solidFill>
+                <a:effectLst/>
+                <a:latin typeface="Aptos" panose="020B0004020202020204" pitchFamily="34" charset="0"/>
+                <a:ea typeface="DengXian" panose="02010600030101010101" pitchFamily="2" charset="-122"/>
+                <a:cs typeface="Times New Roman" panose="02020603050405020304" pitchFamily="18" charset="0"/>
+              </a:rPr>
+              <a:t>Korea Advanced Institute of Science and Technology, KAIST + Daegu-</a:t>
+            </a:r>
+            <a:r>
+              <a:rPr lang="en-US" sz="1800" b="1" kern="100" dirty="0" err="1">
+                <a:solidFill>
+                  <a:srgbClr val="070064"/>
+                </a:solidFill>
+                <a:effectLst/>
+                <a:latin typeface="Aptos" panose="020B0004020202020204" pitchFamily="34" charset="0"/>
+                <a:ea typeface="DengXian" panose="02010600030101010101" pitchFamily="2" charset="-122"/>
+                <a:cs typeface="Times New Roman" panose="02020603050405020304" pitchFamily="18" charset="0"/>
+              </a:rPr>
+              <a:t>Gyeongbuk</a:t>
+            </a:r>
+            <a:r>
+              <a:rPr lang="en-US" sz="1800" b="1" kern="100" dirty="0">
+                <a:solidFill>
+                  <a:srgbClr val="070064"/>
+                </a:solidFill>
+                <a:effectLst/>
+                <a:latin typeface="Aptos" panose="020B0004020202020204" pitchFamily="34" charset="0"/>
+                <a:ea typeface="DengXian" panose="02010600030101010101" pitchFamily="2" charset="-122"/>
+                <a:cs typeface="Times New Roman" panose="02020603050405020304" pitchFamily="18" charset="0"/>
+              </a:rPr>
+              <a:t> Institute of Science and Technology, DGIST, Korea</a:t>
+            </a:r>
+            <a:endParaRPr lang="en-US" sz="1800" kern="100" dirty="0">
+              <a:solidFill>
+                <a:srgbClr val="070064"/>
+              </a:solidFill>
+              <a:effectLst/>
+              <a:latin typeface="Aptos" panose="020B0004020202020204" pitchFamily="34" charset="0"/>
+              <a:ea typeface="DengXian" panose="02010600030101010101" pitchFamily="2" charset="-122"/>
+              <a:cs typeface="Times New Roman" panose="02020603050405020304" pitchFamily="18" charset="0"/>
+            </a:endParaRPr>
+          </a:p>
+          <a:p>
+            <a:pPr>
+              <a:lnSpc>
+                <a:spcPct val="115000"/>
+              </a:lnSpc>
+              <a:spcBef>
+                <a:spcPts val="0"/>
+              </a:spcBef>
+              <a:spcAft>
+                <a:spcPts val="800"/>
+              </a:spcAft>
+            </a:pPr>
+            <a:r>
+              <a:rPr lang="en-US" sz="1800" u="sng" kern="100" dirty="0">
+                <a:solidFill>
+                  <a:srgbClr val="467886"/>
+                </a:solidFill>
+                <a:effectLst/>
+                <a:latin typeface="Aptos" panose="020B0004020202020204" pitchFamily="34" charset="0"/>
+                <a:ea typeface="DengXian" panose="02010600030101010101" pitchFamily="2" charset="-122"/>
+                <a:cs typeface="Times New Roman" panose="02020603050405020304" pitchFamily="18" charset="0"/>
+                <a:hlinkClick r:id="rId3"/>
+              </a:rPr>
+              <a:t>Low Power Coherent </a:t>
+            </a:r>
+            <a:r>
+              <a:rPr lang="en-US" sz="1800" u="sng" kern="100" dirty="0" err="1">
+                <a:solidFill>
+                  <a:srgbClr val="467886"/>
+                </a:solidFill>
+                <a:effectLst/>
+                <a:latin typeface="Aptos" panose="020B0004020202020204" pitchFamily="34" charset="0"/>
+                <a:ea typeface="DengXian" panose="02010600030101010101" pitchFamily="2" charset="-122"/>
+                <a:cs typeface="Times New Roman" panose="02020603050405020304" pitchFamily="18" charset="0"/>
+                <a:hlinkClick r:id="rId3"/>
+              </a:rPr>
+              <a:t>Ising</a:t>
+            </a:r>
+            <a:r>
+              <a:rPr lang="en-US" sz="1800" u="sng" kern="100" dirty="0">
+                <a:solidFill>
+                  <a:srgbClr val="467886"/>
+                </a:solidFill>
+                <a:effectLst/>
+                <a:latin typeface="Aptos" panose="020B0004020202020204" pitchFamily="34" charset="0"/>
+                <a:ea typeface="DengXian" panose="02010600030101010101" pitchFamily="2" charset="-122"/>
+                <a:cs typeface="Times New Roman" panose="02020603050405020304" pitchFamily="18" charset="0"/>
+                <a:hlinkClick r:id="rId3"/>
+              </a:rPr>
+              <a:t> Machine Based on Mechanical Kerr Nonlinearity</a:t>
+            </a:r>
+            <a:r>
+              <a:rPr lang="en-US" sz="1800" kern="100" dirty="0">
+                <a:effectLst/>
+                <a:latin typeface="Aptos" panose="020B0004020202020204" pitchFamily="34" charset="0"/>
+                <a:ea typeface="DengXian" panose="02010600030101010101" pitchFamily="2" charset="-122"/>
+                <a:cs typeface="Times New Roman" panose="02020603050405020304" pitchFamily="18" charset="0"/>
+              </a:rPr>
+              <a:t> (2023)</a:t>
+            </a:r>
+          </a:p>
+          <a:p>
+            <a:pPr marL="0" indent="0">
+              <a:buNone/>
+            </a:pPr>
+            <a:endParaRPr lang="en-US" dirty="0"/>
+          </a:p>
+        </p:txBody>
+      </p:sp>
+      <p:sp>
+        <p:nvSpPr>
+          <p:cNvPr id="3" name="Title 2">
+            <a:extLst>
+              <a:ext uri="{FF2B5EF4-FFF2-40B4-BE49-F238E27FC236}">
+                <a16:creationId xmlns:a16="http://schemas.microsoft.com/office/drawing/2014/main" id="{40E9A47B-38CC-B10A-91AB-3CDE3DF43845}"/>
+              </a:ext>
+            </a:extLst>
+          </p:cNvPr>
+          <p:cNvSpPr>
+            <a:spLocks noGrp="1"/>
+          </p:cNvSpPr>
+          <p:nvPr>
+            <p:ph type="title"/>
+          </p:nvPr>
+        </p:nvSpPr>
+        <p:spPr/>
+        <p:txBody>
+          <a:bodyPr/>
+          <a:lstStyle/>
+          <a:p>
+            <a:r>
+              <a:rPr lang="en-US" dirty="0"/>
+              <a:t>Other Integrated Kerr </a:t>
+            </a:r>
+            <a:r>
+              <a:rPr lang="en-US" dirty="0" err="1"/>
+              <a:t>Ising</a:t>
+            </a:r>
+            <a:r>
+              <a:rPr lang="en-US" dirty="0"/>
+              <a:t> Machines</a:t>
+            </a:r>
+          </a:p>
+        </p:txBody>
+      </p:sp>
+      <p:sp>
+        <p:nvSpPr>
+          <p:cNvPr id="4" name="Date Placeholder 3">
+            <a:extLst>
+              <a:ext uri="{FF2B5EF4-FFF2-40B4-BE49-F238E27FC236}">
+                <a16:creationId xmlns:a16="http://schemas.microsoft.com/office/drawing/2014/main" id="{B7DA6AA7-9353-4B1A-018E-DAF767FDE419}"/>
+              </a:ext>
+            </a:extLst>
+          </p:cNvPr>
+          <p:cNvSpPr>
+            <a:spLocks noGrp="1"/>
+          </p:cNvSpPr>
+          <p:nvPr>
+            <p:ph type="dt" sz="half" idx="10"/>
+          </p:nvPr>
+        </p:nvSpPr>
+        <p:spPr/>
+        <p:txBody>
+          <a:bodyPr/>
+          <a:lstStyle/>
+          <a:p>
+            <a:fld id="{23E2BD91-2AE8-487A-BD5C-78BC9B3F7C4B}" type="datetime1">
+              <a:rPr lang="en-US" smtClean="0"/>
+              <a:t>9/13/2024</a:t>
+            </a:fld>
+            <a:endParaRPr lang="en-US"/>
+          </a:p>
+        </p:txBody>
+      </p:sp>
+      <p:sp>
+        <p:nvSpPr>
+          <p:cNvPr id="5" name="Footer Placeholder 4">
+            <a:extLst>
+              <a:ext uri="{FF2B5EF4-FFF2-40B4-BE49-F238E27FC236}">
+                <a16:creationId xmlns:a16="http://schemas.microsoft.com/office/drawing/2014/main" id="{83088784-74C5-A3CF-6812-B3D0E4D26A94}"/>
+              </a:ext>
+            </a:extLst>
+          </p:cNvPr>
+          <p:cNvSpPr>
+            <a:spLocks noGrp="1"/>
+          </p:cNvSpPr>
+          <p:nvPr>
+            <p:ph type="ftr" sz="quarter" idx="11"/>
+          </p:nvPr>
+        </p:nvSpPr>
+        <p:spPr/>
+        <p:txBody>
+          <a:bodyPr/>
+          <a:lstStyle/>
+          <a:p>
+            <a:endParaRPr lang="en-US"/>
+          </a:p>
+        </p:txBody>
+      </p:sp>
+      <p:sp>
+        <p:nvSpPr>
+          <p:cNvPr id="6" name="Slide Number Placeholder 5">
+            <a:extLst>
+              <a:ext uri="{FF2B5EF4-FFF2-40B4-BE49-F238E27FC236}">
+                <a16:creationId xmlns:a16="http://schemas.microsoft.com/office/drawing/2014/main" id="{8EFCB801-75CA-FC75-1EBD-62796DB57F1E}"/>
+              </a:ext>
+            </a:extLst>
+          </p:cNvPr>
+          <p:cNvSpPr>
+            <a:spLocks noGrp="1"/>
+          </p:cNvSpPr>
+          <p:nvPr>
+            <p:ph type="sldNum" sz="quarter" idx="12"/>
+          </p:nvPr>
+        </p:nvSpPr>
+        <p:spPr/>
+        <p:txBody>
+          <a:bodyPr/>
+          <a:lstStyle/>
+          <a:p>
+            <a:fld id="{2697313F-D866-4554-955F-25FA0D5B9080}" type="slidenum">
+              <a:rPr lang="en-US" smtClean="0"/>
+              <a:t>23</a:t>
+            </a:fld>
+            <a:endParaRPr lang="en-US"/>
+          </a:p>
+        </p:txBody>
+      </p:sp>
+    </p:spTree>
+    <p:extLst>
+      <p:ext uri="{BB962C8B-B14F-4D97-AF65-F5344CB8AC3E}">
+        <p14:creationId xmlns:p14="http://schemas.microsoft.com/office/powerpoint/2010/main" val="3222630248"/>
       </p:ext>
     </p:extLst>
   </p:cSld>
@@ -7519,7 +9984,7 @@
           <a:p>
             <a:fld id="{41453237-B359-4442-BB47-702366E3C8FE}" type="datetime1">
               <a:rPr lang="en-US" smtClean="0"/>
-              <a:t>9/12/2024</a:t>
+              <a:t>9/13/2024</a:t>
             </a:fld>
             <a:endParaRPr lang="en-US"/>
           </a:p>
@@ -7779,7 +10244,7 @@
           <a:p>
             <a:fld id="{3FC47385-6E6D-403A-B787-CC7F98242E15}" type="datetime1">
               <a:rPr lang="en-US" smtClean="0"/>
-              <a:t>9/12/2024</a:t>
+              <a:t>9/13/2024</a:t>
             </a:fld>
             <a:endParaRPr lang="en-US"/>
           </a:p>
@@ -8386,7 +10851,7 @@
           <a:p>
             <a:fld id="{23E2BD91-2AE8-487A-BD5C-78BC9B3F7C4B}" type="datetime1">
               <a:rPr lang="en-US" smtClean="0"/>
-              <a:t>9/12/2024</a:t>
+              <a:t>9/13/2024</a:t>
             </a:fld>
             <a:endParaRPr lang="en-US"/>
           </a:p>
@@ -8569,7 +11034,7 @@
           <a:p>
             <a:fld id="{23E2BD91-2AE8-487A-BD5C-78BC9B3F7C4B}" type="datetime1">
               <a:rPr lang="en-US" smtClean="0"/>
-              <a:t>9/12/2024</a:t>
+              <a:t>9/13/2024</a:t>
             </a:fld>
             <a:endParaRPr lang="en-US"/>
           </a:p>
@@ -9294,7 +11759,7 @@
           <a:p>
             <a:fld id="{23E2BD91-2AE8-487A-BD5C-78BC9B3F7C4B}" type="datetime1">
               <a:rPr lang="en-US" smtClean="0"/>
-              <a:t>9/12/2024</a:t>
+              <a:t>9/13/2024</a:t>
             </a:fld>
             <a:endParaRPr lang="en-US" dirty="0"/>
           </a:p>
@@ -9515,7 +11980,7 @@
           <a:p>
             <a:fld id="{23E2BD91-2AE8-487A-BD5C-78BC9B3F7C4B}" type="datetime1">
               <a:rPr lang="en-US" smtClean="0"/>
-              <a:t>9/12/2024</a:t>
+              <a:t>9/13/2024</a:t>
             </a:fld>
             <a:endParaRPr lang="en-US"/>
           </a:p>
@@ -9847,7 +12312,7 @@
           <a:p>
             <a:fld id="{23E2BD91-2AE8-487A-BD5C-78BC9B3F7C4B}" type="datetime1">
               <a:rPr lang="en-US" smtClean="0"/>
-              <a:t>9/12/2024</a:t>
+              <a:t>9/13/2024</a:t>
             </a:fld>
             <a:endParaRPr lang="en-US"/>
           </a:p>

</xml_diff>